<commit_message>
Added GridView for buttons
</commit_message>
<xml_diff>
--- a/exercises.pptx
+++ b/exercises.pptx
@@ -14,6 +14,8 @@
     <p:sldId id="262" r:id="rId8"/>
     <p:sldId id="263" r:id="rId9"/>
     <p:sldId id="264" r:id="rId10"/>
+    <p:sldId id="265" r:id="rId11"/>
+    <p:sldId id="266" r:id="rId12"/>
   </p:sldIdLst>
   <p:sldSz cx="12192000" cy="6858000"/>
   <p:notesSz cx="6858000" cy="9144000"/>
@@ -3930,6 +3932,944 @@
 </p:sld>
 </file>
 
+<file path=ppt/slides/slide10.xml><?xml version="1.0" encoding="utf-8"?>
+<p:sld xmlns:a="http://schemas.openxmlformats.org/drawingml/2006/main" xmlns:r="http://schemas.openxmlformats.org/officeDocument/2006/relationships" xmlns:p="http://schemas.openxmlformats.org/presentationml/2006/main">
+  <p:cSld>
+    <p:spTree>
+      <p:nvGrpSpPr>
+        <p:cNvPr id="1" name=""/>
+        <p:cNvGrpSpPr/>
+        <p:nvPr/>
+      </p:nvGrpSpPr>
+      <p:grpSpPr>
+        <a:xfrm>
+          <a:off x="0" y="0"/>
+          <a:ext cx="0" cy="0"/>
+          <a:chOff x="0" y="0"/>
+          <a:chExt cx="0" cy="0"/>
+        </a:xfrm>
+      </p:grpSpPr>
+      <p:sp>
+        <p:nvSpPr>
+          <p:cNvPr id="2" name="Title 1"/>
+          <p:cNvSpPr>
+            <a:spLocks noGrp="1"/>
+          </p:cNvSpPr>
+          <p:nvPr>
+            <p:ph type="title"/>
+          </p:nvPr>
+        </p:nvSpPr>
+        <p:spPr>
+          <a:xfrm>
+            <a:off x="5617414" y="457200"/>
+            <a:ext cx="3932237" cy="577970"/>
+          </a:xfrm>
+        </p:spPr>
+        <p:txBody>
+          <a:bodyPr>
+            <a:normAutofit fontScale="90000"/>
+          </a:bodyPr>
+          <a:lstStyle/>
+          <a:p>
+            <a:r>
+              <a:rPr lang="pl-PL" dirty="0" err="1" smtClean="0"/>
+              <a:t>Exercise</a:t>
+            </a:r>
+            <a:r>
+              <a:rPr lang="pl-PL" dirty="0" smtClean="0"/>
+              <a:t> 1.09</a:t>
+            </a:r>
+            <a:endParaRPr lang="en-US" dirty="0"/>
+          </a:p>
+        </p:txBody>
+      </p:sp>
+      <p:sp>
+        <p:nvSpPr>
+          <p:cNvPr id="4" name="Text Placeholder 3"/>
+          <p:cNvSpPr>
+            <a:spLocks noGrp="1"/>
+          </p:cNvSpPr>
+          <p:nvPr>
+            <p:ph type="body" sz="half" idx="2"/>
+          </p:nvPr>
+        </p:nvSpPr>
+        <p:spPr>
+          <a:xfrm>
+            <a:off x="5617414" y="1613140"/>
+            <a:ext cx="5993741" cy="4701396"/>
+          </a:xfrm>
+        </p:spPr>
+        <p:txBody>
+          <a:bodyPr>
+            <a:normAutofit lnSpcReduction="10000"/>
+          </a:bodyPr>
+          <a:lstStyle/>
+          <a:p>
+            <a:pPr marL="285750" indent="-285750">
+              <a:buFont typeface="Arial" panose="020B0604020202020204" pitchFamily="34" charset="0"/>
+              <a:buChar char="•"/>
+            </a:pPr>
+            <a:r>
+              <a:rPr lang="pl-PL" sz="1800" dirty="0" err="1" smtClean="0"/>
+              <a:t>Create</a:t>
+            </a:r>
+            <a:r>
+              <a:rPr lang="pl-PL" sz="1800" dirty="0" smtClean="0"/>
+              <a:t> </a:t>
+            </a:r>
+            <a:r>
+              <a:rPr lang="pl-PL" sz="1800" u="sng" dirty="0" err="1" smtClean="0"/>
+              <a:t>abstract</a:t>
+            </a:r>
+            <a:r>
+              <a:rPr lang="pl-PL" sz="1800" dirty="0" smtClean="0"/>
+              <a:t> </a:t>
+            </a:r>
+            <a:r>
+              <a:rPr lang="pl-PL" sz="1800" dirty="0" err="1" smtClean="0"/>
+              <a:t>class</a:t>
+            </a:r>
+            <a:r>
+              <a:rPr lang="pl-PL" sz="1800" dirty="0" smtClean="0"/>
+              <a:t> </a:t>
+            </a:r>
+            <a:r>
+              <a:rPr lang="pl-PL" sz="1800" b="1" dirty="0" err="1" smtClean="0"/>
+              <a:t>BaseOnScreenButtonViewModel</a:t>
+            </a:r>
+            <a:endParaRPr lang="pl-PL" sz="1800" b="1" dirty="0" smtClean="0"/>
+          </a:p>
+          <a:p>
+            <a:pPr marL="285750" indent="-285750">
+              <a:buFont typeface="Arial" panose="020B0604020202020204" pitchFamily="34" charset="0"/>
+              <a:buChar char="•"/>
+            </a:pPr>
+            <a:r>
+              <a:rPr lang="pl-PL" sz="1800" dirty="0" smtClean="0"/>
+              <a:t>Public </a:t>
+            </a:r>
+            <a:r>
+              <a:rPr lang="pl-PL" sz="1800" dirty="0" err="1" smtClean="0"/>
+              <a:t>constructor</a:t>
+            </a:r>
+            <a:r>
+              <a:rPr lang="pl-PL" sz="1800" dirty="0"/>
+              <a:t> </a:t>
+            </a:r>
+            <a:r>
+              <a:rPr lang="pl-PL" sz="1800" dirty="0" smtClean="0"/>
+              <a:t>of </a:t>
+            </a:r>
+            <a:r>
+              <a:rPr lang="pl-PL" sz="1800" dirty="0" err="1" smtClean="0"/>
+              <a:t>should</a:t>
+            </a:r>
+            <a:r>
+              <a:rPr lang="pl-PL" sz="1800" dirty="0" smtClean="0"/>
+              <a:t> </a:t>
+            </a:r>
+            <a:r>
+              <a:rPr lang="pl-PL" sz="1800" dirty="0" err="1" smtClean="0"/>
+              <a:t>accept</a:t>
+            </a:r>
+            <a:r>
+              <a:rPr lang="pl-PL" sz="1800" dirty="0" smtClean="0"/>
+              <a:t> </a:t>
+            </a:r>
+            <a:r>
+              <a:rPr lang="pl-PL" sz="1800" b="1" dirty="0" err="1" smtClean="0"/>
+              <a:t>UnitConverterViewModel</a:t>
+            </a:r>
+            <a:r>
+              <a:rPr lang="pl-PL" sz="1800" b="1" dirty="0" smtClean="0"/>
+              <a:t> </a:t>
+            </a:r>
+            <a:r>
+              <a:rPr lang="pl-PL" sz="1800" dirty="0" smtClean="0"/>
+              <a:t>as a </a:t>
+            </a:r>
+            <a:r>
+              <a:rPr lang="pl-PL" sz="1800" dirty="0" err="1" smtClean="0"/>
+              <a:t>parameter</a:t>
+            </a:r>
+            <a:endParaRPr lang="pl-PL" sz="1800" dirty="0" smtClean="0"/>
+          </a:p>
+          <a:p>
+            <a:pPr marL="285750" indent="-285750">
+              <a:buFont typeface="Arial" panose="020B0604020202020204" pitchFamily="34" charset="0"/>
+              <a:buChar char="•"/>
+            </a:pPr>
+            <a:r>
+              <a:rPr lang="pl-PL" sz="1800" dirty="0" smtClean="0"/>
+              <a:t>It </a:t>
+            </a:r>
+            <a:r>
+              <a:rPr lang="pl-PL" sz="1800" dirty="0" err="1" smtClean="0"/>
+              <a:t>should</a:t>
+            </a:r>
+            <a:r>
+              <a:rPr lang="pl-PL" sz="1800" dirty="0" smtClean="0"/>
+              <a:t> </a:t>
+            </a:r>
+            <a:r>
+              <a:rPr lang="pl-PL" sz="1800" dirty="0" err="1" smtClean="0"/>
+              <a:t>have</a:t>
+            </a:r>
+            <a:r>
+              <a:rPr lang="pl-PL" sz="1800" dirty="0" smtClean="0"/>
+              <a:t> </a:t>
+            </a:r>
+            <a:r>
+              <a:rPr lang="pl-PL" sz="1800" b="1" dirty="0" err="1" smtClean="0"/>
+              <a:t>Label</a:t>
+            </a:r>
+            <a:r>
+              <a:rPr lang="pl-PL" sz="1800" dirty="0"/>
+              <a:t> </a:t>
+            </a:r>
+            <a:r>
+              <a:rPr lang="pl-PL" sz="1800" dirty="0" smtClean="0"/>
+              <a:t>and </a:t>
+            </a:r>
+            <a:r>
+              <a:rPr lang="pl-PL" sz="1800" b="1" dirty="0" err="1" smtClean="0"/>
+              <a:t>ExecuteCommand</a:t>
+            </a:r>
+            <a:r>
+              <a:rPr lang="pl-PL" sz="1800" dirty="0"/>
+              <a:t> </a:t>
+            </a:r>
+            <a:r>
+              <a:rPr lang="pl-PL" sz="1800" dirty="0" err="1" smtClean="0"/>
+              <a:t>bindable</a:t>
+            </a:r>
+            <a:r>
+              <a:rPr lang="pl-PL" sz="1800" dirty="0" smtClean="0"/>
+              <a:t> </a:t>
+            </a:r>
+            <a:r>
+              <a:rPr lang="pl-PL" sz="1800" dirty="0" err="1" smtClean="0"/>
+              <a:t>properties</a:t>
+            </a:r>
+            <a:endParaRPr lang="pl-PL" sz="1800" dirty="0" smtClean="0"/>
+          </a:p>
+          <a:p>
+            <a:pPr marL="285750" indent="-285750">
+              <a:buFont typeface="Arial" panose="020B0604020202020204" pitchFamily="34" charset="0"/>
+              <a:buChar char="•"/>
+            </a:pPr>
+            <a:r>
+              <a:rPr lang="pl-PL" sz="1800" dirty="0" smtClean="0"/>
+              <a:t>It </a:t>
+            </a:r>
+            <a:r>
+              <a:rPr lang="pl-PL" sz="1800" dirty="0" err="1" smtClean="0"/>
+              <a:t>should</a:t>
+            </a:r>
+            <a:r>
+              <a:rPr lang="pl-PL" sz="1800" dirty="0" smtClean="0"/>
+              <a:t> </a:t>
+            </a:r>
+            <a:r>
+              <a:rPr lang="pl-PL" sz="1800" dirty="0" err="1" smtClean="0"/>
+              <a:t>have</a:t>
+            </a:r>
+            <a:r>
+              <a:rPr lang="pl-PL" sz="1800" dirty="0" smtClean="0"/>
+              <a:t> </a:t>
+            </a:r>
+            <a:r>
+              <a:rPr lang="pl-PL" sz="1800" u="sng" dirty="0" err="1" smtClean="0"/>
+              <a:t>virtual</a:t>
+            </a:r>
+            <a:r>
+              <a:rPr lang="pl-PL" sz="1800" dirty="0" smtClean="0"/>
+              <a:t> </a:t>
+            </a:r>
+            <a:r>
+              <a:rPr lang="pl-PL" sz="1800" dirty="0" err="1" smtClean="0"/>
+              <a:t>methods</a:t>
+            </a:r>
+            <a:r>
+              <a:rPr lang="pl-PL" sz="1800" dirty="0" smtClean="0"/>
+              <a:t> </a:t>
+            </a:r>
+            <a:r>
+              <a:rPr lang="pl-PL" sz="1800" b="1" dirty="0" err="1" smtClean="0"/>
+              <a:t>Execute</a:t>
+            </a:r>
+            <a:r>
+              <a:rPr lang="pl-PL" sz="1800" b="1" dirty="0" smtClean="0"/>
+              <a:t>()</a:t>
+            </a:r>
+            <a:r>
+              <a:rPr lang="pl-PL" sz="1800" dirty="0" smtClean="0"/>
+              <a:t> and </a:t>
+            </a:r>
+            <a:r>
+              <a:rPr lang="pl-PL" sz="1800" b="1" dirty="0" err="1" smtClean="0"/>
+              <a:t>CanExecute</a:t>
+            </a:r>
+            <a:r>
+              <a:rPr lang="pl-PL" sz="1800" b="1" dirty="0" smtClean="0"/>
+              <a:t>()</a:t>
+            </a:r>
+            <a:r>
+              <a:rPr lang="pl-PL" sz="1800" dirty="0" smtClean="0"/>
+              <a:t> </a:t>
+            </a:r>
+            <a:r>
+              <a:rPr lang="pl-PL" sz="1800" dirty="0" err="1" smtClean="0"/>
+              <a:t>used</a:t>
+            </a:r>
+            <a:r>
+              <a:rPr lang="pl-PL" sz="1800" dirty="0" smtClean="0"/>
+              <a:t> by </a:t>
+            </a:r>
+            <a:r>
+              <a:rPr lang="pl-PL" sz="1800" b="1" dirty="0" err="1" smtClean="0"/>
+              <a:t>ExecuteCommand</a:t>
+            </a:r>
+            <a:endParaRPr lang="pl-PL" sz="1800" b="1" dirty="0" smtClean="0"/>
+          </a:p>
+          <a:p>
+            <a:pPr marL="285750" indent="-285750">
+              <a:buFont typeface="Arial" panose="020B0604020202020204" pitchFamily="34" charset="0"/>
+              <a:buChar char="•"/>
+            </a:pPr>
+            <a:r>
+              <a:rPr lang="pl-PL" sz="1800" dirty="0" err="1" smtClean="0"/>
+              <a:t>Create</a:t>
+            </a:r>
+            <a:r>
+              <a:rPr lang="pl-PL" sz="1800" dirty="0" smtClean="0"/>
+              <a:t> </a:t>
+            </a:r>
+            <a:r>
+              <a:rPr lang="en-US" sz="1800" b="1" dirty="0" err="1" smtClean="0"/>
+              <a:t>AppendButtonViewModel</a:t>
+            </a:r>
+            <a:r>
+              <a:rPr lang="pl-PL" sz="1800" dirty="0" smtClean="0"/>
+              <a:t> </a:t>
+            </a:r>
+            <a:r>
+              <a:rPr lang="pl-PL" sz="1800" dirty="0" err="1" smtClean="0"/>
+              <a:t>class</a:t>
+            </a:r>
+            <a:r>
+              <a:rPr lang="pl-PL" sz="1800" dirty="0" smtClean="0"/>
+              <a:t> </a:t>
+            </a:r>
+            <a:r>
+              <a:rPr lang="pl-PL" sz="1800" dirty="0" err="1" smtClean="0"/>
+              <a:t>extending</a:t>
+            </a:r>
+            <a:r>
+              <a:rPr lang="pl-PL" sz="1800" dirty="0" smtClean="0"/>
+              <a:t> </a:t>
+            </a:r>
+            <a:r>
+              <a:rPr lang="pl-PL" sz="1800" b="1" dirty="0" err="1" smtClean="0"/>
+              <a:t>BaseOnScreenButtonViewModel</a:t>
+            </a:r>
+            <a:endParaRPr lang="pl-PL" sz="1800" b="1" dirty="0" smtClean="0"/>
+          </a:p>
+          <a:p>
+            <a:pPr marL="285750" indent="-285750">
+              <a:buFont typeface="Arial" panose="020B0604020202020204" pitchFamily="34" charset="0"/>
+              <a:buChar char="•"/>
+            </a:pPr>
+            <a:r>
+              <a:rPr lang="en-US" sz="1800" b="1" dirty="0" err="1" smtClean="0"/>
+              <a:t>AppendButtonViewModel</a:t>
+            </a:r>
+            <a:r>
+              <a:rPr lang="pl-PL" sz="1800" dirty="0" smtClean="0"/>
+              <a:t> </a:t>
+            </a:r>
+            <a:r>
+              <a:rPr lang="pl-PL" sz="1800" dirty="0" err="1" smtClean="0"/>
+              <a:t>should</a:t>
+            </a:r>
+            <a:r>
+              <a:rPr lang="pl-PL" sz="1800" dirty="0" smtClean="0"/>
+              <a:t> </a:t>
+            </a:r>
+            <a:r>
+              <a:rPr lang="pl-PL" sz="1800" dirty="0" err="1" smtClean="0"/>
+              <a:t>add</a:t>
+            </a:r>
+            <a:r>
+              <a:rPr lang="pl-PL" sz="1800" dirty="0" smtClean="0"/>
+              <a:t> </a:t>
+            </a:r>
+            <a:r>
+              <a:rPr lang="pl-PL" sz="1800" b="1" dirty="0" err="1" smtClean="0"/>
+              <a:t>AppendString</a:t>
+            </a:r>
+            <a:r>
+              <a:rPr lang="pl-PL" sz="1800" dirty="0" smtClean="0"/>
+              <a:t> </a:t>
+            </a:r>
+            <a:r>
+              <a:rPr lang="pl-PL" sz="1800" dirty="0" err="1" smtClean="0"/>
+              <a:t>property</a:t>
+            </a:r>
+            <a:r>
+              <a:rPr lang="pl-PL" sz="1800" dirty="0" smtClean="0"/>
+              <a:t> </a:t>
+            </a:r>
+            <a:r>
+              <a:rPr lang="pl-PL" sz="1800" dirty="0" err="1" smtClean="0"/>
+              <a:t>used</a:t>
+            </a:r>
+            <a:r>
+              <a:rPr lang="pl-PL" sz="1800" dirty="0" smtClean="0"/>
+              <a:t> to </a:t>
+            </a:r>
+            <a:r>
+              <a:rPr lang="pl-PL" sz="1800" dirty="0" err="1" smtClean="0"/>
+              <a:t>append</a:t>
+            </a:r>
+            <a:r>
+              <a:rPr lang="pl-PL" sz="1800" dirty="0" smtClean="0"/>
+              <a:t> </a:t>
+            </a:r>
+            <a:r>
+              <a:rPr lang="pl-PL" sz="1800" b="1" dirty="0" err="1" smtClean="0"/>
+              <a:t>EntryValue</a:t>
+            </a:r>
+            <a:r>
+              <a:rPr lang="pl-PL" sz="1800" dirty="0" smtClean="0"/>
+              <a:t> of </a:t>
+            </a:r>
+            <a:r>
+              <a:rPr lang="pl-PL" sz="1800" b="1" dirty="0" err="1" smtClean="0"/>
+              <a:t>UnitConverterViewModel</a:t>
+            </a:r>
+            <a:endParaRPr lang="en-US" sz="1800" b="1" dirty="0" smtClean="0"/>
+          </a:p>
+        </p:txBody>
+      </p:sp>
+      <p:sp>
+        <p:nvSpPr>
+          <p:cNvPr id="8" name="TextBox 7"/>
+          <p:cNvSpPr txBox="1"/>
+          <p:nvPr/>
+        </p:nvSpPr>
+        <p:spPr>
+          <a:xfrm>
+            <a:off x="5617414" y="1035170"/>
+            <a:ext cx="5993741" cy="400110"/>
+          </a:xfrm>
+          <a:prstGeom prst="rect">
+            <a:avLst/>
+          </a:prstGeom>
+          <a:noFill/>
+        </p:spPr>
+        <p:txBody>
+          <a:bodyPr wrap="square" rtlCol="0">
+            <a:spAutoFit/>
+          </a:bodyPr>
+          <a:lstStyle/>
+          <a:p>
+            <a:r>
+              <a:rPr lang="pl-PL" sz="2000" dirty="0" err="1" smtClean="0"/>
+              <a:t>Branch</a:t>
+            </a:r>
+            <a:r>
+              <a:rPr lang="pl-PL" sz="2000" dirty="0" smtClean="0"/>
+              <a:t> </a:t>
+            </a:r>
+            <a:r>
+              <a:rPr lang="pl-PL" sz="2000" dirty="0" err="1" smtClean="0"/>
+              <a:t>name</a:t>
+            </a:r>
+            <a:r>
+              <a:rPr lang="pl-PL" sz="2000" dirty="0" smtClean="0"/>
+              <a:t>: </a:t>
+            </a:r>
+            <a:r>
+              <a:rPr lang="pl-PL" sz="2000" b="1" dirty="0" smtClean="0"/>
+              <a:t>exercise-1.08 </a:t>
+            </a:r>
+            <a:endParaRPr lang="en-US" sz="2000" b="1" dirty="0"/>
+          </a:p>
+        </p:txBody>
+      </p:sp>
+    </p:spTree>
+    <p:extLst>
+      <p:ext uri="{BB962C8B-B14F-4D97-AF65-F5344CB8AC3E}">
+        <p14:creationId xmlns:p14="http://schemas.microsoft.com/office/powerpoint/2010/main" val="3323209678"/>
+      </p:ext>
+    </p:extLst>
+  </p:cSld>
+  <p:clrMapOvr>
+    <a:masterClrMapping/>
+  </p:clrMapOvr>
+  <p:timing>
+    <p:tnLst>
+      <p:par>
+        <p:cTn id="1" dur="indefinite" restart="never" nodeType="tmRoot"/>
+      </p:par>
+    </p:tnLst>
+  </p:timing>
+</p:sld>
+</file>
+
+<file path=ppt/slides/slide11.xml><?xml version="1.0" encoding="utf-8"?>
+<p:sld xmlns:a="http://schemas.openxmlformats.org/drawingml/2006/main" xmlns:r="http://schemas.openxmlformats.org/officeDocument/2006/relationships" xmlns:p="http://schemas.openxmlformats.org/presentationml/2006/main">
+  <p:cSld>
+    <p:spTree>
+      <p:nvGrpSpPr>
+        <p:cNvPr id="1" name=""/>
+        <p:cNvGrpSpPr/>
+        <p:nvPr/>
+      </p:nvGrpSpPr>
+      <p:grpSpPr>
+        <a:xfrm>
+          <a:off x="0" y="0"/>
+          <a:ext cx="0" cy="0"/>
+          <a:chOff x="0" y="0"/>
+          <a:chExt cx="0" cy="0"/>
+        </a:xfrm>
+      </p:grpSpPr>
+      <p:sp>
+        <p:nvSpPr>
+          <p:cNvPr id="2" name="Title 1"/>
+          <p:cNvSpPr>
+            <a:spLocks noGrp="1"/>
+          </p:cNvSpPr>
+          <p:nvPr>
+            <p:ph type="title"/>
+          </p:nvPr>
+        </p:nvSpPr>
+        <p:spPr>
+          <a:xfrm>
+            <a:off x="5617414" y="457200"/>
+            <a:ext cx="3932237" cy="577970"/>
+          </a:xfrm>
+        </p:spPr>
+        <p:txBody>
+          <a:bodyPr>
+            <a:normAutofit fontScale="90000"/>
+          </a:bodyPr>
+          <a:lstStyle/>
+          <a:p>
+            <a:r>
+              <a:rPr lang="pl-PL" dirty="0" err="1" smtClean="0"/>
+              <a:t>Exercise</a:t>
+            </a:r>
+            <a:r>
+              <a:rPr lang="pl-PL" dirty="0" smtClean="0"/>
+              <a:t> 1.10</a:t>
+            </a:r>
+            <a:endParaRPr lang="en-US" dirty="0"/>
+          </a:p>
+        </p:txBody>
+      </p:sp>
+      <p:sp>
+        <p:nvSpPr>
+          <p:cNvPr id="4" name="Text Placeholder 3"/>
+          <p:cNvSpPr>
+            <a:spLocks noGrp="1"/>
+          </p:cNvSpPr>
+          <p:nvPr>
+            <p:ph type="body" sz="half" idx="2"/>
+          </p:nvPr>
+        </p:nvSpPr>
+        <p:spPr>
+          <a:xfrm>
+            <a:off x="5617414" y="1613140"/>
+            <a:ext cx="5993741" cy="4701396"/>
+          </a:xfrm>
+        </p:spPr>
+        <p:txBody>
+          <a:bodyPr>
+            <a:normAutofit/>
+          </a:bodyPr>
+          <a:lstStyle/>
+          <a:p>
+            <a:pPr marL="285750" indent="-285750">
+              <a:buFont typeface="Arial" panose="020B0604020202020204" pitchFamily="34" charset="0"/>
+              <a:buChar char="•"/>
+            </a:pPr>
+            <a:r>
+              <a:rPr lang="pl-PL" sz="1800" dirty="0" smtClean="0"/>
+              <a:t>In </a:t>
+            </a:r>
+            <a:r>
+              <a:rPr lang="pl-PL" sz="1800" b="1" dirty="0" err="1" smtClean="0"/>
+              <a:t>UnitConverterViewModel</a:t>
+            </a:r>
+            <a:r>
+              <a:rPr lang="pl-PL" sz="1800" dirty="0" smtClean="0"/>
+              <a:t> </a:t>
+            </a:r>
+            <a:r>
+              <a:rPr lang="pl-PL" sz="1800" dirty="0" err="1" smtClean="0"/>
+              <a:t>add</a:t>
+            </a:r>
+            <a:r>
+              <a:rPr lang="pl-PL" sz="1800" dirty="0" smtClean="0"/>
+              <a:t> </a:t>
+            </a:r>
+            <a:r>
+              <a:rPr lang="pl-PL" sz="1800" b="1" dirty="0" smtClean="0"/>
+              <a:t>List&lt;</a:t>
+            </a:r>
+            <a:r>
+              <a:rPr lang="pl-PL" sz="1800" b="1" dirty="0" err="1" smtClean="0"/>
+              <a:t>BaseOnScreenButtonViewModel</a:t>
+            </a:r>
+            <a:r>
+              <a:rPr lang="pl-PL" sz="1800" b="1" dirty="0" smtClean="0"/>
+              <a:t>&gt;</a:t>
+            </a:r>
+            <a:r>
+              <a:rPr lang="pl-PL" sz="1800" dirty="0" smtClean="0"/>
+              <a:t> </a:t>
+            </a:r>
+            <a:r>
+              <a:rPr lang="en-US" sz="1800" b="1" dirty="0" err="1"/>
+              <a:t>OnScreenKeyboardButtons</a:t>
+            </a:r>
+            <a:r>
+              <a:rPr lang="en-US" sz="1800" dirty="0"/>
+              <a:t> </a:t>
+            </a:r>
+            <a:r>
+              <a:rPr lang="pl-PL" sz="1800" dirty="0" smtClean="0"/>
+              <a:t> </a:t>
+            </a:r>
+            <a:r>
+              <a:rPr lang="pl-PL" sz="1800" dirty="0" err="1" smtClean="0"/>
+              <a:t>property</a:t>
+            </a:r>
+            <a:r>
+              <a:rPr lang="pl-PL" sz="1800" dirty="0" smtClean="0"/>
+              <a:t> and </a:t>
+            </a:r>
+            <a:r>
+              <a:rPr lang="pl-PL" sz="1800" dirty="0" err="1" smtClean="0"/>
+              <a:t>fill</a:t>
+            </a:r>
+            <a:r>
+              <a:rPr lang="pl-PL" sz="1800" dirty="0" smtClean="0"/>
+              <a:t> </a:t>
+            </a:r>
+            <a:r>
+              <a:rPr lang="pl-PL" sz="1800" dirty="0" err="1" smtClean="0"/>
+              <a:t>it</a:t>
+            </a:r>
+            <a:r>
+              <a:rPr lang="pl-PL" sz="1800" dirty="0" smtClean="0"/>
+              <a:t> with </a:t>
+            </a:r>
+            <a:r>
+              <a:rPr lang="pl-PL" sz="1800" b="1" dirty="0" err="1" smtClean="0"/>
+              <a:t>AppendButtonViewModel</a:t>
+            </a:r>
+            <a:r>
+              <a:rPr lang="pl-PL" sz="1800" dirty="0" smtClean="0"/>
+              <a:t> </a:t>
+            </a:r>
+            <a:r>
+              <a:rPr lang="pl-PL" sz="1800" dirty="0" err="1" smtClean="0"/>
+              <a:t>instances</a:t>
+            </a:r>
+            <a:r>
+              <a:rPr lang="pl-PL" sz="1800" dirty="0" smtClean="0"/>
+              <a:t> for </a:t>
+            </a:r>
+            <a:r>
+              <a:rPr lang="pl-PL" sz="1800" dirty="0" err="1" smtClean="0"/>
+              <a:t>digits</a:t>
+            </a:r>
+            <a:r>
+              <a:rPr lang="pl-PL" sz="1800" dirty="0" smtClean="0"/>
+              <a:t> from 1 to 9 and 0 </a:t>
+            </a:r>
+            <a:r>
+              <a:rPr lang="pl-PL" sz="1800" dirty="0" err="1" smtClean="0"/>
+              <a:t>at</a:t>
+            </a:r>
+            <a:r>
+              <a:rPr lang="pl-PL" sz="1800" dirty="0" smtClean="0"/>
+              <a:t> the end</a:t>
+            </a:r>
+            <a:endParaRPr lang="pl-PL" sz="1800" b="1" dirty="0" smtClean="0"/>
+          </a:p>
+          <a:p>
+            <a:pPr marL="285750" indent="-285750">
+              <a:buFont typeface="Arial" panose="020B0604020202020204" pitchFamily="34" charset="0"/>
+              <a:buChar char="•"/>
+            </a:pPr>
+            <a:r>
+              <a:rPr lang="pl-PL" sz="1800" dirty="0" err="1" smtClean="0"/>
+              <a:t>Add</a:t>
+            </a:r>
+            <a:r>
+              <a:rPr lang="pl-PL" sz="1800" dirty="0" smtClean="0"/>
+              <a:t> </a:t>
+            </a:r>
+            <a:r>
+              <a:rPr lang="pl-PL" sz="1800" b="1" dirty="0" err="1" smtClean="0"/>
+              <a:t>GridView</a:t>
+            </a:r>
+            <a:r>
+              <a:rPr lang="pl-PL" sz="1800" dirty="0" smtClean="0"/>
+              <a:t> to </a:t>
+            </a:r>
+            <a:r>
+              <a:rPr lang="pl-PL" sz="1800" b="1" dirty="0" err="1" smtClean="0"/>
+              <a:t>MainPage.xaml</a:t>
+            </a:r>
+            <a:r>
+              <a:rPr lang="pl-PL" sz="1800" dirty="0" smtClean="0"/>
+              <a:t> and bind </a:t>
+            </a:r>
+            <a:r>
+              <a:rPr lang="pl-PL" sz="1800" dirty="0" err="1" smtClean="0"/>
+              <a:t>its</a:t>
+            </a:r>
+            <a:r>
+              <a:rPr lang="pl-PL" sz="1800" dirty="0" smtClean="0"/>
+              <a:t> </a:t>
+            </a:r>
+            <a:r>
+              <a:rPr lang="pl-PL" sz="1800" b="1" dirty="0" err="1" smtClean="0"/>
+              <a:t>ItemsSource</a:t>
+            </a:r>
+            <a:r>
+              <a:rPr lang="pl-PL" sz="1800" dirty="0" smtClean="0"/>
+              <a:t> to </a:t>
+            </a:r>
+            <a:r>
+              <a:rPr lang="en-US" sz="1800" b="1" dirty="0" err="1" smtClean="0"/>
+              <a:t>OnScreenKeyboardButtons</a:t>
+            </a:r>
+            <a:endParaRPr lang="pl-PL" sz="1800" b="1" dirty="0" smtClean="0"/>
+          </a:p>
+          <a:p>
+            <a:pPr marL="285750" indent="-285750">
+              <a:buFont typeface="Arial" panose="020B0604020202020204" pitchFamily="34" charset="0"/>
+              <a:buChar char="•"/>
+            </a:pPr>
+            <a:r>
+              <a:rPr lang="pl-PL" sz="1800" dirty="0" smtClean="0"/>
+              <a:t>Set the </a:t>
+            </a:r>
+            <a:r>
+              <a:rPr lang="pl-PL" sz="1800" b="1" dirty="0" err="1" smtClean="0"/>
+              <a:t>ItemTemplate</a:t>
+            </a:r>
+            <a:r>
+              <a:rPr lang="pl-PL" sz="1800" dirty="0" smtClean="0"/>
+              <a:t> of </a:t>
+            </a:r>
+            <a:r>
+              <a:rPr lang="pl-PL" sz="1800" b="1" dirty="0" err="1" smtClean="0"/>
+              <a:t>GridView</a:t>
+            </a:r>
+            <a:r>
+              <a:rPr lang="pl-PL" sz="1800" dirty="0" smtClean="0"/>
+              <a:t> to </a:t>
+            </a:r>
+            <a:r>
+              <a:rPr lang="pl-PL" sz="1800" b="1" dirty="0" smtClean="0"/>
+              <a:t>Button</a:t>
+            </a:r>
+            <a:r>
+              <a:rPr lang="pl-PL" sz="1800" dirty="0" smtClean="0"/>
+              <a:t> with </a:t>
+            </a:r>
+            <a:r>
+              <a:rPr lang="pl-PL" sz="1800" b="1" dirty="0" smtClean="0"/>
+              <a:t>Content</a:t>
+            </a:r>
+            <a:r>
+              <a:rPr lang="pl-PL" sz="1800" dirty="0" smtClean="0"/>
+              <a:t> and </a:t>
+            </a:r>
+            <a:r>
+              <a:rPr lang="pl-PL" sz="1800" b="1" dirty="0" err="1" smtClean="0"/>
+              <a:t>Command</a:t>
+            </a:r>
+            <a:r>
+              <a:rPr lang="pl-PL" sz="1800" dirty="0" smtClean="0"/>
+              <a:t> </a:t>
+            </a:r>
+            <a:r>
+              <a:rPr lang="pl-PL" sz="1800" dirty="0" err="1" smtClean="0"/>
+              <a:t>binded</a:t>
+            </a:r>
+            <a:r>
+              <a:rPr lang="pl-PL" sz="1800" dirty="0" smtClean="0"/>
+              <a:t> to </a:t>
+            </a:r>
+            <a:r>
+              <a:rPr lang="pl-PL" sz="1800" b="1" dirty="0" err="1" smtClean="0"/>
+              <a:t>BaseOnScreenButtonViewModel’s</a:t>
+            </a:r>
+            <a:r>
+              <a:rPr lang="pl-PL" sz="1800" b="1" dirty="0" smtClean="0"/>
+              <a:t> </a:t>
+            </a:r>
+            <a:r>
+              <a:rPr lang="pl-PL" sz="1800" b="1" dirty="0" err="1" smtClean="0"/>
+              <a:t>Label</a:t>
+            </a:r>
+            <a:r>
+              <a:rPr lang="pl-PL" sz="1800" dirty="0" smtClean="0"/>
+              <a:t> and </a:t>
+            </a:r>
+            <a:r>
+              <a:rPr lang="pl-PL" sz="1800" b="1" dirty="0" err="1" smtClean="0"/>
+              <a:t>ExecuteCommand</a:t>
+            </a:r>
+            <a:r>
+              <a:rPr lang="pl-PL" sz="1800" dirty="0"/>
+              <a:t> </a:t>
+            </a:r>
+            <a:r>
+              <a:rPr lang="pl-PL" sz="1800" dirty="0" err="1" smtClean="0"/>
+              <a:t>properties</a:t>
+            </a:r>
+            <a:endParaRPr lang="pl-PL" sz="1800" dirty="0" smtClean="0"/>
+          </a:p>
+          <a:p>
+            <a:pPr marL="285750" indent="-285750">
+              <a:buFont typeface="Arial" panose="020B0604020202020204" pitchFamily="34" charset="0"/>
+              <a:buChar char="•"/>
+            </a:pPr>
+            <a:r>
+              <a:rPr lang="en-US" sz="1800" dirty="0" smtClean="0"/>
+              <a:t>Clean up unnecessary </a:t>
+            </a:r>
+            <a:r>
+              <a:rPr lang="pl-PL" sz="1800" dirty="0" err="1" smtClean="0"/>
+              <a:t>buttons</a:t>
+            </a:r>
+            <a:r>
+              <a:rPr lang="pl-PL" sz="1800" dirty="0" smtClean="0"/>
+              <a:t> from </a:t>
+            </a:r>
+            <a:r>
+              <a:rPr lang="pl-PL" sz="1800" b="1" dirty="0" err="1" smtClean="0"/>
+              <a:t>MainPage</a:t>
+            </a:r>
+            <a:r>
+              <a:rPr lang="pl-PL" sz="1800" dirty="0" smtClean="0"/>
+              <a:t> and </a:t>
+            </a:r>
+            <a:r>
+              <a:rPr lang="pl-PL" sz="1800" dirty="0" err="1" smtClean="0"/>
+              <a:t>commands</a:t>
+            </a:r>
+            <a:r>
+              <a:rPr lang="pl-PL" sz="1800" dirty="0" smtClean="0"/>
+              <a:t> from </a:t>
+            </a:r>
+            <a:r>
+              <a:rPr lang="pl-PL" sz="1800" b="1" dirty="0" err="1" smtClean="0"/>
+              <a:t>UnitConverterViewModel</a:t>
+            </a:r>
+            <a:endParaRPr lang="en-US" sz="1800" b="1" dirty="0"/>
+          </a:p>
+        </p:txBody>
+      </p:sp>
+      <p:sp>
+        <p:nvSpPr>
+          <p:cNvPr id="8" name="TextBox 7"/>
+          <p:cNvSpPr txBox="1"/>
+          <p:nvPr/>
+        </p:nvSpPr>
+        <p:spPr>
+          <a:xfrm>
+            <a:off x="5617414" y="1035170"/>
+            <a:ext cx="5993741" cy="400110"/>
+          </a:xfrm>
+          <a:prstGeom prst="rect">
+            <a:avLst/>
+          </a:prstGeom>
+          <a:noFill/>
+        </p:spPr>
+        <p:txBody>
+          <a:bodyPr wrap="square" rtlCol="0">
+            <a:spAutoFit/>
+          </a:bodyPr>
+          <a:lstStyle/>
+          <a:p>
+            <a:r>
+              <a:rPr lang="pl-PL" sz="2000" dirty="0" err="1" smtClean="0"/>
+              <a:t>Branch</a:t>
+            </a:r>
+            <a:r>
+              <a:rPr lang="pl-PL" sz="2000" dirty="0" smtClean="0"/>
+              <a:t> </a:t>
+            </a:r>
+            <a:r>
+              <a:rPr lang="pl-PL" sz="2000" dirty="0" err="1" smtClean="0"/>
+              <a:t>name</a:t>
+            </a:r>
+            <a:r>
+              <a:rPr lang="pl-PL" sz="2000" dirty="0" smtClean="0"/>
+              <a:t>: </a:t>
+            </a:r>
+            <a:r>
+              <a:rPr lang="pl-PL" sz="2000" b="1" dirty="0" smtClean="0"/>
+              <a:t>exercise-1.09 </a:t>
+            </a:r>
+            <a:endParaRPr lang="en-US" sz="2000" b="1" dirty="0"/>
+          </a:p>
+        </p:txBody>
+      </p:sp>
+      <p:pic>
+        <p:nvPicPr>
+          <p:cNvPr id="3" name="Picture 2"/>
+          <p:cNvPicPr>
+            <a:picLocks noChangeAspect="1"/>
+          </p:cNvPicPr>
+          <p:nvPr/>
+        </p:nvPicPr>
+        <p:blipFill>
+          <a:blip r:embed="rId2"/>
+          <a:stretch>
+            <a:fillRect/>
+          </a:stretch>
+        </p:blipFill>
+        <p:spPr>
+          <a:xfrm>
+            <a:off x="927339" y="457200"/>
+            <a:ext cx="3505200" cy="5791200"/>
+          </a:xfrm>
+          <a:prstGeom prst="rect">
+            <a:avLst/>
+          </a:prstGeom>
+        </p:spPr>
+      </p:pic>
+    </p:spTree>
+    <p:extLst>
+      <p:ext uri="{BB962C8B-B14F-4D97-AF65-F5344CB8AC3E}">
+        <p14:creationId xmlns:p14="http://schemas.microsoft.com/office/powerpoint/2010/main" val="2844153830"/>
+      </p:ext>
+    </p:extLst>
+  </p:cSld>
+  <p:clrMapOvr>
+    <a:masterClrMapping/>
+  </p:clrMapOvr>
+  <p:timing>
+    <p:tnLst>
+      <p:par>
+        <p:cTn id="1" dur="indefinite" restart="never" nodeType="tmRoot"/>
+      </p:par>
+    </p:tnLst>
+  </p:timing>
+</p:sld>
+</file>
+
 <file path=ppt/slides/slide2.xml><?xml version="1.0" encoding="utf-8"?>
 <p:sld xmlns:a="http://schemas.openxmlformats.org/drawingml/2006/main" xmlns:r="http://schemas.openxmlformats.org/officeDocument/2006/relationships" xmlns:p="http://schemas.openxmlformats.org/presentationml/2006/main">
   <p:cSld>
@@ -7098,7 +8038,7 @@
               <a:t>namespaces</a:t>
             </a:r>
             <a:r>
-              <a:rPr lang="pl-PL" sz="1800" smtClean="0"/>
+              <a:rPr lang="pl-PL" sz="1800" dirty="0" smtClean="0"/>
               <a:t>.</a:t>
             </a:r>
             <a:endParaRPr lang="en-US" sz="1800" dirty="0" smtClean="0"/>

</xml_diff>

<commit_message>
Added styling of on-screen-keyboard
</commit_message>
<xml_diff>
--- a/exercises.pptx
+++ b/exercises.pptx
@@ -16,6 +16,7 @@
     <p:sldId id="264" r:id="rId10"/>
     <p:sldId id="265" r:id="rId11"/>
     <p:sldId id="266" r:id="rId12"/>
+    <p:sldId id="267" r:id="rId13"/>
   </p:sldIdLst>
   <p:sldSz cx="12192000" cy="6858000"/>
   <p:notesSz cx="6858000" cy="9144000"/>
@@ -4870,6 +4871,447 @@
 </p:sld>
 </file>
 
+<file path=ppt/slides/slide12.xml><?xml version="1.0" encoding="utf-8"?>
+<p:sld xmlns:a="http://schemas.openxmlformats.org/drawingml/2006/main" xmlns:r="http://schemas.openxmlformats.org/officeDocument/2006/relationships" xmlns:p="http://schemas.openxmlformats.org/presentationml/2006/main">
+  <p:cSld>
+    <p:spTree>
+      <p:nvGrpSpPr>
+        <p:cNvPr id="1" name=""/>
+        <p:cNvGrpSpPr/>
+        <p:nvPr/>
+      </p:nvGrpSpPr>
+      <p:grpSpPr>
+        <a:xfrm>
+          <a:off x="0" y="0"/>
+          <a:ext cx="0" cy="0"/>
+          <a:chOff x="0" y="0"/>
+          <a:chExt cx="0" cy="0"/>
+        </a:xfrm>
+      </p:grpSpPr>
+      <p:sp>
+        <p:nvSpPr>
+          <p:cNvPr id="2" name="Title 1"/>
+          <p:cNvSpPr>
+            <a:spLocks noGrp="1"/>
+          </p:cNvSpPr>
+          <p:nvPr>
+            <p:ph type="title"/>
+          </p:nvPr>
+        </p:nvSpPr>
+        <p:spPr>
+          <a:xfrm>
+            <a:off x="5617414" y="457200"/>
+            <a:ext cx="3932237" cy="577970"/>
+          </a:xfrm>
+        </p:spPr>
+        <p:txBody>
+          <a:bodyPr>
+            <a:normAutofit fontScale="90000"/>
+          </a:bodyPr>
+          <a:lstStyle/>
+          <a:p>
+            <a:r>
+              <a:rPr lang="pl-PL" dirty="0" err="1" smtClean="0"/>
+              <a:t>Exercise</a:t>
+            </a:r>
+            <a:r>
+              <a:rPr lang="pl-PL" dirty="0" smtClean="0"/>
+              <a:t> 1.11</a:t>
+            </a:r>
+            <a:endParaRPr lang="en-US" dirty="0"/>
+          </a:p>
+        </p:txBody>
+      </p:sp>
+      <p:sp>
+        <p:nvSpPr>
+          <p:cNvPr id="4" name="Text Placeholder 3"/>
+          <p:cNvSpPr>
+            <a:spLocks noGrp="1"/>
+          </p:cNvSpPr>
+          <p:nvPr>
+            <p:ph type="body" sz="half" idx="2"/>
+          </p:nvPr>
+        </p:nvSpPr>
+        <p:spPr>
+          <a:xfrm>
+            <a:off x="5617414" y="1613140"/>
+            <a:ext cx="5993741" cy="4701396"/>
+          </a:xfrm>
+        </p:spPr>
+        <p:txBody>
+          <a:bodyPr>
+            <a:normAutofit/>
+          </a:bodyPr>
+          <a:lstStyle/>
+          <a:p>
+            <a:pPr marL="285750" indent="-285750">
+              <a:buFont typeface="Arial" panose="020B0604020202020204" pitchFamily="34" charset="0"/>
+              <a:buChar char="•"/>
+            </a:pPr>
+            <a:r>
+              <a:rPr lang="pl-PL" sz="1800" dirty="0" err="1" smtClean="0"/>
+              <a:t>Make</a:t>
+            </a:r>
+            <a:r>
+              <a:rPr lang="pl-PL" sz="1800" dirty="0" smtClean="0"/>
+              <a:t> the </a:t>
+            </a:r>
+            <a:r>
+              <a:rPr lang="pl-PL" sz="1800" dirty="0" err="1" smtClean="0"/>
+              <a:t>screen</a:t>
+            </a:r>
+            <a:r>
+              <a:rPr lang="pl-PL" sz="1800" dirty="0" smtClean="0"/>
+              <a:t> </a:t>
+            </a:r>
+            <a:r>
+              <a:rPr lang="pl-PL" sz="1800" dirty="0" err="1" smtClean="0"/>
+              <a:t>looks</a:t>
+            </a:r>
+            <a:r>
+              <a:rPr lang="pl-PL" sz="1800" dirty="0" smtClean="0"/>
+              <a:t> </a:t>
+            </a:r>
+            <a:r>
+              <a:rPr lang="pl-PL" sz="1800" dirty="0" err="1" smtClean="0"/>
+              <a:t>like</a:t>
+            </a:r>
+            <a:r>
+              <a:rPr lang="pl-PL" sz="1800" dirty="0" smtClean="0"/>
+              <a:t> </a:t>
+            </a:r>
+            <a:r>
+              <a:rPr lang="pl-PL" sz="1800" dirty="0" err="1" smtClean="0"/>
+              <a:t>this</a:t>
+            </a:r>
+            <a:endParaRPr lang="pl-PL" sz="1800" dirty="0" smtClean="0"/>
+          </a:p>
+          <a:p>
+            <a:pPr marL="285750" indent="-285750">
+              <a:buFont typeface="Arial" panose="020B0604020202020204" pitchFamily="34" charset="0"/>
+              <a:buChar char="•"/>
+            </a:pPr>
+            <a:r>
+              <a:rPr lang="pl-PL" sz="1800" dirty="0" err="1" smtClean="0"/>
+              <a:t>Digit</a:t>
+            </a:r>
+            <a:r>
+              <a:rPr lang="pl-PL" sz="1800" dirty="0" smtClean="0"/>
+              <a:t> </a:t>
+            </a:r>
+            <a:r>
+              <a:rPr lang="pl-PL" sz="1800" dirty="0" err="1" smtClean="0"/>
+              <a:t>buttons</a:t>
+            </a:r>
+            <a:r>
+              <a:rPr lang="pl-PL" sz="1800" dirty="0" smtClean="0"/>
+              <a:t> </a:t>
+            </a:r>
+            <a:r>
+              <a:rPr lang="pl-PL" sz="1800" dirty="0" err="1" smtClean="0"/>
+              <a:t>should</a:t>
+            </a:r>
+            <a:r>
+              <a:rPr lang="pl-PL" sz="1800" dirty="0" smtClean="0"/>
+              <a:t> </a:t>
+            </a:r>
+            <a:r>
+              <a:rPr lang="pl-PL" sz="1800" dirty="0" err="1" smtClean="0"/>
+              <a:t>have</a:t>
+            </a:r>
+            <a:r>
+              <a:rPr lang="pl-PL" sz="1800" dirty="0" smtClean="0"/>
+              <a:t> </a:t>
+            </a:r>
+            <a:r>
+              <a:rPr lang="pl-PL" sz="1800" dirty="0" err="1" smtClean="0"/>
+              <a:t>size</a:t>
+            </a:r>
+            <a:r>
+              <a:rPr lang="pl-PL" sz="1800" dirty="0" smtClean="0"/>
+              <a:t> 80x80 </a:t>
+            </a:r>
+            <a:r>
+              <a:rPr lang="pl-PL" sz="1800" dirty="0" err="1" smtClean="0"/>
+              <a:t>pixels</a:t>
+            </a:r>
+            <a:endParaRPr lang="pl-PL" sz="1800" dirty="0"/>
+          </a:p>
+          <a:p>
+            <a:pPr marL="285750" indent="-285750">
+              <a:buFont typeface="Arial" panose="020B0604020202020204" pitchFamily="34" charset="0"/>
+              <a:buChar char="•"/>
+            </a:pPr>
+            <a:r>
+              <a:rPr lang="pl-PL" sz="1800" dirty="0" err="1" smtClean="0"/>
+              <a:t>Digits</a:t>
+            </a:r>
+            <a:r>
+              <a:rPr lang="pl-PL" sz="1800" dirty="0" smtClean="0"/>
+              <a:t> </a:t>
+            </a:r>
+            <a:r>
+              <a:rPr lang="pl-PL" sz="1800" dirty="0" err="1" smtClean="0"/>
+              <a:t>should</a:t>
+            </a:r>
+            <a:r>
+              <a:rPr lang="pl-PL" sz="1800" dirty="0" smtClean="0"/>
+              <a:t> be </a:t>
+            </a:r>
+            <a:r>
+              <a:rPr lang="pl-PL" sz="1800" dirty="0" err="1" smtClean="0"/>
+              <a:t>centered</a:t>
+            </a:r>
+            <a:r>
+              <a:rPr lang="pl-PL" sz="1800" dirty="0" smtClean="0"/>
+              <a:t> in buton</a:t>
+            </a:r>
+          </a:p>
+          <a:p>
+            <a:pPr marL="285750" indent="-285750">
+              <a:buFont typeface="Arial" panose="020B0604020202020204" pitchFamily="34" charset="0"/>
+              <a:buChar char="•"/>
+            </a:pPr>
+            <a:r>
+              <a:rPr lang="pl-PL" sz="1800" dirty="0" err="1" smtClean="0"/>
+              <a:t>Whole</a:t>
+            </a:r>
+            <a:r>
+              <a:rPr lang="pl-PL" sz="1800" dirty="0" smtClean="0"/>
+              <a:t> </a:t>
+            </a:r>
+            <a:r>
+              <a:rPr lang="pl-PL" sz="1800" dirty="0" err="1" smtClean="0"/>
+              <a:t>area</a:t>
+            </a:r>
+            <a:r>
+              <a:rPr lang="pl-PL" sz="1800" dirty="0" smtClean="0"/>
+              <a:t> </a:t>
+            </a:r>
+            <a:r>
+              <a:rPr lang="pl-PL" sz="1800" dirty="0" err="1" smtClean="0"/>
+              <a:t>should</a:t>
+            </a:r>
+            <a:r>
+              <a:rPr lang="pl-PL" sz="1800" dirty="0" smtClean="0"/>
+              <a:t> be </a:t>
+            </a:r>
+            <a:r>
+              <a:rPr lang="pl-PL" sz="1800" dirty="0" err="1" smtClean="0"/>
+              <a:t>clickable</a:t>
+            </a:r>
+            <a:endParaRPr lang="pl-PL" sz="1800" dirty="0" smtClean="0"/>
+          </a:p>
+          <a:p>
+            <a:pPr marL="285750" indent="-285750">
+              <a:buFont typeface="Arial" panose="020B0604020202020204" pitchFamily="34" charset="0"/>
+              <a:buChar char="•"/>
+            </a:pPr>
+            <a:r>
+              <a:rPr lang="pl-PL" sz="1800" dirty="0" err="1" smtClean="0"/>
+              <a:t>There</a:t>
+            </a:r>
+            <a:r>
+              <a:rPr lang="pl-PL" sz="1800" dirty="0" smtClean="0"/>
+              <a:t> </a:t>
+            </a:r>
+            <a:r>
+              <a:rPr lang="pl-PL" sz="1800" dirty="0" err="1" smtClean="0"/>
+              <a:t>should</a:t>
+            </a:r>
+            <a:r>
+              <a:rPr lang="pl-PL" sz="1800" dirty="0" smtClean="0"/>
+              <a:t> be no </a:t>
+            </a:r>
+            <a:r>
+              <a:rPr lang="pl-PL" sz="1800" dirty="0" err="1" smtClean="0"/>
+              <a:t>black</a:t>
+            </a:r>
+            <a:r>
+              <a:rPr lang="pl-PL" sz="1800" dirty="0" smtClean="0"/>
+              <a:t> </a:t>
+            </a:r>
+            <a:r>
+              <a:rPr lang="pl-PL" sz="1800" dirty="0" err="1" smtClean="0"/>
+              <a:t>space</a:t>
+            </a:r>
+            <a:r>
+              <a:rPr lang="pl-PL" sz="1800" dirty="0" smtClean="0"/>
+              <a:t> </a:t>
+            </a:r>
+            <a:r>
+              <a:rPr lang="pl-PL" sz="1800" dirty="0" err="1" smtClean="0"/>
+              <a:t>around</a:t>
+            </a:r>
+            <a:r>
+              <a:rPr lang="pl-PL" sz="1800" dirty="0" smtClean="0"/>
+              <a:t> the </a:t>
+            </a:r>
+            <a:r>
+              <a:rPr lang="pl-PL" sz="1800" dirty="0" err="1" smtClean="0"/>
+              <a:t>buttons</a:t>
+            </a:r>
+            <a:endParaRPr lang="pl-PL" sz="1800" dirty="0" smtClean="0"/>
+          </a:p>
+          <a:p>
+            <a:pPr marL="285750" indent="-285750">
+              <a:buFont typeface="Arial" panose="020B0604020202020204" pitchFamily="34" charset="0"/>
+              <a:buChar char="•"/>
+            </a:pPr>
+            <a:r>
+              <a:rPr lang="pl-PL" sz="1800" dirty="0" smtClean="0"/>
+              <a:t>HINT: </a:t>
+            </a:r>
+            <a:r>
+              <a:rPr lang="pl-PL" sz="1800" dirty="0" err="1" smtClean="0"/>
+              <a:t>this</a:t>
+            </a:r>
+            <a:r>
+              <a:rPr lang="pl-PL" sz="1800" dirty="0" smtClean="0"/>
+              <a:t> </a:t>
+            </a:r>
+            <a:r>
+              <a:rPr lang="pl-PL" sz="1800" dirty="0" err="1" smtClean="0"/>
+              <a:t>should</a:t>
+            </a:r>
+            <a:r>
+              <a:rPr lang="pl-PL" sz="1800" dirty="0" smtClean="0"/>
+              <a:t> be </a:t>
+            </a:r>
+            <a:r>
+              <a:rPr lang="pl-PL" sz="1800" dirty="0" err="1" smtClean="0"/>
+              <a:t>doable</a:t>
+            </a:r>
+            <a:r>
+              <a:rPr lang="pl-PL" sz="1800" dirty="0" smtClean="0"/>
+              <a:t> by </a:t>
+            </a:r>
+            <a:r>
+              <a:rPr lang="pl-PL" sz="1800" dirty="0" err="1" smtClean="0"/>
+              <a:t>setting</a:t>
+            </a:r>
+            <a:r>
+              <a:rPr lang="pl-PL" sz="1800" dirty="0" smtClean="0"/>
+              <a:t> </a:t>
+            </a:r>
+            <a:r>
+              <a:rPr lang="pl-PL" sz="1800" dirty="0" err="1" smtClean="0"/>
+              <a:t>some</a:t>
+            </a:r>
+            <a:r>
+              <a:rPr lang="pl-PL" sz="1800" dirty="0" smtClean="0"/>
+              <a:t> style on </a:t>
+            </a:r>
+            <a:r>
+              <a:rPr lang="pl-PL" sz="1800" dirty="0" err="1" smtClean="0"/>
+              <a:t>buttons</a:t>
+            </a:r>
+            <a:r>
+              <a:rPr lang="pl-PL" sz="1800" dirty="0" smtClean="0"/>
+              <a:t> and &lt;</a:t>
+            </a:r>
+            <a:r>
+              <a:rPr lang="pl-PL" sz="1800" dirty="0" err="1" smtClean="0"/>
+              <a:t>GridView.ItemContainerStyle</a:t>
+            </a:r>
+            <a:r>
+              <a:rPr lang="pl-PL" sz="1800" smtClean="0"/>
+              <a:t>&gt; </a:t>
+            </a:r>
+            <a:endParaRPr lang="en-US" sz="1800" dirty="0"/>
+          </a:p>
+        </p:txBody>
+      </p:sp>
+      <p:sp>
+        <p:nvSpPr>
+          <p:cNvPr id="8" name="TextBox 7"/>
+          <p:cNvSpPr txBox="1"/>
+          <p:nvPr/>
+        </p:nvSpPr>
+        <p:spPr>
+          <a:xfrm>
+            <a:off x="5617414" y="1035170"/>
+            <a:ext cx="5993741" cy="400110"/>
+          </a:xfrm>
+          <a:prstGeom prst="rect">
+            <a:avLst/>
+          </a:prstGeom>
+          <a:noFill/>
+        </p:spPr>
+        <p:txBody>
+          <a:bodyPr wrap="square" rtlCol="0">
+            <a:spAutoFit/>
+          </a:bodyPr>
+          <a:lstStyle/>
+          <a:p>
+            <a:r>
+              <a:rPr lang="pl-PL" sz="2000" dirty="0" err="1" smtClean="0"/>
+              <a:t>Branch</a:t>
+            </a:r>
+            <a:r>
+              <a:rPr lang="pl-PL" sz="2000" dirty="0" smtClean="0"/>
+              <a:t> </a:t>
+            </a:r>
+            <a:r>
+              <a:rPr lang="pl-PL" sz="2000" dirty="0" err="1" smtClean="0"/>
+              <a:t>name</a:t>
+            </a:r>
+            <a:r>
+              <a:rPr lang="pl-PL" sz="2000" dirty="0" smtClean="0"/>
+              <a:t>: </a:t>
+            </a:r>
+            <a:r>
+              <a:rPr lang="pl-PL" sz="2000" b="1" dirty="0" smtClean="0"/>
+              <a:t>exercise-1.10 </a:t>
+            </a:r>
+            <a:endParaRPr lang="en-US" sz="2000" b="1" dirty="0"/>
+          </a:p>
+        </p:txBody>
+      </p:sp>
+      <p:pic>
+        <p:nvPicPr>
+          <p:cNvPr id="6" name="Picture 5"/>
+          <p:cNvPicPr>
+            <a:picLocks noChangeAspect="1"/>
+          </p:cNvPicPr>
+          <p:nvPr/>
+        </p:nvPicPr>
+        <p:blipFill>
+          <a:blip r:embed="rId2"/>
+          <a:stretch>
+            <a:fillRect/>
+          </a:stretch>
+        </p:blipFill>
+        <p:spPr>
+          <a:xfrm>
+            <a:off x="926261" y="457200"/>
+            <a:ext cx="3162300" cy="5772150"/>
+          </a:xfrm>
+          <a:prstGeom prst="rect">
+            <a:avLst/>
+          </a:prstGeom>
+        </p:spPr>
+      </p:pic>
+    </p:spTree>
+    <p:extLst>
+      <p:ext uri="{BB962C8B-B14F-4D97-AF65-F5344CB8AC3E}">
+        <p14:creationId xmlns:p14="http://schemas.microsoft.com/office/powerpoint/2010/main" val="237554559"/>
+      </p:ext>
+    </p:extLst>
+  </p:cSld>
+  <p:clrMapOvr>
+    <a:masterClrMapping/>
+  </p:clrMapOvr>
+  <p:timing>
+    <p:tnLst>
+      <p:par>
+        <p:cTn id="1" dur="indefinite" restart="never" nodeType="tmRoot"/>
+      </p:par>
+    </p:tnLst>
+  </p:timing>
+</p:sld>
+</file>
+
 <file path=ppt/slides/slide2.xml><?xml version="1.0" encoding="utf-8"?>
 <p:sld xmlns:a="http://schemas.openxmlformats.org/drawingml/2006/main" xmlns:r="http://schemas.openxmlformats.org/officeDocument/2006/relationships" xmlns:p="http://schemas.openxmlformats.org/presentationml/2006/main">
   <p:cSld>

</xml_diff>

<commit_message>
Added backspace and clear buttons class
</commit_message>
<xml_diff>
--- a/exercises.pptx
+++ b/exercises.pptx
@@ -17,6 +17,7 @@
     <p:sldId id="265" r:id="rId11"/>
     <p:sldId id="266" r:id="rId12"/>
     <p:sldId id="267" r:id="rId13"/>
+    <p:sldId id="268" r:id="rId14"/>
   </p:sldIdLst>
   <p:sldSz cx="12192000" cy="6858000"/>
   <p:notesSz cx="6858000" cy="9144000"/>
@@ -5215,7 +5216,7 @@
               <a:t>GridView.ItemContainerStyle</a:t>
             </a:r>
             <a:r>
-              <a:rPr lang="pl-PL" sz="1800" smtClean="0"/>
+              <a:rPr lang="pl-PL" sz="1800" dirty="0" smtClean="0"/>
               <a:t>&gt; </a:t>
             </a:r>
             <a:endParaRPr lang="en-US" sz="1800" dirty="0"/>
@@ -5296,6 +5297,451 @@
     <p:extLst>
       <p:ext uri="{BB962C8B-B14F-4D97-AF65-F5344CB8AC3E}">
         <p14:creationId xmlns:p14="http://schemas.microsoft.com/office/powerpoint/2010/main" val="237554559"/>
+      </p:ext>
+    </p:extLst>
+  </p:cSld>
+  <p:clrMapOvr>
+    <a:masterClrMapping/>
+  </p:clrMapOvr>
+  <p:timing>
+    <p:tnLst>
+      <p:par>
+        <p:cTn id="1" dur="indefinite" restart="never" nodeType="tmRoot"/>
+      </p:par>
+    </p:tnLst>
+  </p:timing>
+</p:sld>
+</file>
+
+<file path=ppt/slides/slide13.xml><?xml version="1.0" encoding="utf-8"?>
+<p:sld xmlns:a="http://schemas.openxmlformats.org/drawingml/2006/main" xmlns:r="http://schemas.openxmlformats.org/officeDocument/2006/relationships" xmlns:p="http://schemas.openxmlformats.org/presentationml/2006/main">
+  <p:cSld>
+    <p:spTree>
+      <p:nvGrpSpPr>
+        <p:cNvPr id="1" name=""/>
+        <p:cNvGrpSpPr/>
+        <p:nvPr/>
+      </p:nvGrpSpPr>
+      <p:grpSpPr>
+        <a:xfrm>
+          <a:off x="0" y="0"/>
+          <a:ext cx="0" cy="0"/>
+          <a:chOff x="0" y="0"/>
+          <a:chExt cx="0" cy="0"/>
+        </a:xfrm>
+      </p:grpSpPr>
+      <p:sp>
+        <p:nvSpPr>
+          <p:cNvPr id="2" name="Title 1"/>
+          <p:cNvSpPr>
+            <a:spLocks noGrp="1"/>
+          </p:cNvSpPr>
+          <p:nvPr>
+            <p:ph type="title"/>
+          </p:nvPr>
+        </p:nvSpPr>
+        <p:spPr>
+          <a:xfrm>
+            <a:off x="5617414" y="457200"/>
+            <a:ext cx="3932237" cy="577970"/>
+          </a:xfrm>
+        </p:spPr>
+        <p:txBody>
+          <a:bodyPr>
+            <a:normAutofit fontScale="90000"/>
+          </a:bodyPr>
+          <a:lstStyle/>
+          <a:p>
+            <a:r>
+              <a:rPr lang="pl-PL" dirty="0" err="1" smtClean="0"/>
+              <a:t>Exercise</a:t>
+            </a:r>
+            <a:r>
+              <a:rPr lang="pl-PL" dirty="0" smtClean="0"/>
+              <a:t> 1.12</a:t>
+            </a:r>
+            <a:endParaRPr lang="en-US" dirty="0"/>
+          </a:p>
+        </p:txBody>
+      </p:sp>
+      <p:sp>
+        <p:nvSpPr>
+          <p:cNvPr id="4" name="Text Placeholder 3"/>
+          <p:cNvSpPr>
+            <a:spLocks noGrp="1"/>
+          </p:cNvSpPr>
+          <p:nvPr>
+            <p:ph type="body" sz="half" idx="2"/>
+          </p:nvPr>
+        </p:nvSpPr>
+        <p:spPr>
+          <a:xfrm>
+            <a:off x="5617414" y="1613140"/>
+            <a:ext cx="5993741" cy="4701396"/>
+          </a:xfrm>
+        </p:spPr>
+        <p:txBody>
+          <a:bodyPr>
+            <a:normAutofit/>
+          </a:bodyPr>
+          <a:lstStyle/>
+          <a:p>
+            <a:pPr marL="285750" indent="-285750">
+              <a:buFont typeface="Arial" panose="020B0604020202020204" pitchFamily="34" charset="0"/>
+              <a:buChar char="•"/>
+            </a:pPr>
+            <a:r>
+              <a:rPr lang="pl-PL" sz="1800" dirty="0" err="1" smtClean="0"/>
+              <a:t>Add</a:t>
+            </a:r>
+            <a:r>
+              <a:rPr lang="pl-PL" sz="1800" dirty="0" smtClean="0"/>
+              <a:t> </a:t>
+            </a:r>
+            <a:r>
+              <a:rPr lang="en-US" sz="1800" b="1" dirty="0" err="1" smtClean="0"/>
+              <a:t>BaseNonEmptyEntryValueButtonViewModel</a:t>
+            </a:r>
+            <a:r>
+              <a:rPr lang="pl-PL" sz="1800" dirty="0" smtClean="0"/>
+              <a:t> </a:t>
+            </a:r>
+            <a:r>
+              <a:rPr lang="pl-PL" sz="1800" dirty="0" err="1" smtClean="0"/>
+              <a:t>abstract</a:t>
+            </a:r>
+            <a:r>
+              <a:rPr lang="pl-PL" sz="1800" dirty="0" smtClean="0"/>
+              <a:t> </a:t>
+            </a:r>
+            <a:r>
+              <a:rPr lang="pl-PL" sz="1800" dirty="0" err="1" smtClean="0"/>
+              <a:t>class</a:t>
+            </a:r>
+            <a:r>
+              <a:rPr lang="pl-PL" sz="1800" dirty="0" smtClean="0"/>
+              <a:t> </a:t>
+            </a:r>
+            <a:r>
+              <a:rPr lang="pl-PL" sz="1800" dirty="0" err="1" smtClean="0"/>
+              <a:t>that</a:t>
+            </a:r>
+            <a:r>
+              <a:rPr lang="pl-PL" sz="1800" dirty="0" smtClean="0"/>
+              <a:t> </a:t>
+            </a:r>
+            <a:r>
+              <a:rPr lang="pl-PL" sz="1800" dirty="0" err="1" smtClean="0"/>
+              <a:t>will</a:t>
+            </a:r>
+            <a:r>
+              <a:rPr lang="pl-PL" sz="1800" dirty="0" smtClean="0"/>
+              <a:t> </a:t>
+            </a:r>
+            <a:r>
+              <a:rPr lang="pl-PL" sz="1800" dirty="0" err="1" smtClean="0"/>
+              <a:t>listen</a:t>
+            </a:r>
+            <a:r>
+              <a:rPr lang="pl-PL" sz="1800" dirty="0" smtClean="0"/>
+              <a:t> </a:t>
+            </a:r>
+            <a:r>
+              <a:rPr lang="pl-PL" sz="1800" dirty="0" err="1" smtClean="0"/>
+              <a:t>if</a:t>
+            </a:r>
+            <a:r>
+              <a:rPr lang="pl-PL" sz="1800" dirty="0" smtClean="0"/>
+              <a:t> </a:t>
+            </a:r>
+            <a:r>
+              <a:rPr lang="pl-PL" sz="1800" dirty="0" err="1" smtClean="0"/>
+              <a:t>parent’s</a:t>
+            </a:r>
+            <a:r>
+              <a:rPr lang="pl-PL" sz="1800" dirty="0" smtClean="0"/>
+              <a:t> </a:t>
+            </a:r>
+            <a:r>
+              <a:rPr lang="pl-PL" sz="1800" dirty="0" err="1" smtClean="0"/>
+              <a:t>EntryValue</a:t>
+            </a:r>
+            <a:r>
+              <a:rPr lang="pl-PL" sz="1800" dirty="0" smtClean="0"/>
+              <a:t> </a:t>
+            </a:r>
+            <a:r>
+              <a:rPr lang="pl-PL" sz="1800" dirty="0" err="1" smtClean="0"/>
+              <a:t>is</a:t>
+            </a:r>
+            <a:r>
+              <a:rPr lang="pl-PL" sz="1800" dirty="0" smtClean="0"/>
+              <a:t> not </a:t>
+            </a:r>
+            <a:r>
+              <a:rPr lang="pl-PL" sz="1800" dirty="0" err="1" smtClean="0"/>
+              <a:t>empty</a:t>
+            </a:r>
+            <a:r>
+              <a:rPr lang="pl-PL" sz="1800" dirty="0" smtClean="0"/>
+              <a:t> and </a:t>
+            </a:r>
+            <a:r>
+              <a:rPr lang="pl-PL" sz="1800" dirty="0" err="1" smtClean="0"/>
+              <a:t>override</a:t>
+            </a:r>
+            <a:r>
+              <a:rPr lang="pl-PL" sz="1800" dirty="0" smtClean="0"/>
+              <a:t> </a:t>
+            </a:r>
+            <a:r>
+              <a:rPr lang="pl-PL" sz="1800" dirty="0" err="1" smtClean="0"/>
+              <a:t>CanExecute</a:t>
+            </a:r>
+            <a:r>
+              <a:rPr lang="pl-PL" sz="1800" dirty="0" smtClean="0"/>
+              <a:t> </a:t>
+            </a:r>
+            <a:r>
+              <a:rPr lang="pl-PL" sz="1800" dirty="0" err="1" smtClean="0"/>
+              <a:t>properly</a:t>
+            </a:r>
+            <a:endParaRPr lang="pl-PL" sz="1800" dirty="0" smtClean="0"/>
+          </a:p>
+          <a:p>
+            <a:pPr marL="285750" indent="-285750">
+              <a:buFont typeface="Arial" panose="020B0604020202020204" pitchFamily="34" charset="0"/>
+              <a:buChar char="•"/>
+            </a:pPr>
+            <a:r>
+              <a:rPr lang="pl-PL" sz="1800" dirty="0" err="1" smtClean="0"/>
+              <a:t>Add</a:t>
+            </a:r>
+            <a:r>
+              <a:rPr lang="pl-PL" sz="1800" dirty="0" smtClean="0"/>
+              <a:t> </a:t>
+            </a:r>
+            <a:r>
+              <a:rPr lang="pl-PL" sz="1800" b="1" dirty="0" err="1" smtClean="0"/>
+              <a:t>BackspaceOnScreenButtonViewModel</a:t>
+            </a:r>
+            <a:r>
+              <a:rPr lang="pl-PL" sz="1800" dirty="0" smtClean="0"/>
+              <a:t> and </a:t>
+            </a:r>
+            <a:r>
+              <a:rPr lang="pl-PL" sz="1800" b="1" dirty="0" err="1" smtClean="0"/>
+              <a:t>ClearOnScreenButtonViewModel</a:t>
+            </a:r>
+            <a:r>
+              <a:rPr lang="pl-PL" sz="1800" dirty="0" smtClean="0"/>
+              <a:t> </a:t>
+            </a:r>
+            <a:r>
+              <a:rPr lang="pl-PL" sz="1800" dirty="0" err="1" smtClean="0"/>
+              <a:t>that</a:t>
+            </a:r>
+            <a:r>
+              <a:rPr lang="pl-PL" sz="1800" dirty="0" smtClean="0"/>
+              <a:t> </a:t>
+            </a:r>
+            <a:r>
+              <a:rPr lang="pl-PL" sz="1800" dirty="0" err="1" smtClean="0"/>
+              <a:t>will</a:t>
+            </a:r>
+            <a:r>
+              <a:rPr lang="pl-PL" sz="1800" dirty="0" smtClean="0"/>
+              <a:t> </a:t>
+            </a:r>
+            <a:r>
+              <a:rPr lang="pl-PL" sz="1800" dirty="0" err="1" smtClean="0"/>
+              <a:t>extend</a:t>
+            </a:r>
+            <a:r>
+              <a:rPr lang="pl-PL" sz="1800" dirty="0" smtClean="0"/>
+              <a:t> </a:t>
+            </a:r>
+            <a:r>
+              <a:rPr lang="pl-PL" sz="1800" dirty="0" err="1" smtClean="0"/>
+              <a:t>previously</a:t>
+            </a:r>
+            <a:r>
+              <a:rPr lang="pl-PL" sz="1800" dirty="0" smtClean="0"/>
+              <a:t> </a:t>
+            </a:r>
+            <a:r>
+              <a:rPr lang="pl-PL" sz="1800" dirty="0" err="1" smtClean="0"/>
+              <a:t>created</a:t>
+            </a:r>
+            <a:r>
+              <a:rPr lang="pl-PL" sz="1800" dirty="0" smtClean="0"/>
+              <a:t> </a:t>
+            </a:r>
+            <a:r>
+              <a:rPr lang="pl-PL" sz="1800" dirty="0" err="1" smtClean="0"/>
+              <a:t>class</a:t>
+            </a:r>
+            <a:endParaRPr lang="pl-PL" sz="1800" dirty="0" smtClean="0"/>
+          </a:p>
+          <a:p>
+            <a:pPr marL="285750" indent="-285750">
+              <a:buFont typeface="Arial" panose="020B0604020202020204" pitchFamily="34" charset="0"/>
+              <a:buChar char="•"/>
+            </a:pPr>
+            <a:r>
+              <a:rPr lang="pl-PL" sz="1800" dirty="0" err="1" smtClean="0"/>
+              <a:t>Add</a:t>
+            </a:r>
+            <a:r>
+              <a:rPr lang="pl-PL" sz="1800" dirty="0" smtClean="0"/>
+              <a:t> </a:t>
+            </a:r>
+            <a:r>
+              <a:rPr lang="pl-PL" sz="1800" dirty="0" err="1" smtClean="0"/>
+              <a:t>buttons</a:t>
+            </a:r>
+            <a:r>
+              <a:rPr lang="pl-PL" sz="1800" dirty="0" smtClean="0"/>
+              <a:t> as </a:t>
+            </a:r>
+            <a:r>
+              <a:rPr lang="pl-PL" sz="1800" dirty="0" err="1" smtClean="0"/>
+              <a:t>shown</a:t>
+            </a:r>
+            <a:r>
+              <a:rPr lang="pl-PL" sz="1800" dirty="0" smtClean="0"/>
+              <a:t> in </a:t>
+            </a:r>
+            <a:r>
+              <a:rPr lang="pl-PL" sz="1800" dirty="0" err="1" smtClean="0"/>
+              <a:t>wireframes</a:t>
+            </a:r>
+            <a:r>
+              <a:rPr lang="pl-PL" sz="1800" dirty="0" smtClean="0"/>
+              <a:t>, </a:t>
+            </a:r>
+            <a:r>
+              <a:rPr lang="pl-PL" sz="1800" dirty="0" err="1" smtClean="0"/>
+              <a:t>use</a:t>
+            </a:r>
+            <a:r>
+              <a:rPr lang="pl-PL" sz="1800" dirty="0" smtClean="0"/>
+              <a:t> </a:t>
+            </a:r>
+            <a:r>
+              <a:rPr lang="pl-PL" sz="1800" dirty="0" err="1" smtClean="0"/>
+              <a:t>charmap</a:t>
+            </a:r>
+            <a:r>
+              <a:rPr lang="pl-PL" sz="1800" dirty="0" smtClean="0"/>
+              <a:t> </a:t>
+            </a:r>
+            <a:r>
+              <a:rPr lang="pl-PL" sz="1800" dirty="0" err="1" smtClean="0"/>
+              <a:t>application</a:t>
+            </a:r>
+            <a:r>
+              <a:rPr lang="pl-PL" sz="1800" dirty="0" smtClean="0"/>
+              <a:t> for </a:t>
+            </a:r>
+            <a:r>
+              <a:rPr lang="pl-PL" sz="1800" dirty="0" err="1" smtClean="0"/>
+              <a:t>backspace</a:t>
+            </a:r>
+            <a:r>
+              <a:rPr lang="pl-PL" sz="1800" dirty="0" smtClean="0"/>
+              <a:t> and </a:t>
+            </a:r>
+            <a:r>
+              <a:rPr lang="pl-PL" sz="1800" dirty="0" err="1" smtClean="0"/>
+              <a:t>clear</a:t>
+            </a:r>
+            <a:r>
+              <a:rPr lang="pl-PL" sz="1800" dirty="0" smtClean="0"/>
+              <a:t> </a:t>
+            </a:r>
+            <a:r>
+              <a:rPr lang="pl-PL" sz="1800" smtClean="0"/>
+              <a:t>buttons</a:t>
+            </a:r>
+            <a:endParaRPr lang="en-US" sz="1800" dirty="0"/>
+          </a:p>
+        </p:txBody>
+      </p:sp>
+      <p:sp>
+        <p:nvSpPr>
+          <p:cNvPr id="8" name="TextBox 7"/>
+          <p:cNvSpPr txBox="1"/>
+          <p:nvPr/>
+        </p:nvSpPr>
+        <p:spPr>
+          <a:xfrm>
+            <a:off x="5617414" y="1035170"/>
+            <a:ext cx="5993741" cy="400110"/>
+          </a:xfrm>
+          <a:prstGeom prst="rect">
+            <a:avLst/>
+          </a:prstGeom>
+          <a:noFill/>
+        </p:spPr>
+        <p:txBody>
+          <a:bodyPr wrap="square" rtlCol="0">
+            <a:spAutoFit/>
+          </a:bodyPr>
+          <a:lstStyle/>
+          <a:p>
+            <a:r>
+              <a:rPr lang="pl-PL" sz="2000" dirty="0" err="1" smtClean="0"/>
+              <a:t>Branch</a:t>
+            </a:r>
+            <a:r>
+              <a:rPr lang="pl-PL" sz="2000" dirty="0" smtClean="0"/>
+              <a:t> </a:t>
+            </a:r>
+            <a:r>
+              <a:rPr lang="pl-PL" sz="2000" dirty="0" err="1" smtClean="0"/>
+              <a:t>name</a:t>
+            </a:r>
+            <a:r>
+              <a:rPr lang="pl-PL" sz="2000" dirty="0" smtClean="0"/>
+              <a:t>: </a:t>
+            </a:r>
+            <a:r>
+              <a:rPr lang="pl-PL" sz="2000" b="1" dirty="0" smtClean="0"/>
+              <a:t>exercise-1.11</a:t>
+            </a:r>
+            <a:endParaRPr lang="en-US" sz="2000" b="1" dirty="0"/>
+          </a:p>
+        </p:txBody>
+      </p:sp>
+      <p:pic>
+        <p:nvPicPr>
+          <p:cNvPr id="3" name="Picture 2"/>
+          <p:cNvPicPr>
+            <a:picLocks noChangeAspect="1"/>
+          </p:cNvPicPr>
+          <p:nvPr/>
+        </p:nvPicPr>
+        <p:blipFill>
+          <a:blip r:embed="rId2"/>
+          <a:stretch>
+            <a:fillRect/>
+          </a:stretch>
+        </p:blipFill>
+        <p:spPr>
+          <a:xfrm>
+            <a:off x="960946" y="457200"/>
+            <a:ext cx="3524250" cy="5800725"/>
+          </a:xfrm>
+          <a:prstGeom prst="rect">
+            <a:avLst/>
+          </a:prstGeom>
+        </p:spPr>
+      </p:pic>
+    </p:spTree>
+    <p:extLst>
+      <p:ext uri="{BB962C8B-B14F-4D97-AF65-F5344CB8AC3E}">
+        <p14:creationId xmlns:p14="http://schemas.microsoft.com/office/powerpoint/2010/main" val="2785505927"/>
       </p:ext>
     </p:extLst>
   </p:cSld>

</xml_diff>

<commit_message>
Get ridded of textbox
</commit_message>
<xml_diff>
--- a/exercises.pptx
+++ b/exercises.pptx
@@ -18,6 +18,7 @@
     <p:sldId id="266" r:id="rId12"/>
     <p:sldId id="267" r:id="rId13"/>
     <p:sldId id="268" r:id="rId14"/>
+    <p:sldId id="269" r:id="rId15"/>
   </p:sldIdLst>
   <p:sldSz cx="12192000" cy="6858000"/>
   <p:notesSz cx="6858000" cy="9144000"/>
@@ -116,6 +117,11 @@
       </a:defRPr>
     </a:lvl9pPr>
   </p:defaultTextStyle>
+  <p:extLst>
+    <p:ext uri="{EFAFB233-063F-42B5-8137-9DF3F51BA10A}">
+      <p15:sldGuideLst xmlns:p15="http://schemas.microsoft.com/office/powerpoint/2012/main"/>
+    </p:ext>
+  </p:extLst>
 </p:presentation>
 </file>
 
@@ -292,7 +298,7 @@
           <a:p>
             <a:fld id="{B645AC2E-2DCA-418A-A625-BEA36C1E8A09}" type="datetimeFigureOut">
               <a:rPr lang="en-US" smtClean="0"/>
-              <a:t>4/29/2016</a:t>
+              <a:t>5/19/2016</a:t>
             </a:fld>
             <a:endParaRPr lang="en-US"/>
           </a:p>
@@ -627,7 +633,7 @@
           <a:p>
             <a:fld id="{B645AC2E-2DCA-418A-A625-BEA36C1E8A09}" type="datetimeFigureOut">
               <a:rPr lang="en-US" smtClean="0"/>
-              <a:t>4/29/2016</a:t>
+              <a:t>5/19/2016</a:t>
             </a:fld>
             <a:endParaRPr lang="en-US"/>
           </a:p>
@@ -807,7 +813,7 @@
           <a:p>
             <a:fld id="{B645AC2E-2DCA-418A-A625-BEA36C1E8A09}" type="datetimeFigureOut">
               <a:rPr lang="en-US" smtClean="0"/>
-              <a:t>4/29/2016</a:t>
+              <a:t>5/19/2016</a:t>
             </a:fld>
             <a:endParaRPr lang="en-US"/>
           </a:p>
@@ -977,7 +983,7 @@
           <a:p>
             <a:fld id="{B645AC2E-2DCA-418A-A625-BEA36C1E8A09}" type="datetimeFigureOut">
               <a:rPr lang="en-US" smtClean="0"/>
-              <a:t>4/29/2016</a:t>
+              <a:t>5/19/2016</a:t>
             </a:fld>
             <a:endParaRPr lang="en-US"/>
           </a:p>
@@ -1254,7 +1260,7 @@
           <a:p>
             <a:fld id="{B645AC2E-2DCA-418A-A625-BEA36C1E8A09}" type="datetimeFigureOut">
               <a:rPr lang="en-US" smtClean="0"/>
-              <a:t>4/29/2016</a:t>
+              <a:t>5/19/2016</a:t>
             </a:fld>
             <a:endParaRPr lang="en-US"/>
           </a:p>
@@ -1648,7 +1654,7 @@
           <a:p>
             <a:fld id="{B645AC2E-2DCA-418A-A625-BEA36C1E8A09}" type="datetimeFigureOut">
               <a:rPr lang="en-US" smtClean="0"/>
-              <a:t>4/29/2016</a:t>
+              <a:t>5/19/2016</a:t>
             </a:fld>
             <a:endParaRPr lang="en-US"/>
           </a:p>
@@ -2125,7 +2131,7 @@
           <a:p>
             <a:fld id="{B645AC2E-2DCA-418A-A625-BEA36C1E8A09}" type="datetimeFigureOut">
               <a:rPr lang="en-US" smtClean="0"/>
-              <a:t>4/29/2016</a:t>
+              <a:t>5/19/2016</a:t>
             </a:fld>
             <a:endParaRPr lang="en-US"/>
           </a:p>
@@ -2243,7 +2249,7 @@
           <a:p>
             <a:fld id="{B645AC2E-2DCA-418A-A625-BEA36C1E8A09}" type="datetimeFigureOut">
               <a:rPr lang="en-US" smtClean="0"/>
-              <a:t>4/29/2016</a:t>
+              <a:t>5/19/2016</a:t>
             </a:fld>
             <a:endParaRPr lang="en-US"/>
           </a:p>
@@ -2338,7 +2344,7 @@
           <a:p>
             <a:fld id="{B645AC2E-2DCA-418A-A625-BEA36C1E8A09}" type="datetimeFigureOut">
               <a:rPr lang="en-US" smtClean="0"/>
-              <a:t>4/29/2016</a:t>
+              <a:t>5/19/2016</a:t>
             </a:fld>
             <a:endParaRPr lang="en-US"/>
           </a:p>
@@ -2689,7 +2695,7 @@
           <a:p>
             <a:fld id="{B645AC2E-2DCA-418A-A625-BEA36C1E8A09}" type="datetimeFigureOut">
               <a:rPr lang="en-US" smtClean="0"/>
-              <a:t>4/29/2016</a:t>
+              <a:t>5/19/2016</a:t>
             </a:fld>
             <a:endParaRPr lang="en-US"/>
           </a:p>
@@ -3082,7 +3088,7 @@
           <a:p>
             <a:fld id="{B645AC2E-2DCA-418A-A625-BEA36C1E8A09}" type="datetimeFigureOut">
               <a:rPr lang="en-US" smtClean="0"/>
-              <a:t>4/29/2016</a:t>
+              <a:t>5/19/2016</a:t>
             </a:fld>
             <a:endParaRPr lang="en-US"/>
           </a:p>
@@ -3360,7 +3366,7 @@
           <a:p>
             <a:fld id="{B645AC2E-2DCA-418A-A625-BEA36C1E8A09}" type="datetimeFigureOut">
               <a:rPr lang="en-US" smtClean="0"/>
-              <a:t>4/29/2016</a:t>
+              <a:t>5/19/2016</a:t>
             </a:fld>
             <a:endParaRPr lang="en-US"/>
           </a:p>
@@ -3809,42 +3815,42 @@
   <p:extLst mod="1">
     <p:ext uri="{27BBF7A9-308A-43DC-89C8-2F10F3537804}">
       <p15:sldGuideLst xmlns:p15="http://schemas.microsoft.com/office/powerpoint/2012/main">
-        <p15:guide id="4294967295" orient="horz" pos="1368">
+        <p15:guide id="1" orient="horz" pos="1368">
           <p15:clr>
             <a:srgbClr val="F26B43"/>
           </p15:clr>
         </p15:guide>
-        <p15:guide id="4294967295" orient="horz" pos="1440">
+        <p15:guide id="2" orient="horz" pos="1440">
           <p15:clr>
             <a:srgbClr val="F26B43"/>
           </p15:clr>
         </p15:guide>
-        <p15:guide id="4294967295" orient="horz" pos="3696">
+        <p15:guide id="3" orient="horz" pos="3696">
           <p15:clr>
             <a:srgbClr val="F26B43"/>
           </p15:clr>
         </p15:guide>
-        <p15:guide id="4294967295" orient="horz" pos="432">
+        <p15:guide id="4" orient="horz" pos="432">
           <p15:clr>
             <a:srgbClr val="F26B43"/>
           </p15:clr>
         </p15:guide>
-        <p15:guide id="4294967295" orient="horz" pos="1512">
+        <p15:guide id="5" orient="horz" pos="1512">
           <p15:clr>
             <a:srgbClr val="F26B43"/>
           </p15:clr>
         </p15:guide>
-        <p15:guide id="4294967295" pos="6912">
+        <p15:guide id="6" pos="6912">
           <p15:clr>
             <a:srgbClr val="F26B43"/>
           </p15:clr>
         </p15:guide>
-        <p15:guide id="4294967295" pos="936">
+        <p15:guide id="7" pos="936">
           <p15:clr>
             <a:srgbClr val="F26B43"/>
           </p15:clr>
         </p15:guide>
-        <p15:guide id="4294967295" pos="864">
+        <p15:guide id="8" pos="864">
           <p15:clr>
             <a:srgbClr val="F26B43"/>
           </p15:clr>
@@ -5661,7 +5667,7 @@
               <a:t> </a:t>
             </a:r>
             <a:r>
-              <a:rPr lang="pl-PL" sz="1800" smtClean="0"/>
+              <a:rPr lang="pl-PL" sz="1800" dirty="0" err="1" smtClean="0"/>
               <a:t>buttons</a:t>
             </a:r>
             <a:endParaRPr lang="en-US" sz="1800" dirty="0"/>
@@ -5742,6 +5748,342 @@
     <p:extLst>
       <p:ext uri="{BB962C8B-B14F-4D97-AF65-F5344CB8AC3E}">
         <p14:creationId xmlns:p14="http://schemas.microsoft.com/office/powerpoint/2010/main" val="2785505927"/>
+      </p:ext>
+    </p:extLst>
+  </p:cSld>
+  <p:clrMapOvr>
+    <a:masterClrMapping/>
+  </p:clrMapOvr>
+  <p:timing>
+    <p:tnLst>
+      <p:par>
+        <p:cTn id="1" dur="indefinite" restart="never" nodeType="tmRoot"/>
+      </p:par>
+    </p:tnLst>
+  </p:timing>
+</p:sld>
+</file>
+
+<file path=ppt/slides/slide14.xml><?xml version="1.0" encoding="utf-8"?>
+<p:sld xmlns:a="http://schemas.openxmlformats.org/drawingml/2006/main" xmlns:r="http://schemas.openxmlformats.org/officeDocument/2006/relationships" xmlns:p="http://schemas.openxmlformats.org/presentationml/2006/main">
+  <p:cSld>
+    <p:spTree>
+      <p:nvGrpSpPr>
+        <p:cNvPr id="1" name=""/>
+        <p:cNvGrpSpPr/>
+        <p:nvPr/>
+      </p:nvGrpSpPr>
+      <p:grpSpPr>
+        <a:xfrm>
+          <a:off x="0" y="0"/>
+          <a:ext cx="0" cy="0"/>
+          <a:chOff x="0" y="0"/>
+          <a:chExt cx="0" cy="0"/>
+        </a:xfrm>
+      </p:grpSpPr>
+      <p:sp>
+        <p:nvSpPr>
+          <p:cNvPr id="2" name="Title 1"/>
+          <p:cNvSpPr>
+            <a:spLocks noGrp="1"/>
+          </p:cNvSpPr>
+          <p:nvPr>
+            <p:ph type="title"/>
+          </p:nvPr>
+        </p:nvSpPr>
+        <p:spPr>
+          <a:xfrm>
+            <a:off x="5617414" y="457200"/>
+            <a:ext cx="3932237" cy="577970"/>
+          </a:xfrm>
+        </p:spPr>
+        <p:txBody>
+          <a:bodyPr>
+            <a:normAutofit fontScale="90000"/>
+          </a:bodyPr>
+          <a:lstStyle/>
+          <a:p>
+            <a:r>
+              <a:rPr lang="pl-PL" dirty="0" err="1" smtClean="0"/>
+              <a:t>Exercise</a:t>
+            </a:r>
+            <a:r>
+              <a:rPr lang="pl-PL" dirty="0" smtClean="0"/>
+              <a:t> </a:t>
+            </a:r>
+            <a:r>
+              <a:rPr lang="pl-PL" dirty="0" smtClean="0"/>
+              <a:t>1.13</a:t>
+            </a:r>
+            <a:endParaRPr lang="en-US" dirty="0"/>
+          </a:p>
+        </p:txBody>
+      </p:sp>
+      <p:sp>
+        <p:nvSpPr>
+          <p:cNvPr id="4" name="Text Placeholder 3"/>
+          <p:cNvSpPr>
+            <a:spLocks noGrp="1"/>
+          </p:cNvSpPr>
+          <p:nvPr>
+            <p:ph type="body" sz="half" idx="2"/>
+          </p:nvPr>
+        </p:nvSpPr>
+        <p:spPr>
+          <a:xfrm>
+            <a:off x="5617414" y="1613140"/>
+            <a:ext cx="5993741" cy="4701396"/>
+          </a:xfrm>
+        </p:spPr>
+        <p:txBody>
+          <a:bodyPr>
+            <a:normAutofit/>
+          </a:bodyPr>
+          <a:lstStyle/>
+          <a:p>
+            <a:pPr marL="285750" indent="-285750">
+              <a:buFont typeface="Arial" panose="020B0604020202020204" pitchFamily="34" charset="0"/>
+              <a:buChar char="•"/>
+            </a:pPr>
+            <a:r>
+              <a:rPr lang="pl-PL" sz="1800" dirty="0" err="1" smtClean="0"/>
+              <a:t>Change</a:t>
+            </a:r>
+            <a:r>
+              <a:rPr lang="pl-PL" sz="1800" dirty="0" smtClean="0"/>
+              <a:t> the </a:t>
+            </a:r>
+            <a:r>
+              <a:rPr lang="pl-PL" sz="1800" dirty="0" err="1" smtClean="0"/>
+              <a:t>entry</a:t>
+            </a:r>
+            <a:r>
+              <a:rPr lang="pl-PL" sz="1800" dirty="0" smtClean="0"/>
+              <a:t> </a:t>
+            </a:r>
+            <a:r>
+              <a:rPr lang="pl-PL" sz="1800" b="1" dirty="0" err="1" smtClean="0"/>
+              <a:t>TextBox</a:t>
+            </a:r>
+            <a:r>
+              <a:rPr lang="pl-PL" sz="1800" dirty="0" smtClean="0"/>
+              <a:t> to </a:t>
+            </a:r>
+            <a:r>
+              <a:rPr lang="pl-PL" sz="1800" b="1" dirty="0" err="1" smtClean="0"/>
+              <a:t>TextBlock</a:t>
+            </a:r>
+            <a:endParaRPr lang="pl-PL" sz="1800" b="1" dirty="0" smtClean="0"/>
+          </a:p>
+          <a:p>
+            <a:pPr marL="285750" indent="-285750">
+              <a:buFont typeface="Arial" panose="020B0604020202020204" pitchFamily="34" charset="0"/>
+              <a:buChar char="•"/>
+            </a:pPr>
+            <a:r>
+              <a:rPr lang="pl-PL" sz="1800" dirty="0" err="1" smtClean="0"/>
+              <a:t>Make</a:t>
+            </a:r>
+            <a:r>
+              <a:rPr lang="pl-PL" sz="1800" dirty="0" smtClean="0"/>
+              <a:t> </a:t>
+            </a:r>
+            <a:r>
+              <a:rPr lang="pl-PL" sz="1800" dirty="0" err="1" smtClean="0"/>
+              <a:t>yout</a:t>
+            </a:r>
+            <a:r>
+              <a:rPr lang="pl-PL" sz="1800" dirty="0" smtClean="0"/>
+              <a:t> </a:t>
+            </a:r>
+            <a:r>
+              <a:rPr lang="pl-PL" sz="1800" dirty="0" err="1" smtClean="0"/>
+              <a:t>screen</a:t>
+            </a:r>
+            <a:r>
+              <a:rPr lang="pl-PL" sz="1800" dirty="0" smtClean="0"/>
+              <a:t> </a:t>
+            </a:r>
+            <a:r>
+              <a:rPr lang="pl-PL" sz="1800" dirty="0" err="1" smtClean="0"/>
+              <a:t>looks</a:t>
+            </a:r>
+            <a:r>
+              <a:rPr lang="pl-PL" sz="1800" dirty="0" smtClean="0"/>
+              <a:t> </a:t>
+            </a:r>
+            <a:r>
+              <a:rPr lang="pl-PL" sz="1800" dirty="0" err="1" smtClean="0"/>
+              <a:t>like</a:t>
+            </a:r>
+            <a:r>
+              <a:rPr lang="pl-PL" sz="1800" dirty="0" smtClean="0"/>
+              <a:t> </a:t>
+            </a:r>
+            <a:r>
+              <a:rPr lang="pl-PL" sz="1800" dirty="0" err="1" smtClean="0"/>
+              <a:t>this</a:t>
+            </a:r>
+            <a:r>
+              <a:rPr lang="pl-PL" sz="1800" dirty="0" smtClean="0"/>
+              <a:t>: (HINT: controls to </a:t>
+            </a:r>
+            <a:r>
+              <a:rPr lang="pl-PL" sz="1800" dirty="0" err="1" smtClean="0"/>
+              <a:t>use</a:t>
+            </a:r>
+            <a:r>
+              <a:rPr lang="pl-PL" sz="1800" dirty="0" smtClean="0"/>
+              <a:t>: </a:t>
+            </a:r>
+            <a:r>
+              <a:rPr lang="pl-PL" sz="1800" dirty="0" err="1" smtClean="0"/>
+              <a:t>Grid</a:t>
+            </a:r>
+            <a:r>
+              <a:rPr lang="pl-PL" sz="1800" dirty="0" smtClean="0"/>
+              <a:t>, </a:t>
+            </a:r>
+            <a:r>
+              <a:rPr lang="pl-PL" sz="1800" dirty="0" err="1" smtClean="0"/>
+              <a:t>ViewBox</a:t>
+            </a:r>
+            <a:r>
+              <a:rPr lang="pl-PL" sz="1800" dirty="0" smtClean="0"/>
+              <a:t>, </a:t>
+            </a:r>
+            <a:r>
+              <a:rPr lang="pl-PL" sz="1800" dirty="0" err="1" smtClean="0"/>
+              <a:t>ToggleSwitch</a:t>
+            </a:r>
+            <a:r>
+              <a:rPr lang="pl-PL" sz="1800" dirty="0" smtClean="0"/>
+              <a:t>)</a:t>
+            </a:r>
+          </a:p>
+          <a:p>
+            <a:pPr marL="285750" indent="-285750">
+              <a:buFont typeface="Arial" panose="020B0604020202020204" pitchFamily="34" charset="0"/>
+              <a:buChar char="•"/>
+            </a:pPr>
+            <a:r>
+              <a:rPr lang="pl-PL" sz="1800" dirty="0" smtClean="0"/>
+              <a:t>Bind </a:t>
+            </a:r>
+            <a:r>
+              <a:rPr lang="pl-PL" sz="1800" b="1" dirty="0" err="1" smtClean="0"/>
+              <a:t>ToggleSwitch</a:t>
+            </a:r>
+            <a:r>
+              <a:rPr lang="pl-PL" sz="1800" dirty="0" smtClean="0"/>
+              <a:t> to </a:t>
+            </a:r>
+            <a:r>
+              <a:rPr lang="pl-PL" sz="1800" dirty="0" err="1" smtClean="0"/>
+              <a:t>newly</a:t>
+            </a:r>
+            <a:r>
+              <a:rPr lang="pl-PL" sz="1800" dirty="0" smtClean="0"/>
+              <a:t> </a:t>
+            </a:r>
+            <a:r>
+              <a:rPr lang="pl-PL" sz="1800" dirty="0" err="1" smtClean="0"/>
+              <a:t>created</a:t>
+            </a:r>
+            <a:r>
+              <a:rPr lang="pl-PL" sz="1800" dirty="0" smtClean="0"/>
+              <a:t> </a:t>
+            </a:r>
+            <a:r>
+              <a:rPr lang="pl-PL" sz="1800" b="1" dirty="0" err="1" smtClean="0"/>
+              <a:t>IsMetricToImperial</a:t>
+            </a:r>
+            <a:r>
+              <a:rPr lang="pl-PL" sz="1800" dirty="0" smtClean="0"/>
+              <a:t> </a:t>
+            </a:r>
+            <a:r>
+              <a:rPr lang="pl-PL" sz="1800" dirty="0" err="1" smtClean="0"/>
+              <a:t>property</a:t>
+            </a:r>
+            <a:endParaRPr lang="en-US" sz="1800" dirty="0"/>
+          </a:p>
+        </p:txBody>
+      </p:sp>
+      <p:sp>
+        <p:nvSpPr>
+          <p:cNvPr id="8" name="TextBox 7"/>
+          <p:cNvSpPr txBox="1"/>
+          <p:nvPr/>
+        </p:nvSpPr>
+        <p:spPr>
+          <a:xfrm>
+            <a:off x="5617414" y="1035170"/>
+            <a:ext cx="5993741" cy="400110"/>
+          </a:xfrm>
+          <a:prstGeom prst="rect">
+            <a:avLst/>
+          </a:prstGeom>
+          <a:noFill/>
+        </p:spPr>
+        <p:txBody>
+          <a:bodyPr wrap="square" rtlCol="0">
+            <a:spAutoFit/>
+          </a:bodyPr>
+          <a:lstStyle/>
+          <a:p>
+            <a:r>
+              <a:rPr lang="pl-PL" sz="2000" dirty="0" err="1" smtClean="0"/>
+              <a:t>Branch</a:t>
+            </a:r>
+            <a:r>
+              <a:rPr lang="pl-PL" sz="2000" dirty="0" smtClean="0"/>
+              <a:t> </a:t>
+            </a:r>
+            <a:r>
+              <a:rPr lang="pl-PL" sz="2000" dirty="0" err="1" smtClean="0"/>
+              <a:t>name</a:t>
+            </a:r>
+            <a:r>
+              <a:rPr lang="pl-PL" sz="2000" dirty="0" smtClean="0"/>
+              <a:t>: </a:t>
+            </a:r>
+            <a:r>
+              <a:rPr lang="pl-PL" sz="2000" b="1" dirty="0" smtClean="0"/>
+              <a:t>exercise-1.12</a:t>
+            </a:r>
+            <a:endParaRPr lang="en-US" sz="2000" b="1" dirty="0"/>
+          </a:p>
+        </p:txBody>
+      </p:sp>
+      <p:pic>
+        <p:nvPicPr>
+          <p:cNvPr id="5" name="Picture 4"/>
+          <p:cNvPicPr>
+            <a:picLocks noChangeAspect="1"/>
+          </p:cNvPicPr>
+          <p:nvPr/>
+        </p:nvPicPr>
+        <p:blipFill>
+          <a:blip r:embed="rId2"/>
+          <a:stretch>
+            <a:fillRect/>
+          </a:stretch>
+        </p:blipFill>
+        <p:spPr>
+          <a:xfrm>
+            <a:off x="1160971" y="457200"/>
+            <a:ext cx="3124200" cy="5762625"/>
+          </a:xfrm>
+          <a:prstGeom prst="rect">
+            <a:avLst/>
+          </a:prstGeom>
+        </p:spPr>
+      </p:pic>
+    </p:spTree>
+    <p:extLst>
+      <p:ext uri="{BB962C8B-B14F-4D97-AF65-F5344CB8AC3E}">
+        <p14:creationId xmlns:p14="http://schemas.microsoft.com/office/powerpoint/2010/main" val="1594043294"/>
       </p:ext>
     </p:extLst>
   </p:cSld>
@@ -6598,7 +6940,7 @@
             </a:r>
             <a:r>
               <a:rPr lang="pl-PL" sz="1800" b="1" dirty="0" err="1" smtClean="0"/>
-              <a:t>INotifyProperty</a:t>
+              <a:t>INotifyPropertyChanged</a:t>
             </a:r>
             <a:r>
               <a:rPr lang="pl-PL" sz="1800" dirty="0" smtClean="0"/>

</xml_diff>

<commit_message>
Toggling of units added
</commit_message>
<xml_diff>
--- a/exercises.pptx
+++ b/exercises.pptx
@@ -23,6 +23,7 @@
     <p:sldId id="271" r:id="rId17"/>
     <p:sldId id="272" r:id="rId18"/>
     <p:sldId id="273" r:id="rId19"/>
+    <p:sldId id="274" r:id="rId20"/>
   </p:sldIdLst>
   <p:sldSz cx="12192000" cy="6858000"/>
   <p:notesSz cx="6858000" cy="9144000"/>
@@ -8209,6 +8210,564 @@
 </p:sld>
 </file>
 
+<file path=ppt/slides/slide19.xml><?xml version="1.0" encoding="utf-8"?>
+<p:sld xmlns:a="http://schemas.openxmlformats.org/drawingml/2006/main" xmlns:r="http://schemas.openxmlformats.org/officeDocument/2006/relationships" xmlns:p="http://schemas.openxmlformats.org/presentationml/2006/main">
+  <p:cSld>
+    <p:spTree>
+      <p:nvGrpSpPr>
+        <p:cNvPr id="1" name=""/>
+        <p:cNvGrpSpPr/>
+        <p:nvPr/>
+      </p:nvGrpSpPr>
+      <p:grpSpPr>
+        <a:xfrm>
+          <a:off x="0" y="0"/>
+          <a:ext cx="0" cy="0"/>
+          <a:chOff x="0" y="0"/>
+          <a:chExt cx="0" cy="0"/>
+        </a:xfrm>
+      </p:grpSpPr>
+      <p:sp>
+        <p:nvSpPr>
+          <p:cNvPr id="2" name="Title 1"/>
+          <p:cNvSpPr>
+            <a:spLocks noGrp="1"/>
+          </p:cNvSpPr>
+          <p:nvPr>
+            <p:ph type="title"/>
+          </p:nvPr>
+        </p:nvSpPr>
+        <p:spPr>
+          <a:xfrm>
+            <a:off x="5617414" y="457200"/>
+            <a:ext cx="3932237" cy="577970"/>
+          </a:xfrm>
+        </p:spPr>
+        <p:txBody>
+          <a:bodyPr>
+            <a:normAutofit fontScale="90000"/>
+          </a:bodyPr>
+          <a:lstStyle/>
+          <a:p>
+            <a:r>
+              <a:rPr lang="pl-PL" dirty="0" err="1" smtClean="0"/>
+              <a:t>Exercise</a:t>
+            </a:r>
+            <a:r>
+              <a:rPr lang="pl-PL" dirty="0" smtClean="0"/>
+              <a:t> </a:t>
+            </a:r>
+            <a:r>
+              <a:rPr lang="pl-PL" dirty="0" smtClean="0"/>
+              <a:t>1.18</a:t>
+            </a:r>
+            <a:endParaRPr lang="en-US" dirty="0"/>
+          </a:p>
+        </p:txBody>
+      </p:sp>
+      <p:sp>
+        <p:nvSpPr>
+          <p:cNvPr id="4" name="Text Placeholder 3"/>
+          <p:cNvSpPr>
+            <a:spLocks noGrp="1"/>
+          </p:cNvSpPr>
+          <p:nvPr>
+            <p:ph type="body" sz="half" idx="2"/>
+          </p:nvPr>
+        </p:nvSpPr>
+        <p:spPr>
+          <a:xfrm>
+            <a:off x="5617414" y="1613140"/>
+            <a:ext cx="5993741" cy="4701396"/>
+          </a:xfrm>
+        </p:spPr>
+        <p:txBody>
+          <a:bodyPr>
+            <a:normAutofit/>
+          </a:bodyPr>
+          <a:lstStyle/>
+          <a:p>
+            <a:pPr marL="285750" indent="-285750">
+              <a:buFont typeface="Arial" panose="020B0604020202020204" pitchFamily="34" charset="0"/>
+              <a:buChar char="•"/>
+            </a:pPr>
+            <a:r>
+              <a:rPr lang="pl-PL" i="0" dirty="0" smtClean="0"/>
+              <a:t>Update </a:t>
+            </a:r>
+            <a:r>
+              <a:rPr lang="en-US" b="1" dirty="0" err="1" smtClean="0"/>
+              <a:t>UnitConverterEntryViewModel</a:t>
+            </a:r>
+            <a:r>
+              <a:rPr lang="pl-PL" dirty="0"/>
+              <a:t> </a:t>
+            </a:r>
+            <a:r>
+              <a:rPr lang="pl-PL" dirty="0" err="1" smtClean="0"/>
+              <a:t>class</a:t>
+            </a:r>
+            <a:r>
+              <a:rPr lang="pl-PL" dirty="0" smtClean="0"/>
+              <a:t>.</a:t>
+            </a:r>
+          </a:p>
+          <a:p>
+            <a:pPr marL="742950" lvl="1" indent="-285750">
+              <a:buFont typeface="Arial" panose="020B0604020202020204" pitchFamily="34" charset="0"/>
+              <a:buChar char="•"/>
+            </a:pPr>
+            <a:r>
+              <a:rPr lang="pl-PL" i="0" dirty="0" err="1" smtClean="0"/>
+              <a:t>Constructor</a:t>
+            </a:r>
+            <a:r>
+              <a:rPr lang="pl-PL" i="0" dirty="0" smtClean="0"/>
+              <a:t> </a:t>
+            </a:r>
+            <a:r>
+              <a:rPr lang="pl-PL" i="0" dirty="0" err="1" smtClean="0"/>
+              <a:t>should</a:t>
+            </a:r>
+            <a:r>
+              <a:rPr lang="pl-PL" i="0" dirty="0" smtClean="0"/>
+              <a:t> </a:t>
+            </a:r>
+            <a:r>
+              <a:rPr lang="pl-PL" i="0" dirty="0" err="1" smtClean="0"/>
+              <a:t>also</a:t>
+            </a:r>
+            <a:r>
+              <a:rPr lang="pl-PL" i="0" dirty="0" smtClean="0"/>
+              <a:t> </a:t>
+            </a:r>
+            <a:r>
+              <a:rPr lang="pl-PL" i="0" dirty="0" err="1" smtClean="0"/>
+              <a:t>accept</a:t>
+            </a:r>
+            <a:r>
+              <a:rPr lang="pl-PL" i="0" dirty="0" smtClean="0"/>
+              <a:t> </a:t>
+            </a:r>
+            <a:r>
+              <a:rPr lang="pl-PL" i="0" dirty="0" err="1" smtClean="0"/>
+              <a:t>UnitSystem</a:t>
+            </a:r>
+            <a:r>
+              <a:rPr lang="pl-PL" i="0" dirty="0" smtClean="0"/>
+              <a:t> and </a:t>
+            </a:r>
+            <a:r>
+              <a:rPr lang="pl-PL" i="0" dirty="0" err="1" smtClean="0"/>
+              <a:t>UnitCategory</a:t>
+            </a:r>
+            <a:endParaRPr lang="pl-PL" i="0" dirty="0" smtClean="0"/>
+          </a:p>
+          <a:p>
+            <a:pPr marL="742950" lvl="1" indent="-285750">
+              <a:buFont typeface="Arial" panose="020B0604020202020204" pitchFamily="34" charset="0"/>
+              <a:buChar char="•"/>
+            </a:pPr>
+            <a:r>
+              <a:rPr lang="pl-PL" i="0" dirty="0" smtClean="0"/>
+              <a:t>Class </a:t>
+            </a:r>
+            <a:r>
+              <a:rPr lang="pl-PL" i="0" dirty="0" err="1" smtClean="0"/>
+              <a:t>should</a:t>
+            </a:r>
+            <a:r>
+              <a:rPr lang="pl-PL" i="0" dirty="0" smtClean="0"/>
+              <a:t> </a:t>
+            </a:r>
+            <a:r>
+              <a:rPr lang="pl-PL" i="0" dirty="0" err="1" smtClean="0"/>
+              <a:t>store</a:t>
+            </a:r>
+            <a:r>
+              <a:rPr lang="pl-PL" i="0" dirty="0" smtClean="0"/>
+              <a:t> the list of </a:t>
+            </a:r>
+            <a:r>
+              <a:rPr lang="pl-PL" i="0" dirty="0" err="1" smtClean="0"/>
+              <a:t>input</a:t>
+            </a:r>
+            <a:r>
+              <a:rPr lang="pl-PL" i="0" dirty="0" smtClean="0"/>
+              <a:t> and </a:t>
+            </a:r>
+            <a:r>
+              <a:rPr lang="pl-PL" i="0" dirty="0" err="1" smtClean="0"/>
+              <a:t>output</a:t>
+            </a:r>
+            <a:r>
+              <a:rPr lang="pl-PL" i="0" dirty="0" smtClean="0"/>
+              <a:t> </a:t>
+            </a:r>
+            <a:r>
+              <a:rPr lang="pl-PL" b="1" i="0" dirty="0" err="1" smtClean="0"/>
+              <a:t>NamedUnits</a:t>
+            </a:r>
+            <a:endParaRPr lang="pl-PL" b="1" i="0" dirty="0"/>
+          </a:p>
+          <a:p>
+            <a:pPr marL="742950" lvl="1" indent="-285750">
+              <a:buFont typeface="Arial" panose="020B0604020202020204" pitchFamily="34" charset="0"/>
+              <a:buChar char="•"/>
+            </a:pPr>
+            <a:r>
+              <a:rPr lang="pl-PL" i="0" dirty="0" err="1" smtClean="0"/>
+              <a:t>Store</a:t>
+            </a:r>
+            <a:r>
+              <a:rPr lang="pl-PL" i="0" dirty="0" smtClean="0"/>
+              <a:t> the index of </a:t>
+            </a:r>
+            <a:r>
+              <a:rPr lang="pl-PL" i="0" dirty="0" err="1" smtClean="0"/>
+              <a:t>current</a:t>
+            </a:r>
+            <a:r>
+              <a:rPr lang="pl-PL" i="0" dirty="0" smtClean="0"/>
+              <a:t> </a:t>
+            </a:r>
+            <a:r>
+              <a:rPr lang="pl-PL" b="1" i="0" dirty="0" err="1" smtClean="0"/>
+              <a:t>NamedUnit</a:t>
+            </a:r>
+            <a:r>
+              <a:rPr lang="pl-PL" i="0" dirty="0" smtClean="0"/>
+              <a:t> </a:t>
+            </a:r>
+            <a:r>
+              <a:rPr lang="pl-PL" i="0" dirty="0" err="1" smtClean="0"/>
+              <a:t>displaying</a:t>
+            </a:r>
+            <a:endParaRPr lang="pl-PL" i="0" dirty="0" smtClean="0"/>
+          </a:p>
+          <a:p>
+            <a:pPr marL="742950" lvl="1" indent="-285750">
+              <a:buFont typeface="Arial" panose="020B0604020202020204" pitchFamily="34" charset="0"/>
+              <a:buChar char="•"/>
+            </a:pPr>
+            <a:r>
+              <a:rPr lang="pl-PL" b="1" i="0" dirty="0" smtClean="0"/>
+              <a:t>Update</a:t>
+            </a:r>
+            <a:r>
+              <a:rPr lang="pl-PL" i="0" dirty="0" smtClean="0"/>
+              <a:t> </a:t>
+            </a:r>
+            <a:r>
+              <a:rPr lang="pl-PL" i="0" dirty="0" err="1" smtClean="0"/>
+              <a:t>function</a:t>
+            </a:r>
+            <a:r>
+              <a:rPr lang="pl-PL" i="0" dirty="0" smtClean="0"/>
+              <a:t> </a:t>
+            </a:r>
+            <a:r>
+              <a:rPr lang="pl-PL" i="0" dirty="0" err="1" smtClean="0"/>
+              <a:t>should</a:t>
+            </a:r>
+            <a:r>
+              <a:rPr lang="pl-PL" i="0" dirty="0" smtClean="0"/>
+              <a:t> update </a:t>
+            </a:r>
+            <a:r>
+              <a:rPr lang="pl-PL" b="1" i="0" dirty="0" smtClean="0"/>
+              <a:t>From</a:t>
+            </a:r>
+            <a:r>
+              <a:rPr lang="pl-PL" i="0" dirty="0" smtClean="0"/>
+              <a:t> and </a:t>
+            </a:r>
+            <a:r>
+              <a:rPr lang="pl-PL" b="1" i="0" dirty="0" smtClean="0"/>
+              <a:t>To</a:t>
+            </a:r>
+            <a:r>
+              <a:rPr lang="pl-PL" i="0" dirty="0" smtClean="0"/>
+              <a:t> </a:t>
+            </a:r>
+            <a:r>
+              <a:rPr lang="pl-PL" i="0" dirty="0" err="1" smtClean="0"/>
+              <a:t>fields</a:t>
+            </a:r>
+            <a:r>
+              <a:rPr lang="pl-PL" i="0" dirty="0" smtClean="0"/>
+              <a:t> </a:t>
+            </a:r>
+            <a:r>
+              <a:rPr lang="pl-PL" i="0" dirty="0" err="1" smtClean="0"/>
+              <a:t>according</a:t>
+            </a:r>
+            <a:r>
+              <a:rPr lang="pl-PL" i="0" dirty="0" smtClean="0"/>
+              <a:t> to </a:t>
+            </a:r>
+            <a:r>
+              <a:rPr lang="pl-PL" i="0" dirty="0" err="1" smtClean="0"/>
+              <a:t>current</a:t>
+            </a:r>
+            <a:r>
+              <a:rPr lang="pl-PL" i="0" dirty="0" smtClean="0"/>
+              <a:t> </a:t>
+            </a:r>
+            <a:r>
+              <a:rPr lang="pl-PL" b="1" i="0" dirty="0" err="1" smtClean="0"/>
+              <a:t>NamedUnit</a:t>
+            </a:r>
+            <a:endParaRPr lang="pl-PL" b="1" i="0" dirty="0" smtClean="0"/>
+          </a:p>
+          <a:p>
+            <a:pPr marL="742950" lvl="1" indent="-285750">
+              <a:buFont typeface="Arial" panose="020B0604020202020204" pitchFamily="34" charset="0"/>
+              <a:buChar char="•"/>
+            </a:pPr>
+            <a:r>
+              <a:rPr lang="pl-PL" i="0" dirty="0" err="1" smtClean="0"/>
+              <a:t>There</a:t>
+            </a:r>
+            <a:r>
+              <a:rPr lang="pl-PL" i="0" dirty="0" smtClean="0"/>
+              <a:t> </a:t>
+            </a:r>
+            <a:r>
+              <a:rPr lang="pl-PL" i="0" dirty="0" err="1" smtClean="0"/>
+              <a:t>should</a:t>
+            </a:r>
+            <a:r>
+              <a:rPr lang="pl-PL" i="0" dirty="0" smtClean="0"/>
+              <a:t> be </a:t>
+            </a:r>
+            <a:r>
+              <a:rPr lang="en-US" b="1" i="0" dirty="0" err="1" smtClean="0"/>
+              <a:t>NextNamedUnitCommand</a:t>
+            </a:r>
+            <a:r>
+              <a:rPr lang="pl-PL" dirty="0" smtClean="0"/>
+              <a:t> </a:t>
+            </a:r>
+            <a:r>
+              <a:rPr lang="pl-PL" i="0" dirty="0" err="1" smtClean="0"/>
+              <a:t>command</a:t>
+            </a:r>
+            <a:r>
+              <a:rPr lang="pl-PL" i="0" dirty="0" smtClean="0"/>
+              <a:t> </a:t>
+            </a:r>
+            <a:r>
+              <a:rPr lang="pl-PL" i="0" dirty="0" err="1" smtClean="0"/>
+              <a:t>that</a:t>
+            </a:r>
+            <a:r>
+              <a:rPr lang="pl-PL" i="0" dirty="0" smtClean="0"/>
+              <a:t> </a:t>
+            </a:r>
+            <a:r>
+              <a:rPr lang="pl-PL" i="0" dirty="0" err="1" smtClean="0"/>
+              <a:t>will</a:t>
+            </a:r>
+            <a:r>
+              <a:rPr lang="pl-PL" i="0" dirty="0" smtClean="0"/>
+              <a:t> </a:t>
+            </a:r>
+            <a:r>
+              <a:rPr lang="pl-PL" i="0" dirty="0" err="1" smtClean="0"/>
+              <a:t>togle</a:t>
+            </a:r>
+            <a:r>
+              <a:rPr lang="pl-PL" i="0" dirty="0" smtClean="0"/>
+              <a:t> to </a:t>
+            </a:r>
+            <a:r>
+              <a:rPr lang="pl-PL" i="0" dirty="0" err="1" smtClean="0"/>
+              <a:t>another</a:t>
+            </a:r>
+            <a:r>
+              <a:rPr lang="pl-PL" i="0" dirty="0" smtClean="0"/>
+              <a:t> </a:t>
+            </a:r>
+            <a:r>
+              <a:rPr lang="pl-PL" b="1" i="0" dirty="0" err="1" smtClean="0"/>
+              <a:t>NamedUnit</a:t>
+            </a:r>
+            <a:endParaRPr lang="pl-PL" b="1" i="0" dirty="0" smtClean="0"/>
+          </a:p>
+          <a:p>
+            <a:pPr marL="285750" indent="-285750">
+              <a:buFont typeface="Arial" panose="020B0604020202020204" pitchFamily="34" charset="0"/>
+              <a:buChar char="•"/>
+            </a:pPr>
+            <a:r>
+              <a:rPr lang="pl-PL" i="0" dirty="0" smtClean="0"/>
+              <a:t>Update </a:t>
+            </a:r>
+            <a:r>
+              <a:rPr lang="pl-PL" i="0" dirty="0" err="1" smtClean="0"/>
+              <a:t>UnitConverterViewModel</a:t>
+            </a:r>
+            <a:r>
+              <a:rPr lang="pl-PL" i="0" dirty="0" smtClean="0"/>
+              <a:t> </a:t>
+            </a:r>
+            <a:r>
+              <a:rPr lang="pl-PL" i="0" dirty="0" err="1" smtClean="0"/>
+              <a:t>class</a:t>
+            </a:r>
+            <a:r>
+              <a:rPr lang="pl-PL" i="0" dirty="0" smtClean="0"/>
+              <a:t> to </a:t>
+            </a:r>
+            <a:r>
+              <a:rPr lang="pl-PL" i="0" dirty="0" err="1" smtClean="0"/>
+              <a:t>use</a:t>
+            </a:r>
+            <a:r>
+              <a:rPr lang="pl-PL" i="0" dirty="0" smtClean="0"/>
+              <a:t> the </a:t>
+            </a:r>
+            <a:r>
+              <a:rPr lang="pl-PL" i="0" dirty="0" err="1" smtClean="0"/>
+              <a:t>new</a:t>
+            </a:r>
+            <a:r>
+              <a:rPr lang="pl-PL" i="0" dirty="0" smtClean="0"/>
+              <a:t> </a:t>
+            </a:r>
+            <a:r>
+              <a:rPr lang="pl-PL" i="0" dirty="0" err="1" smtClean="0"/>
+              <a:t>constructor</a:t>
+            </a:r>
+            <a:r>
+              <a:rPr lang="pl-PL" i="0" dirty="0" smtClean="0"/>
+              <a:t> with </a:t>
+            </a:r>
+            <a:r>
+              <a:rPr lang="pl-PL" b="1" i="0" dirty="0" err="1" smtClean="0"/>
+              <a:t>Weight</a:t>
+            </a:r>
+            <a:r>
+              <a:rPr lang="pl-PL" i="0" dirty="0" smtClean="0"/>
+              <a:t> and </a:t>
+            </a:r>
+            <a:r>
+              <a:rPr lang="pl-PL" b="1" i="0" dirty="0" err="1" smtClean="0"/>
+              <a:t>Metric</a:t>
+            </a:r>
+            <a:r>
+              <a:rPr lang="pl-PL" i="0" dirty="0" smtClean="0"/>
+              <a:t> system</a:t>
+            </a:r>
+          </a:p>
+          <a:p>
+            <a:pPr marL="285750" indent="-285750">
+              <a:buFont typeface="Arial" panose="020B0604020202020204" pitchFamily="34" charset="0"/>
+              <a:buChar char="•"/>
+            </a:pPr>
+            <a:r>
+              <a:rPr lang="pl-PL" dirty="0" smtClean="0"/>
+              <a:t>Update </a:t>
+            </a:r>
+            <a:r>
+              <a:rPr lang="pl-PL" b="1" dirty="0" err="1" smtClean="0"/>
+              <a:t>MainPage.xaml</a:t>
+            </a:r>
+            <a:r>
+              <a:rPr lang="pl-PL" dirty="0" smtClean="0"/>
+              <a:t> to bind </a:t>
+            </a:r>
+            <a:r>
+              <a:rPr lang="pl-PL" dirty="0" err="1" smtClean="0"/>
+              <a:t>button</a:t>
+            </a:r>
+            <a:r>
+              <a:rPr lang="pl-PL" dirty="0" smtClean="0"/>
+              <a:t> </a:t>
+            </a:r>
+            <a:r>
+              <a:rPr lang="pl-PL" dirty="0" err="1" smtClean="0"/>
+              <a:t>command</a:t>
+            </a:r>
+            <a:r>
+              <a:rPr lang="pl-PL" dirty="0" smtClean="0"/>
+              <a:t> to  </a:t>
+            </a:r>
+            <a:r>
+              <a:rPr lang="pl-PL" b="1" dirty="0" err="1" smtClean="0"/>
+              <a:t>NextNamedUnitCommand</a:t>
+            </a:r>
+            <a:endParaRPr lang="pl-PL" b="1" i="0" dirty="0" smtClean="0"/>
+          </a:p>
+        </p:txBody>
+      </p:sp>
+      <p:sp>
+        <p:nvSpPr>
+          <p:cNvPr id="8" name="TextBox 7"/>
+          <p:cNvSpPr txBox="1"/>
+          <p:nvPr/>
+        </p:nvSpPr>
+        <p:spPr>
+          <a:xfrm>
+            <a:off x="5617414" y="1035170"/>
+            <a:ext cx="5993741" cy="400110"/>
+          </a:xfrm>
+          <a:prstGeom prst="rect">
+            <a:avLst/>
+          </a:prstGeom>
+          <a:noFill/>
+        </p:spPr>
+        <p:txBody>
+          <a:bodyPr wrap="square" rtlCol="0">
+            <a:spAutoFit/>
+          </a:bodyPr>
+          <a:lstStyle/>
+          <a:p>
+            <a:r>
+              <a:rPr lang="pl-PL" sz="2000" dirty="0" err="1" smtClean="0"/>
+              <a:t>Branch</a:t>
+            </a:r>
+            <a:r>
+              <a:rPr lang="pl-PL" sz="2000" dirty="0" smtClean="0"/>
+              <a:t> </a:t>
+            </a:r>
+            <a:r>
+              <a:rPr lang="pl-PL" sz="2000" dirty="0" err="1" smtClean="0"/>
+              <a:t>name</a:t>
+            </a:r>
+            <a:r>
+              <a:rPr lang="pl-PL" sz="2000" dirty="0" smtClean="0"/>
+              <a:t>: </a:t>
+            </a:r>
+            <a:r>
+              <a:rPr lang="pl-PL" sz="2000" b="1" dirty="0" smtClean="0"/>
+              <a:t>exercise-1.17</a:t>
+            </a:r>
+            <a:endParaRPr lang="en-US" sz="2000" b="1" dirty="0"/>
+          </a:p>
+        </p:txBody>
+      </p:sp>
+    </p:spTree>
+    <p:extLst>
+      <p:ext uri="{BB962C8B-B14F-4D97-AF65-F5344CB8AC3E}">
+        <p14:creationId xmlns:p14="http://schemas.microsoft.com/office/powerpoint/2010/main" val="680710302"/>
+      </p:ext>
+    </p:extLst>
+  </p:cSld>
+  <p:clrMapOvr>
+    <a:masterClrMapping/>
+  </p:clrMapOvr>
+  <p:timing>
+    <p:tnLst>
+      <p:par>
+        <p:cTn id="1" dur="indefinite" restart="never" nodeType="tmRoot"/>
+      </p:par>
+    </p:tnLst>
+  </p:timing>
+</p:sld>
+</file>
+
 <file path=ppt/slides/slide2.xml><?xml version="1.0" encoding="utf-8"?>
 <p:sld xmlns:a="http://schemas.openxmlformats.org/drawingml/2006/main" xmlns:r="http://schemas.openxmlformats.org/officeDocument/2006/relationships" xmlns:p="http://schemas.openxmlformats.org/presentationml/2006/main">
   <p:cSld>

</xml_diff>

<commit_message>
Added currency converter view
</commit_message>
<xml_diff>
--- a/exercises.pptx
+++ b/exercises.pptx
@@ -24,6 +24,7 @@
     <p:sldId id="272" r:id="rId18"/>
     <p:sldId id="273" r:id="rId19"/>
     <p:sldId id="274" r:id="rId20"/>
+    <p:sldId id="275" r:id="rId21"/>
   </p:sldIdLst>
   <p:sldSz cx="12192000" cy="6858000"/>
   <p:notesSz cx="6858000" cy="9144000"/>
@@ -8967,6 +8968,571 @@
 </p:sld>
 </file>
 
+<file path=ppt/slides/slide20.xml><?xml version="1.0" encoding="utf-8"?>
+<p:sld xmlns:a="http://schemas.openxmlformats.org/drawingml/2006/main" xmlns:r="http://schemas.openxmlformats.org/officeDocument/2006/relationships" xmlns:p="http://schemas.openxmlformats.org/presentationml/2006/main">
+  <p:cSld>
+    <p:spTree>
+      <p:nvGrpSpPr>
+        <p:cNvPr id="1" name=""/>
+        <p:cNvGrpSpPr/>
+        <p:nvPr/>
+      </p:nvGrpSpPr>
+      <p:grpSpPr>
+        <a:xfrm>
+          <a:off x="0" y="0"/>
+          <a:ext cx="0" cy="0"/>
+          <a:chOff x="0" y="0"/>
+          <a:chExt cx="0" cy="0"/>
+        </a:xfrm>
+      </p:grpSpPr>
+      <p:sp>
+        <p:nvSpPr>
+          <p:cNvPr id="2" name="Title 1"/>
+          <p:cNvSpPr>
+            <a:spLocks noGrp="1"/>
+          </p:cNvSpPr>
+          <p:nvPr>
+            <p:ph type="title"/>
+          </p:nvPr>
+        </p:nvSpPr>
+        <p:spPr>
+          <a:xfrm>
+            <a:off x="5617414" y="457200"/>
+            <a:ext cx="3932237" cy="577970"/>
+          </a:xfrm>
+        </p:spPr>
+        <p:txBody>
+          <a:bodyPr>
+            <a:normAutofit fontScale="90000"/>
+          </a:bodyPr>
+          <a:lstStyle/>
+          <a:p>
+            <a:r>
+              <a:rPr lang="pl-PL" dirty="0" err="1" smtClean="0"/>
+              <a:t>Exercise</a:t>
+            </a:r>
+            <a:r>
+              <a:rPr lang="pl-PL" dirty="0" smtClean="0"/>
+              <a:t> </a:t>
+            </a:r>
+            <a:r>
+              <a:rPr lang="pl-PL" dirty="0" smtClean="0"/>
+              <a:t>2.01</a:t>
+            </a:r>
+            <a:endParaRPr lang="en-US" dirty="0"/>
+          </a:p>
+        </p:txBody>
+      </p:sp>
+      <p:sp>
+        <p:nvSpPr>
+          <p:cNvPr id="4" name="Text Placeholder 3"/>
+          <p:cNvSpPr>
+            <a:spLocks noGrp="1"/>
+          </p:cNvSpPr>
+          <p:nvPr>
+            <p:ph type="body" sz="half" idx="2"/>
+          </p:nvPr>
+        </p:nvSpPr>
+        <p:spPr>
+          <a:xfrm>
+            <a:off x="5617414" y="1613140"/>
+            <a:ext cx="5993741" cy="4701396"/>
+          </a:xfrm>
+        </p:spPr>
+        <p:txBody>
+          <a:bodyPr>
+            <a:normAutofit/>
+          </a:bodyPr>
+          <a:lstStyle/>
+          <a:p>
+            <a:pPr marL="285750" indent="-285750">
+              <a:buFont typeface="Arial" panose="020B0604020202020204" pitchFamily="34" charset="0"/>
+              <a:buChar char="•"/>
+            </a:pPr>
+            <a:r>
+              <a:rPr lang="pl-PL" i="0" dirty="0" err="1" smtClean="0"/>
+              <a:t>Rename</a:t>
+            </a:r>
+            <a:r>
+              <a:rPr lang="pl-PL" i="0" dirty="0" smtClean="0"/>
+              <a:t> </a:t>
+            </a:r>
+            <a:r>
+              <a:rPr lang="pl-PL" b="1" i="0" dirty="0" err="1" smtClean="0"/>
+              <a:t>MainPage</a:t>
+            </a:r>
+            <a:r>
+              <a:rPr lang="pl-PL" i="0" dirty="0" smtClean="0"/>
+              <a:t> to </a:t>
+            </a:r>
+            <a:r>
+              <a:rPr lang="pl-PL" b="1" i="0" dirty="0" err="1" smtClean="0"/>
+              <a:t>UnitConverterPage</a:t>
+            </a:r>
+            <a:endParaRPr lang="pl-PL" b="1" i="0" dirty="0" smtClean="0"/>
+          </a:p>
+          <a:p>
+            <a:pPr marL="285750" indent="-285750">
+              <a:buFont typeface="Arial" panose="020B0604020202020204" pitchFamily="34" charset="0"/>
+              <a:buChar char="•"/>
+            </a:pPr>
+            <a:r>
+              <a:rPr lang="pl-PL" dirty="0" err="1" smtClean="0"/>
+              <a:t>Create</a:t>
+            </a:r>
+            <a:r>
+              <a:rPr lang="pl-PL" dirty="0" smtClean="0"/>
+              <a:t> </a:t>
+            </a:r>
+            <a:r>
+              <a:rPr lang="pl-PL" b="1" dirty="0" err="1" smtClean="0"/>
+              <a:t>HubPage</a:t>
+            </a:r>
+            <a:r>
+              <a:rPr lang="pl-PL" dirty="0" smtClean="0"/>
+              <a:t> and set </a:t>
+            </a:r>
+            <a:r>
+              <a:rPr lang="pl-PL" dirty="0" err="1" smtClean="0"/>
+              <a:t>it</a:t>
+            </a:r>
+            <a:r>
+              <a:rPr lang="pl-PL" dirty="0" smtClean="0"/>
+              <a:t> as a </a:t>
+            </a:r>
+            <a:r>
+              <a:rPr lang="pl-PL" dirty="0" err="1" smtClean="0"/>
+              <a:t>main</a:t>
+            </a:r>
+            <a:r>
+              <a:rPr lang="pl-PL" dirty="0" smtClean="0"/>
+              <a:t> </a:t>
+            </a:r>
+            <a:r>
+              <a:rPr lang="pl-PL" dirty="0" err="1" smtClean="0"/>
+              <a:t>page</a:t>
+            </a:r>
+            <a:r>
+              <a:rPr lang="pl-PL" dirty="0" smtClean="0"/>
+              <a:t> of the </a:t>
+            </a:r>
+            <a:r>
+              <a:rPr lang="pl-PL" dirty="0" err="1" smtClean="0"/>
+              <a:t>application</a:t>
+            </a:r>
+            <a:endParaRPr lang="pl-PL" dirty="0" smtClean="0"/>
+          </a:p>
+          <a:p>
+            <a:pPr marL="285750" indent="-285750">
+              <a:buFont typeface="Arial" panose="020B0604020202020204" pitchFamily="34" charset="0"/>
+              <a:buChar char="•"/>
+            </a:pPr>
+            <a:r>
+              <a:rPr lang="pl-PL" dirty="0" err="1" smtClean="0"/>
+              <a:t>Add</a:t>
+            </a:r>
+            <a:r>
+              <a:rPr lang="pl-PL" dirty="0" smtClean="0"/>
+              <a:t> </a:t>
+            </a:r>
+            <a:r>
+              <a:rPr lang="pl-PL" b="1" dirty="0" smtClean="0"/>
+              <a:t>Hub</a:t>
+            </a:r>
+            <a:r>
+              <a:rPr lang="pl-PL" dirty="0" smtClean="0"/>
+              <a:t> </a:t>
+            </a:r>
+            <a:r>
+              <a:rPr lang="pl-PL" dirty="0" err="1" smtClean="0"/>
+              <a:t>control</a:t>
+            </a:r>
+            <a:r>
+              <a:rPr lang="pl-PL" dirty="0" smtClean="0"/>
+              <a:t> </a:t>
+            </a:r>
+            <a:r>
+              <a:rPr lang="pl-PL" dirty="0" err="1" smtClean="0"/>
+              <a:t>into</a:t>
+            </a:r>
+            <a:r>
+              <a:rPr lang="pl-PL" dirty="0" smtClean="0"/>
+              <a:t> the </a:t>
+            </a:r>
+            <a:r>
+              <a:rPr lang="pl-PL" b="1" dirty="0" err="1" smtClean="0"/>
+              <a:t>HubPage</a:t>
+            </a:r>
+            <a:r>
+              <a:rPr lang="pl-PL" dirty="0" smtClean="0"/>
+              <a:t> and </a:t>
+            </a:r>
+            <a:r>
+              <a:rPr lang="pl-PL" dirty="0" err="1" smtClean="0"/>
+              <a:t>add</a:t>
+            </a:r>
+            <a:r>
+              <a:rPr lang="pl-PL" dirty="0" smtClean="0"/>
+              <a:t> </a:t>
+            </a:r>
+            <a:r>
+              <a:rPr lang="pl-PL" b="1" dirty="0" err="1" smtClean="0"/>
+              <a:t>UnitConverterPage</a:t>
+            </a:r>
+            <a:r>
+              <a:rPr lang="pl-PL" dirty="0" smtClean="0"/>
+              <a:t> as </a:t>
+            </a:r>
+            <a:r>
+              <a:rPr lang="pl-PL" dirty="0" err="1" smtClean="0"/>
+              <a:t>an</a:t>
+            </a:r>
+            <a:r>
+              <a:rPr lang="pl-PL" dirty="0" smtClean="0"/>
+              <a:t> </a:t>
+            </a:r>
+            <a:r>
+              <a:rPr lang="pl-PL" dirty="0" err="1" smtClean="0"/>
+              <a:t>item</a:t>
+            </a:r>
+            <a:r>
+              <a:rPr lang="pl-PL" dirty="0" smtClean="0"/>
+              <a:t> in the </a:t>
+            </a:r>
+            <a:r>
+              <a:rPr lang="pl-PL" dirty="0" err="1" smtClean="0"/>
+              <a:t>first</a:t>
+            </a:r>
+            <a:r>
+              <a:rPr lang="pl-PL" dirty="0" smtClean="0"/>
+              <a:t> </a:t>
+            </a:r>
+            <a:r>
+              <a:rPr lang="pl-PL" dirty="0" err="1" smtClean="0"/>
+              <a:t>section</a:t>
+            </a:r>
+            <a:endParaRPr lang="pl-PL" dirty="0" smtClean="0"/>
+          </a:p>
+          <a:p>
+            <a:pPr marL="285750" indent="-285750">
+              <a:buFont typeface="Arial" panose="020B0604020202020204" pitchFamily="34" charset="0"/>
+              <a:buChar char="•"/>
+            </a:pPr>
+            <a:r>
+              <a:rPr lang="pl-PL" i="0" dirty="0" err="1" smtClean="0"/>
+              <a:t>Create</a:t>
+            </a:r>
+            <a:r>
+              <a:rPr lang="pl-PL" i="0" dirty="0" smtClean="0"/>
+              <a:t> a </a:t>
+            </a:r>
+            <a:r>
+              <a:rPr lang="pl-PL" i="0" dirty="0" err="1" smtClean="0"/>
+              <a:t>copy</a:t>
+            </a:r>
+            <a:r>
+              <a:rPr lang="pl-PL" i="0" dirty="0" smtClean="0"/>
+              <a:t> of </a:t>
+            </a:r>
+            <a:r>
+              <a:rPr lang="pl-PL" b="1" i="0" dirty="0" err="1" smtClean="0"/>
+              <a:t>UnitConverterPage</a:t>
+            </a:r>
+            <a:r>
+              <a:rPr lang="pl-PL" i="0" dirty="0" smtClean="0"/>
+              <a:t>, </a:t>
+            </a:r>
+            <a:r>
+              <a:rPr lang="pl-PL" i="0" dirty="0" err="1" smtClean="0"/>
+              <a:t>rename</a:t>
+            </a:r>
+            <a:r>
+              <a:rPr lang="pl-PL" i="0" dirty="0" smtClean="0"/>
+              <a:t> </a:t>
+            </a:r>
+            <a:r>
+              <a:rPr lang="pl-PL" i="0" dirty="0" err="1" smtClean="0"/>
+              <a:t>it</a:t>
+            </a:r>
+            <a:r>
+              <a:rPr lang="pl-PL" i="0" dirty="0" smtClean="0"/>
+              <a:t> to </a:t>
+            </a:r>
+            <a:r>
+              <a:rPr lang="pl-PL" b="1" i="0" dirty="0" err="1" smtClean="0"/>
+              <a:t>CurrencyConverter</a:t>
+            </a:r>
+            <a:r>
+              <a:rPr lang="pl-PL" b="1" dirty="0" err="1" smtClean="0"/>
+              <a:t>Page</a:t>
+            </a:r>
+            <a:r>
+              <a:rPr lang="pl-PL" dirty="0" smtClean="0"/>
+              <a:t> and </a:t>
+            </a:r>
+            <a:r>
+              <a:rPr lang="pl-PL" dirty="0" err="1" smtClean="0"/>
+              <a:t>redesign</a:t>
+            </a:r>
+            <a:r>
+              <a:rPr lang="pl-PL" dirty="0" smtClean="0"/>
+              <a:t> </a:t>
+            </a:r>
+            <a:r>
+              <a:rPr lang="pl-PL" dirty="0" err="1" smtClean="0"/>
+              <a:t>it</a:t>
+            </a:r>
+            <a:r>
+              <a:rPr lang="pl-PL" dirty="0" smtClean="0"/>
+              <a:t> to </a:t>
+            </a:r>
+            <a:r>
+              <a:rPr lang="pl-PL" dirty="0" err="1" smtClean="0"/>
+              <a:t>look</a:t>
+            </a:r>
+            <a:r>
+              <a:rPr lang="pl-PL" dirty="0" smtClean="0"/>
+              <a:t> </a:t>
+            </a:r>
+            <a:r>
+              <a:rPr lang="pl-PL" dirty="0" err="1" smtClean="0"/>
+              <a:t>like</a:t>
+            </a:r>
+            <a:r>
+              <a:rPr lang="pl-PL" dirty="0" smtClean="0"/>
+              <a:t> in the image </a:t>
+            </a:r>
+            <a:r>
+              <a:rPr lang="pl-PL" dirty="0" err="1" smtClean="0"/>
+              <a:t>provided</a:t>
+            </a:r>
+            <a:endParaRPr lang="pl-PL" dirty="0" smtClean="0"/>
+          </a:p>
+          <a:p>
+            <a:pPr marL="285750" indent="-285750">
+              <a:buFont typeface="Arial" panose="020B0604020202020204" pitchFamily="34" charset="0"/>
+              <a:buChar char="•"/>
+            </a:pPr>
+            <a:r>
+              <a:rPr lang="pl-PL" i="0" dirty="0" err="1" smtClean="0"/>
+              <a:t>Add</a:t>
+            </a:r>
+            <a:r>
+              <a:rPr lang="pl-PL" i="0" dirty="0" smtClean="0"/>
+              <a:t> </a:t>
+            </a:r>
+            <a:r>
+              <a:rPr lang="pl-PL" b="1" i="0" dirty="0" err="1" smtClean="0"/>
+              <a:t>CurrencyConverterPage</a:t>
+            </a:r>
+            <a:r>
+              <a:rPr lang="pl-PL" i="0" dirty="0" smtClean="0"/>
+              <a:t> as </a:t>
+            </a:r>
+            <a:r>
+              <a:rPr lang="pl-PL" i="0" dirty="0" err="1" smtClean="0"/>
+              <a:t>second</a:t>
+            </a:r>
+            <a:r>
+              <a:rPr lang="pl-PL" i="0" dirty="0" smtClean="0"/>
+              <a:t> </a:t>
+            </a:r>
+            <a:r>
+              <a:rPr lang="pl-PL" i="0" dirty="0" err="1" smtClean="0"/>
+              <a:t>section</a:t>
+            </a:r>
+            <a:r>
+              <a:rPr lang="pl-PL" i="0" dirty="0" smtClean="0"/>
+              <a:t> of Hub </a:t>
+            </a:r>
+            <a:r>
+              <a:rPr lang="pl-PL" i="0" dirty="0" err="1" smtClean="0"/>
+              <a:t>control</a:t>
+            </a:r>
+            <a:r>
+              <a:rPr lang="pl-PL" i="0" dirty="0" smtClean="0"/>
+              <a:t> in </a:t>
+            </a:r>
+            <a:r>
+              <a:rPr lang="pl-PL" b="1" i="0" dirty="0" err="1" smtClean="0"/>
+              <a:t>HubPage</a:t>
+            </a:r>
+            <a:endParaRPr lang="pl-PL" b="1" i="0" dirty="0" smtClean="0"/>
+          </a:p>
+          <a:p>
+            <a:pPr marL="285750" indent="-285750">
+              <a:buFont typeface="Arial" panose="020B0604020202020204" pitchFamily="34" charset="0"/>
+              <a:buChar char="•"/>
+            </a:pPr>
+            <a:r>
+              <a:rPr lang="pl-PL" dirty="0" err="1" smtClean="0"/>
+              <a:t>Create</a:t>
+            </a:r>
+            <a:r>
+              <a:rPr lang="pl-PL" dirty="0"/>
+              <a:t> </a:t>
+            </a:r>
+            <a:r>
+              <a:rPr lang="pl-PL" b="1" dirty="0" err="1" smtClean="0"/>
+              <a:t>CurrencyConverterViewModel</a:t>
+            </a:r>
+            <a:r>
+              <a:rPr lang="pl-PL" dirty="0" smtClean="0"/>
+              <a:t> </a:t>
+            </a:r>
+            <a:r>
+              <a:rPr lang="pl-PL" dirty="0" err="1" smtClean="0"/>
+              <a:t>handling</a:t>
+            </a:r>
+            <a:r>
+              <a:rPr lang="pl-PL" dirty="0" smtClean="0"/>
+              <a:t> </a:t>
+            </a:r>
+            <a:r>
+              <a:rPr lang="pl-PL" dirty="0" err="1" smtClean="0"/>
+              <a:t>this</a:t>
+            </a:r>
+            <a:r>
+              <a:rPr lang="pl-PL" dirty="0" smtClean="0"/>
+              <a:t> </a:t>
+            </a:r>
+            <a:r>
+              <a:rPr lang="pl-PL" dirty="0" err="1" smtClean="0"/>
+              <a:t>screen</a:t>
+            </a:r>
+            <a:endParaRPr lang="pl-PL" dirty="0" smtClean="0"/>
+          </a:p>
+          <a:p>
+            <a:pPr marL="285750" indent="-285750">
+              <a:buFont typeface="Arial" panose="020B0604020202020204" pitchFamily="34" charset="0"/>
+              <a:buChar char="•"/>
+            </a:pPr>
+            <a:r>
+              <a:rPr lang="pl-PL" dirty="0" err="1" smtClean="0"/>
+              <a:t>Create</a:t>
+            </a:r>
+            <a:r>
+              <a:rPr lang="pl-PL" dirty="0" smtClean="0"/>
+              <a:t> and </a:t>
+            </a:r>
+            <a:r>
+              <a:rPr lang="pl-PL" dirty="0" err="1" smtClean="0"/>
+              <a:t>use</a:t>
+            </a:r>
+            <a:r>
+              <a:rPr lang="pl-PL" dirty="0" smtClean="0"/>
+              <a:t> </a:t>
+            </a:r>
+            <a:r>
+              <a:rPr lang="pl-PL" b="1" dirty="0" err="1" smtClean="0"/>
+              <a:t>CurrencyValueConverter</a:t>
+            </a:r>
+            <a:r>
+              <a:rPr lang="pl-PL" dirty="0" smtClean="0"/>
+              <a:t> to </a:t>
+            </a:r>
+            <a:r>
+              <a:rPr lang="pl-PL" dirty="0" err="1" smtClean="0"/>
+              <a:t>convert</a:t>
+            </a:r>
+            <a:r>
+              <a:rPr lang="pl-PL" dirty="0" smtClean="0"/>
+              <a:t> USD -&gt; PLN</a:t>
+            </a:r>
+            <a:endParaRPr lang="pl-PL" dirty="0"/>
+          </a:p>
+        </p:txBody>
+      </p:sp>
+      <p:sp>
+        <p:nvSpPr>
+          <p:cNvPr id="8" name="TextBox 7"/>
+          <p:cNvSpPr txBox="1"/>
+          <p:nvPr/>
+        </p:nvSpPr>
+        <p:spPr>
+          <a:xfrm>
+            <a:off x="5617414" y="1035170"/>
+            <a:ext cx="5993741" cy="400110"/>
+          </a:xfrm>
+          <a:prstGeom prst="rect">
+            <a:avLst/>
+          </a:prstGeom>
+          <a:noFill/>
+        </p:spPr>
+        <p:txBody>
+          <a:bodyPr wrap="square" rtlCol="0">
+            <a:spAutoFit/>
+          </a:bodyPr>
+          <a:lstStyle/>
+          <a:p>
+            <a:r>
+              <a:rPr lang="pl-PL" sz="2000" dirty="0" err="1" smtClean="0"/>
+              <a:t>Branch</a:t>
+            </a:r>
+            <a:r>
+              <a:rPr lang="pl-PL" sz="2000" dirty="0" smtClean="0"/>
+              <a:t> </a:t>
+            </a:r>
+            <a:r>
+              <a:rPr lang="pl-PL" sz="2000" dirty="0" err="1" smtClean="0"/>
+              <a:t>name</a:t>
+            </a:r>
+            <a:r>
+              <a:rPr lang="pl-PL" sz="2000" dirty="0" smtClean="0"/>
+              <a:t>: </a:t>
+            </a:r>
+            <a:r>
+              <a:rPr lang="pl-PL" sz="2000" b="1" dirty="0" smtClean="0"/>
+              <a:t>exercise-1.18</a:t>
+            </a:r>
+            <a:endParaRPr lang="en-US" sz="2000" b="1" dirty="0"/>
+          </a:p>
+        </p:txBody>
+      </p:sp>
+      <p:pic>
+        <p:nvPicPr>
+          <p:cNvPr id="3" name="Picture 2"/>
+          <p:cNvPicPr>
+            <a:picLocks noChangeAspect="1"/>
+          </p:cNvPicPr>
+          <p:nvPr/>
+        </p:nvPicPr>
+        <p:blipFill>
+          <a:blip r:embed="rId2"/>
+          <a:stretch>
+            <a:fillRect/>
+          </a:stretch>
+        </p:blipFill>
+        <p:spPr>
+          <a:xfrm>
+            <a:off x="1029652" y="570961"/>
+            <a:ext cx="3114675" cy="5743575"/>
+          </a:xfrm>
+          <a:prstGeom prst="rect">
+            <a:avLst/>
+          </a:prstGeom>
+        </p:spPr>
+      </p:pic>
+    </p:spTree>
+    <p:extLst>
+      <p:ext uri="{BB962C8B-B14F-4D97-AF65-F5344CB8AC3E}">
+        <p14:creationId xmlns:p14="http://schemas.microsoft.com/office/powerpoint/2010/main" val="4024174261"/>
+      </p:ext>
+    </p:extLst>
+  </p:cSld>
+  <p:clrMapOvr>
+    <a:masterClrMapping/>
+  </p:clrMapOvr>
+  <p:timing>
+    <p:tnLst>
+      <p:par>
+        <p:cTn id="1" dur="indefinite" restart="never" nodeType="tmRoot"/>
+      </p:par>
+    </p:tnLst>
+  </p:timing>
+</p:sld>
+</file>
+
 <file path=ppt/slides/slide3.xml><?xml version="1.0" encoding="utf-8"?>
 <p:sld xmlns:a="http://schemas.openxmlformats.org/drawingml/2006/main" xmlns:r="http://schemas.openxmlformats.org/officeDocument/2006/relationships" xmlns:p="http://schemas.openxmlformats.org/presentationml/2006/main">
   <p:cSld>

</xml_diff>

<commit_message>
Currency view model updated
</commit_message>
<xml_diff>
--- a/exercises.pptx
+++ b/exercises.pptx
@@ -27,6 +27,7 @@
     <p:sldId id="275" r:id="rId21"/>
     <p:sldId id="276" r:id="rId22"/>
     <p:sldId id="277" r:id="rId23"/>
+    <p:sldId id="278" r:id="rId24"/>
   </p:sldIdLst>
   <p:sldSz cx="12192000" cy="6858000"/>
   <p:notesSz cx="6858000" cy="9144000"/>
@@ -10483,6 +10484,567 @@
 </p:sld>
 </file>
 
+<file path=ppt/slides/slide23.xml><?xml version="1.0" encoding="utf-8"?>
+<p:sld xmlns:a="http://schemas.openxmlformats.org/drawingml/2006/main" xmlns:r="http://schemas.openxmlformats.org/officeDocument/2006/relationships" xmlns:p="http://schemas.openxmlformats.org/presentationml/2006/main">
+  <p:cSld>
+    <p:spTree>
+      <p:nvGrpSpPr>
+        <p:cNvPr id="1" name=""/>
+        <p:cNvGrpSpPr/>
+        <p:nvPr/>
+      </p:nvGrpSpPr>
+      <p:grpSpPr>
+        <a:xfrm>
+          <a:off x="0" y="0"/>
+          <a:ext cx="0" cy="0"/>
+          <a:chOff x="0" y="0"/>
+          <a:chExt cx="0" cy="0"/>
+        </a:xfrm>
+      </p:grpSpPr>
+      <p:sp>
+        <p:nvSpPr>
+          <p:cNvPr id="2" name="Title 1"/>
+          <p:cNvSpPr>
+            <a:spLocks noGrp="1"/>
+          </p:cNvSpPr>
+          <p:nvPr>
+            <p:ph type="title"/>
+          </p:nvPr>
+        </p:nvSpPr>
+        <p:spPr>
+          <a:xfrm>
+            <a:off x="5617414" y="457200"/>
+            <a:ext cx="3932237" cy="577970"/>
+          </a:xfrm>
+        </p:spPr>
+        <p:txBody>
+          <a:bodyPr>
+            <a:normAutofit fontScale="90000"/>
+          </a:bodyPr>
+          <a:lstStyle/>
+          <a:p>
+            <a:r>
+              <a:rPr lang="pl-PL" dirty="0" err="1" smtClean="0"/>
+              <a:t>Exercise</a:t>
+            </a:r>
+            <a:r>
+              <a:rPr lang="pl-PL" dirty="0" smtClean="0"/>
+              <a:t> </a:t>
+            </a:r>
+            <a:r>
+              <a:rPr lang="pl-PL" dirty="0" smtClean="0"/>
+              <a:t>2.04</a:t>
+            </a:r>
+            <a:endParaRPr lang="en-US" dirty="0"/>
+          </a:p>
+        </p:txBody>
+      </p:sp>
+      <p:sp>
+        <p:nvSpPr>
+          <p:cNvPr id="4" name="Text Placeholder 3"/>
+          <p:cNvSpPr>
+            <a:spLocks noGrp="1"/>
+          </p:cNvSpPr>
+          <p:nvPr>
+            <p:ph type="body" sz="half" idx="2"/>
+          </p:nvPr>
+        </p:nvSpPr>
+        <p:spPr>
+          <a:xfrm>
+            <a:off x="5617414" y="1613140"/>
+            <a:ext cx="5993741" cy="4701396"/>
+          </a:xfrm>
+        </p:spPr>
+        <p:txBody>
+          <a:bodyPr>
+            <a:normAutofit/>
+          </a:bodyPr>
+          <a:lstStyle/>
+          <a:p>
+            <a:pPr marL="285750" indent="-285750">
+              <a:buFont typeface="Arial" panose="020B0604020202020204" pitchFamily="34" charset="0"/>
+              <a:buChar char="•"/>
+            </a:pPr>
+            <a:r>
+              <a:rPr lang="pl-PL" i="0" dirty="0" err="1" smtClean="0"/>
+              <a:t>Make</a:t>
+            </a:r>
+            <a:r>
+              <a:rPr lang="pl-PL" i="0" dirty="0" smtClean="0"/>
+              <a:t> </a:t>
+            </a:r>
+            <a:r>
+              <a:rPr lang="pl-PL" i="0" dirty="0" err="1" smtClean="0"/>
+              <a:t>sure</a:t>
+            </a:r>
+            <a:r>
+              <a:rPr lang="pl-PL" i="0" dirty="0" smtClean="0"/>
+              <a:t> </a:t>
+            </a:r>
+            <a:r>
+              <a:rPr lang="pl-PL" i="0" dirty="0" err="1" smtClean="0"/>
+              <a:t>that</a:t>
+            </a:r>
+            <a:r>
+              <a:rPr lang="pl-PL" i="0" dirty="0" smtClean="0"/>
+              <a:t> </a:t>
+            </a:r>
+            <a:r>
+              <a:rPr lang="pl-PL" i="0" dirty="0" err="1" smtClean="0"/>
+              <a:t>Currency</a:t>
+            </a:r>
+            <a:r>
+              <a:rPr lang="pl-PL" dirty="0" err="1" smtClean="0"/>
+              <a:t>ConverterViewModel</a:t>
+            </a:r>
+            <a:r>
+              <a:rPr lang="pl-PL" dirty="0" smtClean="0"/>
+              <a:t> </a:t>
+            </a:r>
+            <a:r>
+              <a:rPr lang="pl-PL" dirty="0" err="1" smtClean="0"/>
+              <a:t>implements</a:t>
+            </a:r>
+            <a:r>
+              <a:rPr lang="pl-PL" dirty="0" smtClean="0"/>
+              <a:t> </a:t>
+            </a:r>
+            <a:r>
+              <a:rPr lang="pl-PL" dirty="0" err="1" smtClean="0"/>
+              <a:t>following</a:t>
+            </a:r>
+            <a:r>
+              <a:rPr lang="pl-PL" dirty="0" smtClean="0"/>
+              <a:t>:</a:t>
+            </a:r>
+          </a:p>
+          <a:p>
+            <a:pPr marL="742950" lvl="1" indent="-285750">
+              <a:buFont typeface="Arial" panose="020B0604020202020204" pitchFamily="34" charset="0"/>
+              <a:buChar char="•"/>
+            </a:pPr>
+            <a:r>
+              <a:rPr lang="pl-PL" i="0" dirty="0" smtClean="0"/>
+              <a:t>String</a:t>
+            </a:r>
+            <a:r>
+              <a:rPr lang="pl-PL" b="1" i="0" dirty="0" smtClean="0"/>
+              <a:t> </a:t>
+            </a:r>
+            <a:r>
+              <a:rPr lang="pl-PL" b="1" i="0" dirty="0" err="1" smtClean="0"/>
+              <a:t>EntryValue</a:t>
+            </a:r>
+            <a:r>
+              <a:rPr lang="pl-PL" b="1" i="0" dirty="0"/>
+              <a:t> </a:t>
+            </a:r>
+            <a:r>
+              <a:rPr lang="pl-PL" i="0" dirty="0" smtClean="0"/>
+              <a:t>and</a:t>
+            </a:r>
+            <a:r>
+              <a:rPr lang="pl-PL" b="1" i="0" dirty="0" smtClean="0"/>
+              <a:t> </a:t>
+            </a:r>
+            <a:r>
+              <a:rPr lang="pl-PL" b="1" i="0" dirty="0" err="1" smtClean="0"/>
+              <a:t>OutputValue</a:t>
+            </a:r>
+            <a:r>
+              <a:rPr lang="pl-PL" b="1" i="0" dirty="0" smtClean="0"/>
+              <a:t> </a:t>
+            </a:r>
+            <a:r>
+              <a:rPr lang="pl-PL" i="0" dirty="0" err="1" smtClean="0"/>
+              <a:t>containing</a:t>
+            </a:r>
+            <a:r>
+              <a:rPr lang="pl-PL" i="0" dirty="0" smtClean="0"/>
+              <a:t> the string </a:t>
+            </a:r>
+            <a:r>
+              <a:rPr lang="pl-PL" i="0" dirty="0" err="1" smtClean="0"/>
+              <a:t>diplayed</a:t>
+            </a:r>
+            <a:r>
+              <a:rPr lang="pl-PL" i="0" dirty="0" smtClean="0"/>
+              <a:t> in </a:t>
+            </a:r>
+            <a:r>
+              <a:rPr lang="pl-PL" i="0" dirty="0" err="1" smtClean="0"/>
+              <a:t>Textblocks</a:t>
+            </a:r>
+            <a:endParaRPr lang="pl-PL" b="1" i="0" dirty="0" smtClean="0"/>
+          </a:p>
+          <a:p>
+            <a:pPr marL="742950" lvl="1" indent="-285750">
+              <a:buFont typeface="Arial" panose="020B0604020202020204" pitchFamily="34" charset="0"/>
+              <a:buChar char="•"/>
+            </a:pPr>
+            <a:r>
+              <a:rPr lang="pl-PL" i="0" dirty="0" smtClean="0"/>
+              <a:t>String</a:t>
+            </a:r>
+            <a:r>
+              <a:rPr lang="pl-PL" b="1" i="0" dirty="0" smtClean="0"/>
+              <a:t> </a:t>
+            </a:r>
+            <a:r>
+              <a:rPr lang="pl-PL" b="1" i="0" dirty="0" err="1" smtClean="0"/>
+              <a:t>InputCurrency</a:t>
+            </a:r>
+            <a:r>
+              <a:rPr lang="pl-PL" b="1" i="0" dirty="0" smtClean="0"/>
+              <a:t> </a:t>
+            </a:r>
+            <a:r>
+              <a:rPr lang="pl-PL" i="0" dirty="0" smtClean="0"/>
+              <a:t>and</a:t>
+            </a:r>
+            <a:r>
+              <a:rPr lang="pl-PL" b="1" i="0" dirty="0" smtClean="0"/>
+              <a:t> </a:t>
+            </a:r>
+            <a:r>
+              <a:rPr lang="pl-PL" b="1" i="0" dirty="0" err="1" smtClean="0"/>
+              <a:t>OutputCurrency</a:t>
+            </a:r>
+            <a:r>
+              <a:rPr lang="pl-PL" b="1" i="0" dirty="0" smtClean="0"/>
+              <a:t> </a:t>
+            </a:r>
+            <a:r>
+              <a:rPr lang="pl-PL" i="0" dirty="0" err="1" smtClean="0"/>
+              <a:t>shown</a:t>
+            </a:r>
+            <a:r>
+              <a:rPr lang="pl-PL" i="0" dirty="0" smtClean="0"/>
+              <a:t> in </a:t>
+            </a:r>
+            <a:r>
+              <a:rPr lang="pl-PL" i="0" dirty="0" err="1" smtClean="0"/>
+              <a:t>currency</a:t>
+            </a:r>
+            <a:r>
+              <a:rPr lang="pl-PL" i="0" dirty="0" smtClean="0"/>
+              <a:t> </a:t>
+            </a:r>
+            <a:r>
+              <a:rPr lang="pl-PL" i="0" dirty="0" err="1" smtClean="0"/>
+              <a:t>buttons</a:t>
+            </a:r>
+            <a:endParaRPr lang="pl-PL" b="1" i="0" dirty="0" smtClean="0"/>
+          </a:p>
+          <a:p>
+            <a:pPr marL="742950" lvl="1" indent="-285750">
+              <a:buFont typeface="Arial" panose="020B0604020202020204" pitchFamily="34" charset="0"/>
+              <a:buChar char="•"/>
+            </a:pPr>
+            <a:r>
+              <a:rPr lang="pl-PL" b="1" i="0" dirty="0" smtClean="0"/>
+              <a:t>List&lt;string&gt; </a:t>
+            </a:r>
+            <a:r>
+              <a:rPr lang="pl-PL" b="1" i="0" dirty="0" err="1" smtClean="0"/>
+              <a:t>Currencies</a:t>
+            </a:r>
+            <a:r>
+              <a:rPr lang="pl-PL" b="1" i="0" dirty="0"/>
+              <a:t> </a:t>
+            </a:r>
+            <a:r>
+              <a:rPr lang="pl-PL" i="0" dirty="0" err="1" smtClean="0"/>
+              <a:t>containing</a:t>
+            </a:r>
+            <a:r>
+              <a:rPr lang="pl-PL" i="0" dirty="0" smtClean="0"/>
+              <a:t> </a:t>
+            </a:r>
+            <a:r>
+              <a:rPr lang="pl-PL" i="0" dirty="0" err="1" smtClean="0"/>
+              <a:t>all</a:t>
+            </a:r>
+            <a:r>
+              <a:rPr lang="pl-PL" i="0" dirty="0" smtClean="0"/>
+              <a:t> the </a:t>
+            </a:r>
+            <a:r>
+              <a:rPr lang="pl-PL" i="0" dirty="0" err="1" smtClean="0"/>
+              <a:t>currencies</a:t>
+            </a:r>
+            <a:r>
+              <a:rPr lang="pl-PL" i="0" dirty="0" smtClean="0"/>
+              <a:t> </a:t>
+            </a:r>
+            <a:r>
+              <a:rPr lang="pl-PL" i="0" dirty="0" err="1" smtClean="0"/>
+              <a:t>downloaded</a:t>
+            </a:r>
+            <a:endParaRPr lang="pl-PL" i="0" dirty="0" smtClean="0"/>
+          </a:p>
+          <a:p>
+            <a:pPr marL="742950" lvl="1" indent="-285750">
+              <a:buFont typeface="Arial" panose="020B0604020202020204" pitchFamily="34" charset="0"/>
+              <a:buChar char="•"/>
+            </a:pPr>
+            <a:r>
+              <a:rPr lang="pl-PL" b="1" i="0" dirty="0" smtClean="0"/>
+              <a:t>Update()</a:t>
+            </a:r>
+            <a:r>
+              <a:rPr lang="pl-PL" i="0" dirty="0" smtClean="0"/>
+              <a:t> </a:t>
+            </a:r>
+            <a:r>
+              <a:rPr lang="pl-PL" i="0" dirty="0" err="1" smtClean="0"/>
+              <a:t>method</a:t>
+            </a:r>
+            <a:r>
+              <a:rPr lang="pl-PL" i="0" dirty="0" smtClean="0"/>
+              <a:t> </a:t>
+            </a:r>
+            <a:r>
+              <a:rPr lang="pl-PL" i="0" dirty="0" err="1" smtClean="0"/>
+              <a:t>that</a:t>
+            </a:r>
+            <a:r>
+              <a:rPr lang="pl-PL" i="0" dirty="0" smtClean="0"/>
+              <a:t> </a:t>
+            </a:r>
+            <a:r>
+              <a:rPr lang="pl-PL" i="0" dirty="0" err="1" smtClean="0"/>
+              <a:t>will</a:t>
+            </a:r>
+            <a:r>
+              <a:rPr lang="pl-PL" i="0" dirty="0" smtClean="0"/>
+              <a:t> update </a:t>
+            </a:r>
+            <a:r>
+              <a:rPr lang="pl-PL" b="1" i="0" dirty="0" err="1" smtClean="0"/>
+              <a:t>OutputValue</a:t>
+            </a:r>
+            <a:r>
+              <a:rPr lang="pl-PL" i="0" dirty="0" smtClean="0"/>
+              <a:t> </a:t>
+            </a:r>
+            <a:r>
+              <a:rPr lang="pl-PL" i="0" dirty="0" err="1" smtClean="0"/>
+              <a:t>based</a:t>
+            </a:r>
+            <a:r>
+              <a:rPr lang="pl-PL" i="0" dirty="0" smtClean="0"/>
+              <a:t> on </a:t>
+            </a:r>
+            <a:r>
+              <a:rPr lang="pl-PL" b="1" i="0" dirty="0" err="1" smtClean="0"/>
+              <a:t>EntryValue</a:t>
+            </a:r>
+            <a:r>
+              <a:rPr lang="pl-PL" i="0" dirty="0" smtClean="0"/>
+              <a:t> and </a:t>
+            </a:r>
+            <a:r>
+              <a:rPr lang="pl-PL" i="0" dirty="0" err="1" smtClean="0"/>
+              <a:t>selected</a:t>
+            </a:r>
+            <a:r>
+              <a:rPr lang="pl-PL" i="0" dirty="0" smtClean="0"/>
+              <a:t> </a:t>
+            </a:r>
+            <a:r>
+              <a:rPr lang="pl-PL" i="0" dirty="0" err="1" smtClean="0"/>
+              <a:t>currencies</a:t>
+            </a:r>
+            <a:endParaRPr lang="pl-PL" i="0" dirty="0" smtClean="0"/>
+          </a:p>
+          <a:p>
+            <a:pPr marL="285750" indent="-285750">
+              <a:buFont typeface="Arial" panose="020B0604020202020204" pitchFamily="34" charset="0"/>
+              <a:buChar char="•"/>
+            </a:pPr>
+            <a:r>
+              <a:rPr lang="pl-PL" b="1" dirty="0" err="1" smtClean="0"/>
+              <a:t>CurrencyConverterViewModel</a:t>
+            </a:r>
+            <a:r>
+              <a:rPr lang="pl-PL" dirty="0" smtClean="0"/>
+              <a:t> </a:t>
+            </a:r>
+            <a:r>
+              <a:rPr lang="pl-PL" dirty="0" err="1" smtClean="0"/>
+              <a:t>constructor</a:t>
+            </a:r>
+            <a:r>
+              <a:rPr lang="pl-PL" dirty="0" smtClean="0"/>
+              <a:t> </a:t>
+            </a:r>
+            <a:r>
+              <a:rPr lang="pl-PL" dirty="0" err="1" smtClean="0"/>
+              <a:t>should</a:t>
+            </a:r>
+            <a:r>
+              <a:rPr lang="pl-PL" dirty="0" smtClean="0"/>
+              <a:t> </a:t>
+            </a:r>
+            <a:r>
+              <a:rPr lang="pl-PL" dirty="0" err="1" smtClean="0"/>
+              <a:t>also</a:t>
+            </a:r>
+            <a:r>
+              <a:rPr lang="pl-PL" dirty="0" smtClean="0"/>
+              <a:t> </a:t>
+            </a:r>
+            <a:r>
+              <a:rPr lang="pl-PL" dirty="0" err="1" smtClean="0"/>
+              <a:t>Load</a:t>
+            </a:r>
+            <a:r>
+              <a:rPr lang="pl-PL" dirty="0" smtClean="0"/>
+              <a:t> </a:t>
+            </a:r>
+            <a:r>
+              <a:rPr lang="pl-PL" dirty="0" err="1" smtClean="0"/>
+              <a:t>currencies</a:t>
+            </a:r>
+            <a:r>
+              <a:rPr lang="pl-PL" dirty="0" smtClean="0"/>
+              <a:t> via </a:t>
+            </a:r>
+            <a:r>
+              <a:rPr lang="pl-PL" b="1" dirty="0" err="1" smtClean="0"/>
+              <a:t>CurrencyDataService</a:t>
+            </a:r>
+            <a:r>
+              <a:rPr lang="pl-PL" dirty="0" smtClean="0"/>
+              <a:t>, and </a:t>
+            </a:r>
+            <a:r>
+              <a:rPr lang="pl-PL" dirty="0" err="1" smtClean="0"/>
+              <a:t>after</a:t>
+            </a:r>
+            <a:r>
+              <a:rPr lang="pl-PL" dirty="0" smtClean="0"/>
+              <a:t> the </a:t>
+            </a:r>
+            <a:r>
+              <a:rPr lang="pl-PL" dirty="0" err="1" smtClean="0"/>
+              <a:t>load</a:t>
+            </a:r>
+            <a:r>
+              <a:rPr lang="pl-PL" dirty="0" smtClean="0"/>
+              <a:t> </a:t>
+            </a:r>
+            <a:r>
+              <a:rPr lang="pl-PL" dirty="0" err="1" smtClean="0"/>
+              <a:t>is</a:t>
+            </a:r>
+            <a:r>
+              <a:rPr lang="pl-PL" dirty="0" smtClean="0"/>
+              <a:t> </a:t>
+            </a:r>
+            <a:r>
+              <a:rPr lang="pl-PL" dirty="0" err="1" smtClean="0"/>
+              <a:t>done</a:t>
+            </a:r>
+            <a:r>
+              <a:rPr lang="pl-PL" dirty="0" smtClean="0"/>
+              <a:t> </a:t>
+            </a:r>
+            <a:r>
+              <a:rPr lang="pl-PL" b="1" dirty="0" err="1" smtClean="0"/>
+              <a:t>Currencies</a:t>
+            </a:r>
+            <a:r>
+              <a:rPr lang="pl-PL" dirty="0" smtClean="0"/>
+              <a:t> </a:t>
+            </a:r>
+            <a:r>
+              <a:rPr lang="pl-PL" dirty="0" err="1" smtClean="0"/>
+              <a:t>property</a:t>
+            </a:r>
+            <a:r>
+              <a:rPr lang="pl-PL" dirty="0" smtClean="0"/>
+              <a:t> </a:t>
+            </a:r>
+            <a:r>
+              <a:rPr lang="pl-PL" dirty="0" err="1" smtClean="0"/>
+              <a:t>should</a:t>
+            </a:r>
+            <a:r>
+              <a:rPr lang="pl-PL" dirty="0" smtClean="0"/>
+              <a:t> be setup</a:t>
+            </a:r>
+            <a:endParaRPr lang="pl-PL" i="0" dirty="0" smtClean="0"/>
+          </a:p>
+        </p:txBody>
+      </p:sp>
+      <p:sp>
+        <p:nvSpPr>
+          <p:cNvPr id="8" name="TextBox 7"/>
+          <p:cNvSpPr txBox="1"/>
+          <p:nvPr/>
+        </p:nvSpPr>
+        <p:spPr>
+          <a:xfrm>
+            <a:off x="5617414" y="1035170"/>
+            <a:ext cx="5993741" cy="400110"/>
+          </a:xfrm>
+          <a:prstGeom prst="rect">
+            <a:avLst/>
+          </a:prstGeom>
+          <a:noFill/>
+        </p:spPr>
+        <p:txBody>
+          <a:bodyPr wrap="square" rtlCol="0">
+            <a:spAutoFit/>
+          </a:bodyPr>
+          <a:lstStyle/>
+          <a:p>
+            <a:r>
+              <a:rPr lang="pl-PL" sz="2000" dirty="0" err="1" smtClean="0"/>
+              <a:t>Branch</a:t>
+            </a:r>
+            <a:r>
+              <a:rPr lang="pl-PL" sz="2000" dirty="0" smtClean="0"/>
+              <a:t> </a:t>
+            </a:r>
+            <a:r>
+              <a:rPr lang="pl-PL" sz="2000" dirty="0" err="1" smtClean="0"/>
+              <a:t>name</a:t>
+            </a:r>
+            <a:r>
+              <a:rPr lang="pl-PL" sz="2000" dirty="0" smtClean="0"/>
+              <a:t>: </a:t>
+            </a:r>
+            <a:r>
+              <a:rPr lang="pl-PL" sz="2000" b="1" dirty="0" smtClean="0"/>
+              <a:t>exercise-2.03</a:t>
+            </a:r>
+            <a:endParaRPr lang="en-US" sz="2000" b="1" dirty="0"/>
+          </a:p>
+        </p:txBody>
+      </p:sp>
+    </p:spTree>
+    <p:extLst>
+      <p:ext uri="{BB962C8B-B14F-4D97-AF65-F5344CB8AC3E}">
+        <p14:creationId xmlns:p14="http://schemas.microsoft.com/office/powerpoint/2010/main" val="1569229900"/>
+      </p:ext>
+    </p:extLst>
+  </p:cSld>
+  <p:clrMapOvr>
+    <a:masterClrMapping/>
+  </p:clrMapOvr>
+  <p:timing>
+    <p:tnLst>
+      <p:par>
+        <p:cTn id="1" dur="indefinite" restart="never" nodeType="tmRoot"/>
+      </p:par>
+    </p:tnLst>
+  </p:timing>
+</p:sld>
+</file>
+
 <file path=ppt/slides/slide3.xml><?xml version="1.0" encoding="utf-8"?>
 <p:sld xmlns:a="http://schemas.openxmlformats.org/drawingml/2006/main" xmlns:r="http://schemas.openxmlformats.org/officeDocument/2006/relationships" xmlns:p="http://schemas.openxmlformats.org/presentationml/2006/main">
   <p:cSld>

</xml_diff>

<commit_message>
Fixed flyout in currency converter, added exam exercise list
</commit_message>
<xml_diff>
--- a/exercises.pptx
+++ b/exercises.pptx
@@ -28,6 +28,8 @@
     <p:sldId id="276" r:id="rId22"/>
     <p:sldId id="277" r:id="rId23"/>
     <p:sldId id="278" r:id="rId24"/>
+    <p:sldId id="279" r:id="rId25"/>
+    <p:sldId id="280" r:id="rId26"/>
   </p:sldIdLst>
   <p:sldSz cx="12192000" cy="6858000"/>
   <p:notesSz cx="6858000" cy="9144000"/>
@@ -11045,6 +11047,956 @@
 </p:sld>
 </file>
 
+<file path=ppt/slides/slide24.xml><?xml version="1.0" encoding="utf-8"?>
+<p:sld xmlns:a="http://schemas.openxmlformats.org/drawingml/2006/main" xmlns:r="http://schemas.openxmlformats.org/officeDocument/2006/relationships" xmlns:p="http://schemas.openxmlformats.org/presentationml/2006/main">
+  <p:cSld>
+    <p:spTree>
+      <p:nvGrpSpPr>
+        <p:cNvPr id="1" name=""/>
+        <p:cNvGrpSpPr/>
+        <p:nvPr/>
+      </p:nvGrpSpPr>
+      <p:grpSpPr>
+        <a:xfrm>
+          <a:off x="0" y="0"/>
+          <a:ext cx="0" cy="0"/>
+          <a:chOff x="0" y="0"/>
+          <a:chExt cx="0" cy="0"/>
+        </a:xfrm>
+      </p:grpSpPr>
+      <p:sp>
+        <p:nvSpPr>
+          <p:cNvPr id="2" name="Title 1"/>
+          <p:cNvSpPr>
+            <a:spLocks noGrp="1"/>
+          </p:cNvSpPr>
+          <p:nvPr>
+            <p:ph type="title"/>
+          </p:nvPr>
+        </p:nvSpPr>
+        <p:spPr>
+          <a:xfrm>
+            <a:off x="5617414" y="457200"/>
+            <a:ext cx="3932237" cy="577970"/>
+          </a:xfrm>
+        </p:spPr>
+        <p:txBody>
+          <a:bodyPr>
+            <a:normAutofit fontScale="90000"/>
+          </a:bodyPr>
+          <a:lstStyle/>
+          <a:p>
+            <a:r>
+              <a:rPr lang="pl-PL" dirty="0" err="1" smtClean="0"/>
+              <a:t>Exercise</a:t>
+            </a:r>
+            <a:r>
+              <a:rPr lang="pl-PL" dirty="0" smtClean="0"/>
+              <a:t> </a:t>
+            </a:r>
+            <a:r>
+              <a:rPr lang="pl-PL" dirty="0" smtClean="0"/>
+              <a:t>2.05</a:t>
+            </a:r>
+            <a:endParaRPr lang="en-US" dirty="0"/>
+          </a:p>
+        </p:txBody>
+      </p:sp>
+      <p:sp>
+        <p:nvSpPr>
+          <p:cNvPr id="4" name="Text Placeholder 3"/>
+          <p:cNvSpPr>
+            <a:spLocks noGrp="1"/>
+          </p:cNvSpPr>
+          <p:nvPr>
+            <p:ph type="body" sz="half" idx="2"/>
+          </p:nvPr>
+        </p:nvSpPr>
+        <p:spPr>
+          <a:xfrm>
+            <a:off x="5617414" y="1613140"/>
+            <a:ext cx="5993741" cy="4701396"/>
+          </a:xfrm>
+        </p:spPr>
+        <p:txBody>
+          <a:bodyPr>
+            <a:normAutofit/>
+          </a:bodyPr>
+          <a:lstStyle/>
+          <a:p>
+            <a:pPr marL="285750" indent="-285750">
+              <a:buFont typeface="Arial" panose="020B0604020202020204" pitchFamily="34" charset="0"/>
+              <a:buChar char="•"/>
+            </a:pPr>
+            <a:r>
+              <a:rPr lang="pl-PL" dirty="0" smtClean="0"/>
+              <a:t>In </a:t>
+            </a:r>
+            <a:r>
+              <a:rPr lang="pl-PL" dirty="0" err="1" smtClean="0"/>
+              <a:t>CurrencyConvertedPage</a:t>
+            </a:r>
+            <a:r>
+              <a:rPr lang="pl-PL" dirty="0" smtClean="0"/>
+              <a:t> </a:t>
+            </a:r>
+            <a:r>
+              <a:rPr lang="pl-PL" dirty="0" err="1" smtClean="0"/>
+              <a:t>add</a:t>
+            </a:r>
+            <a:r>
+              <a:rPr lang="pl-PL" dirty="0" smtClean="0"/>
+              <a:t> </a:t>
+            </a:r>
+            <a:r>
+              <a:rPr lang="pl-PL" dirty="0" err="1" smtClean="0"/>
+              <a:t>ListPickerFlyout’s</a:t>
+            </a:r>
+            <a:r>
+              <a:rPr lang="pl-PL" dirty="0" smtClean="0"/>
+              <a:t> to </a:t>
+            </a:r>
+            <a:r>
+              <a:rPr lang="pl-PL" dirty="0" err="1" smtClean="0"/>
+              <a:t>currency</a:t>
+            </a:r>
+            <a:r>
+              <a:rPr lang="pl-PL" dirty="0" smtClean="0"/>
+              <a:t> </a:t>
+            </a:r>
+            <a:r>
+              <a:rPr lang="pl-PL" dirty="0" err="1" smtClean="0"/>
+              <a:t>buttons</a:t>
+            </a:r>
+            <a:r>
+              <a:rPr lang="pl-PL" dirty="0" smtClean="0"/>
+              <a:t> </a:t>
+            </a:r>
+            <a:r>
+              <a:rPr lang="pl-PL" dirty="0" err="1" smtClean="0"/>
+              <a:t>Flyout</a:t>
+            </a:r>
+            <a:r>
+              <a:rPr lang="pl-PL" dirty="0" smtClean="0"/>
+              <a:t> </a:t>
+            </a:r>
+            <a:r>
+              <a:rPr lang="pl-PL" dirty="0" err="1" smtClean="0"/>
+              <a:t>properties</a:t>
+            </a:r>
+            <a:endParaRPr lang="pl-PL" dirty="0"/>
+          </a:p>
+          <a:p>
+            <a:pPr marL="285750" indent="-285750">
+              <a:buFont typeface="Arial" panose="020B0604020202020204" pitchFamily="34" charset="0"/>
+              <a:buChar char="•"/>
+            </a:pPr>
+            <a:r>
+              <a:rPr lang="pl-PL" dirty="0" err="1" smtClean="0"/>
+              <a:t>ListPickerFlyouts</a:t>
+            </a:r>
+            <a:r>
+              <a:rPr lang="pl-PL" dirty="0" smtClean="0"/>
+              <a:t> </a:t>
+            </a:r>
+            <a:r>
+              <a:rPr lang="pl-PL" dirty="0" err="1" smtClean="0"/>
+              <a:t>should</a:t>
+            </a:r>
+            <a:r>
+              <a:rPr lang="pl-PL" dirty="0" smtClean="0"/>
+              <a:t> bind to </a:t>
+            </a:r>
+            <a:r>
+              <a:rPr lang="pl-PL" dirty="0" err="1" smtClean="0"/>
+              <a:t>Currencies</a:t>
+            </a:r>
+            <a:r>
+              <a:rPr lang="pl-PL" dirty="0" smtClean="0"/>
+              <a:t> </a:t>
+            </a:r>
+            <a:r>
+              <a:rPr lang="pl-PL" dirty="0" err="1" smtClean="0"/>
+              <a:t>property</a:t>
+            </a:r>
+            <a:endParaRPr lang="pl-PL" dirty="0" smtClean="0"/>
+          </a:p>
+          <a:p>
+            <a:pPr marL="285750" indent="-285750">
+              <a:buFont typeface="Arial" panose="020B0604020202020204" pitchFamily="34" charset="0"/>
+              <a:buChar char="•"/>
+            </a:pPr>
+            <a:r>
+              <a:rPr lang="pl-PL" dirty="0" err="1" smtClean="0"/>
+              <a:t>Currency</a:t>
+            </a:r>
+            <a:r>
+              <a:rPr lang="pl-PL" dirty="0"/>
+              <a:t> </a:t>
+            </a:r>
+            <a:r>
+              <a:rPr lang="pl-PL" dirty="0" err="1" smtClean="0"/>
+              <a:t>selection</a:t>
+            </a:r>
+            <a:r>
+              <a:rPr lang="pl-PL" dirty="0" smtClean="0"/>
+              <a:t> </a:t>
+            </a:r>
+            <a:r>
+              <a:rPr lang="pl-PL" dirty="0" err="1" smtClean="0"/>
+              <a:t>should</a:t>
+            </a:r>
+            <a:r>
+              <a:rPr lang="pl-PL" dirty="0" smtClean="0"/>
+              <a:t> be </a:t>
+            </a:r>
+            <a:r>
+              <a:rPr lang="pl-PL" dirty="0" err="1" smtClean="0"/>
+              <a:t>done</a:t>
+            </a:r>
+            <a:r>
+              <a:rPr lang="pl-PL" dirty="0" smtClean="0"/>
+              <a:t> </a:t>
+            </a:r>
+            <a:r>
+              <a:rPr lang="pl-PL" dirty="0" err="1" smtClean="0"/>
+              <a:t>using</a:t>
+            </a:r>
+            <a:r>
+              <a:rPr lang="pl-PL" dirty="0" smtClean="0"/>
+              <a:t> </a:t>
+            </a:r>
+            <a:r>
+              <a:rPr lang="pl-PL" dirty="0" err="1" smtClean="0"/>
+              <a:t>binding</a:t>
+            </a:r>
+            <a:endParaRPr lang="pl-PL" i="0" dirty="0" smtClean="0"/>
+          </a:p>
+        </p:txBody>
+      </p:sp>
+      <p:sp>
+        <p:nvSpPr>
+          <p:cNvPr id="8" name="TextBox 7"/>
+          <p:cNvSpPr txBox="1"/>
+          <p:nvPr/>
+        </p:nvSpPr>
+        <p:spPr>
+          <a:xfrm>
+            <a:off x="5617414" y="1035170"/>
+            <a:ext cx="5993741" cy="400110"/>
+          </a:xfrm>
+          <a:prstGeom prst="rect">
+            <a:avLst/>
+          </a:prstGeom>
+          <a:noFill/>
+        </p:spPr>
+        <p:txBody>
+          <a:bodyPr wrap="square" rtlCol="0">
+            <a:spAutoFit/>
+          </a:bodyPr>
+          <a:lstStyle/>
+          <a:p>
+            <a:r>
+              <a:rPr lang="pl-PL" sz="2000" dirty="0" err="1" smtClean="0"/>
+              <a:t>Branch</a:t>
+            </a:r>
+            <a:r>
+              <a:rPr lang="pl-PL" sz="2000" dirty="0" smtClean="0"/>
+              <a:t> </a:t>
+            </a:r>
+            <a:r>
+              <a:rPr lang="pl-PL" sz="2000" dirty="0" err="1" smtClean="0"/>
+              <a:t>name</a:t>
+            </a:r>
+            <a:r>
+              <a:rPr lang="pl-PL" sz="2000" dirty="0" smtClean="0"/>
+              <a:t>: </a:t>
+            </a:r>
+            <a:r>
+              <a:rPr lang="pl-PL" sz="2000" b="1" dirty="0" smtClean="0"/>
+              <a:t>exercise-2.04</a:t>
+            </a:r>
+            <a:endParaRPr lang="en-US" sz="2000" b="1" dirty="0"/>
+          </a:p>
+        </p:txBody>
+      </p:sp>
+    </p:spTree>
+    <p:extLst>
+      <p:ext uri="{BB962C8B-B14F-4D97-AF65-F5344CB8AC3E}">
+        <p14:creationId xmlns:p14="http://schemas.microsoft.com/office/powerpoint/2010/main" val="1535756065"/>
+      </p:ext>
+    </p:extLst>
+  </p:cSld>
+  <p:clrMapOvr>
+    <a:masterClrMapping/>
+  </p:clrMapOvr>
+  <p:timing>
+    <p:tnLst>
+      <p:par>
+        <p:cTn id="1" dur="indefinite" restart="never" nodeType="tmRoot"/>
+      </p:par>
+    </p:tnLst>
+  </p:timing>
+</p:sld>
+</file>
+
+<file path=ppt/slides/slide25.xml><?xml version="1.0" encoding="utf-8"?>
+<p:sld xmlns:a="http://schemas.openxmlformats.org/drawingml/2006/main" xmlns:r="http://schemas.openxmlformats.org/officeDocument/2006/relationships" xmlns:p="http://schemas.openxmlformats.org/presentationml/2006/main">
+  <p:cSld>
+    <p:spTree>
+      <p:nvGrpSpPr>
+        <p:cNvPr id="1" name=""/>
+        <p:cNvGrpSpPr/>
+        <p:nvPr/>
+      </p:nvGrpSpPr>
+      <p:grpSpPr>
+        <a:xfrm>
+          <a:off x="0" y="0"/>
+          <a:ext cx="0" cy="0"/>
+          <a:chOff x="0" y="0"/>
+          <a:chExt cx="0" cy="0"/>
+        </a:xfrm>
+      </p:grpSpPr>
+      <p:sp>
+        <p:nvSpPr>
+          <p:cNvPr id="2" name="Title 1"/>
+          <p:cNvSpPr>
+            <a:spLocks noGrp="1"/>
+          </p:cNvSpPr>
+          <p:nvPr>
+            <p:ph type="title"/>
+          </p:nvPr>
+        </p:nvSpPr>
+        <p:spPr>
+          <a:xfrm>
+            <a:off x="5617414" y="457200"/>
+            <a:ext cx="3932237" cy="577970"/>
+          </a:xfrm>
+        </p:spPr>
+        <p:txBody>
+          <a:bodyPr>
+            <a:normAutofit fontScale="90000"/>
+          </a:bodyPr>
+          <a:lstStyle/>
+          <a:p>
+            <a:r>
+              <a:rPr lang="pl-PL" dirty="0" err="1" smtClean="0"/>
+              <a:t>Exam</a:t>
+            </a:r>
+            <a:endParaRPr lang="en-US" dirty="0"/>
+          </a:p>
+        </p:txBody>
+      </p:sp>
+      <p:sp>
+        <p:nvSpPr>
+          <p:cNvPr id="4" name="Text Placeholder 3"/>
+          <p:cNvSpPr>
+            <a:spLocks noGrp="1"/>
+          </p:cNvSpPr>
+          <p:nvPr>
+            <p:ph type="body" sz="half" idx="2"/>
+          </p:nvPr>
+        </p:nvSpPr>
+        <p:spPr>
+          <a:xfrm>
+            <a:off x="5617414" y="1613140"/>
+            <a:ext cx="5993741" cy="4701396"/>
+          </a:xfrm>
+        </p:spPr>
+        <p:txBody>
+          <a:bodyPr>
+            <a:normAutofit lnSpcReduction="10000"/>
+          </a:bodyPr>
+          <a:lstStyle/>
+          <a:p>
+            <a:pPr marL="342900" indent="-342900">
+              <a:buFont typeface="+mj-lt"/>
+              <a:buAutoNum type="arabicPeriod"/>
+            </a:pPr>
+            <a:r>
+              <a:rPr lang="pl-PL" dirty="0" err="1" smtClean="0"/>
+              <a:t>Use</a:t>
+            </a:r>
+            <a:r>
+              <a:rPr lang="pl-PL" dirty="0" smtClean="0"/>
+              <a:t> </a:t>
+            </a:r>
+            <a:r>
+              <a:rPr lang="pl-PL" dirty="0" err="1" smtClean="0"/>
+              <a:t>StringBuilder</a:t>
+            </a:r>
+            <a:r>
+              <a:rPr lang="pl-PL" dirty="0" smtClean="0"/>
+              <a:t> for </a:t>
+            </a:r>
+            <a:r>
+              <a:rPr lang="pl-PL" dirty="0" err="1" smtClean="0"/>
+              <a:t>construction</a:t>
+            </a:r>
+            <a:r>
+              <a:rPr lang="pl-PL" dirty="0" smtClean="0"/>
+              <a:t> of </a:t>
+            </a:r>
+            <a:r>
+              <a:rPr lang="pl-PL" dirty="0" err="1" smtClean="0"/>
+              <a:t>EntryValue</a:t>
+            </a:r>
+            <a:r>
+              <a:rPr lang="pl-PL" dirty="0" smtClean="0"/>
+              <a:t> </a:t>
+            </a:r>
+            <a:r>
+              <a:rPr lang="pl-PL" b="1" dirty="0" smtClean="0"/>
+              <a:t>(0.25p)</a:t>
+            </a:r>
+            <a:endParaRPr lang="pl-PL" b="1" dirty="0"/>
+          </a:p>
+          <a:p>
+            <a:pPr marL="342900" indent="-342900">
+              <a:buFont typeface="+mj-lt"/>
+              <a:buAutoNum type="arabicPeriod"/>
+            </a:pPr>
+            <a:r>
+              <a:rPr lang="pl-PL" dirty="0" err="1" smtClean="0"/>
+              <a:t>Dot</a:t>
+            </a:r>
+            <a:r>
+              <a:rPr lang="pl-PL" dirty="0" smtClean="0"/>
+              <a:t> </a:t>
+            </a:r>
+            <a:r>
+              <a:rPr lang="pl-PL" dirty="0" err="1" smtClean="0"/>
+              <a:t>button</a:t>
+            </a:r>
+            <a:r>
+              <a:rPr lang="pl-PL" dirty="0" smtClean="0"/>
+              <a:t> </a:t>
+            </a:r>
+            <a:r>
+              <a:rPr lang="pl-PL" dirty="0" err="1" smtClean="0"/>
+              <a:t>should</a:t>
+            </a:r>
+            <a:r>
+              <a:rPr lang="pl-PL" dirty="0" smtClean="0"/>
+              <a:t> </a:t>
+            </a:r>
+            <a:r>
+              <a:rPr lang="pl-PL" dirty="0" err="1" smtClean="0"/>
+              <a:t>actually</a:t>
+            </a:r>
+            <a:r>
+              <a:rPr lang="pl-PL" dirty="0" smtClean="0"/>
+              <a:t> </a:t>
+            </a:r>
+            <a:r>
+              <a:rPr lang="pl-PL" dirty="0" err="1" smtClean="0"/>
+              <a:t>present</a:t>
+            </a:r>
+            <a:r>
+              <a:rPr lang="pl-PL" dirty="0" smtClean="0"/>
+              <a:t> </a:t>
+            </a:r>
+            <a:r>
+              <a:rPr lang="pl-PL" dirty="0" err="1" smtClean="0"/>
+              <a:t>correct</a:t>
+            </a:r>
+            <a:r>
+              <a:rPr lang="pl-PL" dirty="0" smtClean="0"/>
+              <a:t> </a:t>
+            </a:r>
+            <a:r>
+              <a:rPr lang="pl-PL" dirty="0" err="1" smtClean="0"/>
+              <a:t>label</a:t>
+            </a:r>
+            <a:r>
+              <a:rPr lang="pl-PL" dirty="0" smtClean="0"/>
+              <a:t> </a:t>
+            </a:r>
+            <a:r>
+              <a:rPr lang="pl-PL" dirty="0" err="1" smtClean="0"/>
+              <a:t>based</a:t>
+            </a:r>
+            <a:r>
+              <a:rPr lang="pl-PL" dirty="0" smtClean="0"/>
+              <a:t> on </a:t>
+            </a:r>
+            <a:r>
+              <a:rPr lang="pl-PL" dirty="0" err="1" smtClean="0"/>
+              <a:t>selected</a:t>
+            </a:r>
+            <a:r>
+              <a:rPr lang="pl-PL" dirty="0" smtClean="0"/>
+              <a:t> </a:t>
+            </a:r>
+            <a:r>
+              <a:rPr lang="pl-PL" dirty="0" err="1" smtClean="0"/>
+              <a:t>locale</a:t>
+            </a:r>
+            <a:r>
+              <a:rPr lang="pl-PL" dirty="0" smtClean="0"/>
+              <a:t> </a:t>
+            </a:r>
+            <a:r>
+              <a:rPr lang="pl-PL" b="1" dirty="0" smtClean="0"/>
+              <a:t>(0.25p)</a:t>
+            </a:r>
+            <a:endParaRPr lang="pl-PL" b="1" dirty="0"/>
+          </a:p>
+          <a:p>
+            <a:pPr marL="342900" indent="-342900">
+              <a:buFont typeface="+mj-lt"/>
+              <a:buAutoNum type="arabicPeriod"/>
+            </a:pPr>
+            <a:r>
+              <a:rPr lang="pl-PL" dirty="0" err="1" smtClean="0"/>
+              <a:t>OnScreenButtony</a:t>
+            </a:r>
+            <a:r>
+              <a:rPr lang="pl-PL" dirty="0" smtClean="0"/>
+              <a:t>:</a:t>
+            </a:r>
+          </a:p>
+          <a:p>
+            <a:pPr marL="800100" lvl="1" indent="-342900">
+              <a:buFont typeface="+mj-lt"/>
+              <a:buAutoNum type="alphaLcPeriod"/>
+            </a:pPr>
+            <a:r>
+              <a:rPr lang="pl-PL" dirty="0" err="1" smtClean="0"/>
+              <a:t>Extract</a:t>
+            </a:r>
+            <a:r>
+              <a:rPr lang="pl-PL" dirty="0" smtClean="0"/>
+              <a:t> </a:t>
+            </a:r>
+            <a:r>
+              <a:rPr lang="pl-PL" dirty="0" err="1" smtClean="0"/>
+              <a:t>all</a:t>
+            </a:r>
+            <a:r>
+              <a:rPr lang="pl-PL" dirty="0" smtClean="0"/>
+              <a:t> the </a:t>
+            </a:r>
+            <a:r>
+              <a:rPr lang="pl-PL" dirty="0" err="1" smtClean="0"/>
+              <a:t>onscreen</a:t>
+            </a:r>
+            <a:r>
+              <a:rPr lang="pl-PL" dirty="0" smtClean="0"/>
+              <a:t> </a:t>
+            </a:r>
+            <a:r>
+              <a:rPr lang="pl-PL" dirty="0" err="1" smtClean="0"/>
+              <a:t>buttons</a:t>
+            </a:r>
+            <a:r>
+              <a:rPr lang="pl-PL" dirty="0" smtClean="0"/>
+              <a:t> to </a:t>
+            </a:r>
+            <a:r>
+              <a:rPr lang="pl-PL" dirty="0" err="1" smtClean="0"/>
+              <a:t>reusable</a:t>
+            </a:r>
+            <a:r>
+              <a:rPr lang="pl-PL" dirty="0" smtClean="0"/>
+              <a:t> </a:t>
+            </a:r>
+            <a:r>
+              <a:rPr lang="pl-PL" dirty="0" err="1" smtClean="0"/>
+              <a:t>KeyPad</a:t>
+            </a:r>
+            <a:r>
+              <a:rPr lang="pl-PL" dirty="0" smtClean="0"/>
+              <a:t> </a:t>
+            </a:r>
+            <a:r>
+              <a:rPr lang="pl-PL" dirty="0" err="1" smtClean="0"/>
+              <a:t>UserControl</a:t>
+            </a:r>
+            <a:r>
+              <a:rPr lang="pl-PL" dirty="0" smtClean="0"/>
+              <a:t> </a:t>
+            </a:r>
+            <a:r>
+              <a:rPr lang="pl-PL" b="1" dirty="0" smtClean="0"/>
+              <a:t>(0.5p)</a:t>
+            </a:r>
+          </a:p>
+          <a:p>
+            <a:pPr marL="800100" lvl="1" indent="-342900">
+              <a:buFont typeface="+mj-lt"/>
+              <a:buAutoNum type="alphaLcPeriod"/>
+            </a:pPr>
+            <a:r>
+              <a:rPr lang="pl-PL" dirty="0" err="1" smtClean="0"/>
+              <a:t>Make</a:t>
+            </a:r>
+            <a:r>
+              <a:rPr lang="pl-PL" dirty="0" smtClean="0"/>
+              <a:t> the </a:t>
+            </a:r>
+            <a:r>
+              <a:rPr lang="pl-PL" dirty="0" err="1" smtClean="0"/>
+              <a:t>KeyPad</a:t>
+            </a:r>
+            <a:r>
+              <a:rPr lang="pl-PL" dirty="0" smtClean="0"/>
+              <a:t> </a:t>
+            </a:r>
+            <a:r>
+              <a:rPr lang="pl-PL" dirty="0" err="1" smtClean="0"/>
+              <a:t>use</a:t>
+            </a:r>
+            <a:r>
+              <a:rPr lang="pl-PL" dirty="0" smtClean="0"/>
+              <a:t> </a:t>
+            </a:r>
+            <a:r>
+              <a:rPr lang="pl-PL" dirty="0" err="1" smtClean="0"/>
+              <a:t>ItemsControl</a:t>
+            </a:r>
+            <a:r>
+              <a:rPr lang="pl-PL" dirty="0" smtClean="0"/>
+              <a:t> on </a:t>
+            </a:r>
+            <a:r>
+              <a:rPr lang="pl-PL" dirty="0" err="1" smtClean="0"/>
+              <a:t>Grid</a:t>
+            </a:r>
+            <a:r>
+              <a:rPr lang="pl-PL" dirty="0" smtClean="0"/>
+              <a:t> to show </a:t>
+            </a:r>
+            <a:r>
+              <a:rPr lang="pl-PL" dirty="0" err="1" smtClean="0"/>
+              <a:t>buttons</a:t>
+            </a:r>
+            <a:r>
+              <a:rPr lang="pl-PL" dirty="0"/>
+              <a:t> </a:t>
+            </a:r>
+            <a:r>
+              <a:rPr lang="pl-PL" b="1" dirty="0" smtClean="0"/>
+              <a:t>(1p)</a:t>
+            </a:r>
+          </a:p>
+          <a:p>
+            <a:pPr marL="342900" indent="-342900">
+              <a:buFont typeface="+mj-lt"/>
+              <a:buAutoNum type="arabicPeriod"/>
+            </a:pPr>
+            <a:r>
+              <a:rPr lang="pl-PL" dirty="0" err="1" smtClean="0"/>
+              <a:t>Implemente</a:t>
+            </a:r>
+            <a:r>
+              <a:rPr lang="pl-PL" dirty="0" smtClean="0"/>
+              <a:t> </a:t>
+            </a:r>
+            <a:r>
+              <a:rPr lang="pl-PL" dirty="0" err="1" smtClean="0"/>
+              <a:t>Metric</a:t>
+            </a:r>
+            <a:r>
+              <a:rPr lang="pl-PL" dirty="0" smtClean="0"/>
+              <a:t>/Imperial </a:t>
+            </a:r>
+            <a:r>
+              <a:rPr lang="pl-PL" dirty="0" err="1" smtClean="0"/>
+              <a:t>Toggle</a:t>
+            </a:r>
+            <a:r>
+              <a:rPr lang="pl-PL" dirty="0" smtClean="0"/>
+              <a:t> </a:t>
+            </a:r>
+            <a:r>
+              <a:rPr lang="pl-PL" dirty="0" err="1" smtClean="0"/>
+              <a:t>switch</a:t>
+            </a:r>
+            <a:r>
+              <a:rPr lang="pl-PL" dirty="0" smtClean="0"/>
+              <a:t> </a:t>
+            </a:r>
+            <a:r>
+              <a:rPr lang="pl-PL" dirty="0" err="1" smtClean="0"/>
+              <a:t>handling</a:t>
+            </a:r>
+            <a:r>
+              <a:rPr lang="pl-PL" dirty="0" smtClean="0"/>
+              <a:t> </a:t>
+            </a:r>
+            <a:r>
+              <a:rPr lang="pl-PL" b="1" dirty="0" smtClean="0"/>
+              <a:t>(0.5p)</a:t>
+            </a:r>
+          </a:p>
+          <a:p>
+            <a:pPr marL="342900" indent="-342900">
+              <a:buFont typeface="+mj-lt"/>
+              <a:buAutoNum type="arabicPeriod"/>
+            </a:pPr>
+            <a:r>
+              <a:rPr lang="pl-PL" dirty="0" err="1" smtClean="0"/>
+              <a:t>Add</a:t>
+            </a:r>
+            <a:r>
+              <a:rPr lang="pl-PL" dirty="0" smtClean="0"/>
+              <a:t> </a:t>
+            </a:r>
+            <a:r>
+              <a:rPr lang="pl-PL" dirty="0" err="1" smtClean="0"/>
+              <a:t>converting</a:t>
+            </a:r>
+            <a:r>
+              <a:rPr lang="pl-PL" dirty="0" smtClean="0"/>
+              <a:t> </a:t>
+            </a:r>
+            <a:r>
+              <a:rPr lang="pl-PL" dirty="0" err="1" smtClean="0"/>
+              <a:t>buttons</a:t>
+            </a:r>
+            <a:r>
+              <a:rPr lang="pl-PL" dirty="0" smtClean="0"/>
+              <a:t> for </a:t>
+            </a:r>
+            <a:r>
+              <a:rPr lang="pl-PL" dirty="0" err="1" smtClean="0"/>
+              <a:t>Length</a:t>
+            </a:r>
+            <a:r>
+              <a:rPr lang="pl-PL" dirty="0" smtClean="0"/>
+              <a:t> and Volume  </a:t>
+            </a:r>
+            <a:r>
+              <a:rPr lang="pl-PL" b="1" dirty="0" smtClean="0"/>
+              <a:t>(0.5p)</a:t>
+            </a:r>
+            <a:r>
+              <a:rPr lang="pl-PL" dirty="0" smtClean="0"/>
+              <a:t> </a:t>
+            </a:r>
+            <a:endParaRPr lang="pl-PL" b="1" dirty="0" smtClean="0"/>
+          </a:p>
+          <a:p>
+            <a:pPr marL="342900" indent="-342900">
+              <a:buFont typeface="+mj-lt"/>
+              <a:buAutoNum type="arabicPeriod"/>
+            </a:pPr>
+            <a:r>
+              <a:rPr lang="pl-PL" dirty="0" err="1" smtClean="0"/>
+              <a:t>Make</a:t>
+            </a:r>
+            <a:r>
+              <a:rPr lang="pl-PL" dirty="0" smtClean="0"/>
+              <a:t> the </a:t>
+            </a:r>
+            <a:r>
+              <a:rPr lang="pl-PL" dirty="0" err="1" smtClean="0"/>
+              <a:t>UnitConverterEntryViewModel</a:t>
+            </a:r>
+            <a:r>
+              <a:rPr lang="pl-PL" dirty="0" smtClean="0"/>
+              <a:t> </a:t>
+            </a:r>
+            <a:r>
+              <a:rPr lang="pl-PL" dirty="0" err="1" smtClean="0"/>
+              <a:t>automatically</a:t>
+            </a:r>
+            <a:r>
+              <a:rPr lang="pl-PL" dirty="0" smtClean="0"/>
+              <a:t> </a:t>
+            </a:r>
+            <a:r>
+              <a:rPr lang="pl-PL" dirty="0" err="1" smtClean="0"/>
+              <a:t>choose</a:t>
+            </a:r>
+            <a:r>
+              <a:rPr lang="pl-PL" dirty="0" smtClean="0"/>
+              <a:t> the </a:t>
+            </a:r>
+            <a:r>
+              <a:rPr lang="pl-PL" dirty="0" err="1" smtClean="0"/>
+              <a:t>best</a:t>
+            </a:r>
+            <a:r>
+              <a:rPr lang="pl-PL" dirty="0" smtClean="0"/>
+              <a:t> unit to </a:t>
+            </a:r>
+            <a:r>
+              <a:rPr lang="pl-PL" dirty="0" err="1" smtClean="0"/>
+              <a:t>convert</a:t>
+            </a:r>
+            <a:r>
+              <a:rPr lang="pl-PL" dirty="0" smtClean="0"/>
+              <a:t> </a:t>
+            </a:r>
+            <a:r>
+              <a:rPr lang="pl-PL" dirty="0" err="1" smtClean="0"/>
+              <a:t>into</a:t>
+            </a:r>
+            <a:r>
+              <a:rPr lang="pl-PL" dirty="0" smtClean="0"/>
+              <a:t> </a:t>
+            </a:r>
+            <a:r>
+              <a:rPr lang="pl-PL" b="1" dirty="0" smtClean="0"/>
+              <a:t>(1.0p)</a:t>
+            </a:r>
+            <a:endParaRPr lang="pl-PL" dirty="0" smtClean="0"/>
+          </a:p>
+          <a:p>
+            <a:pPr marL="342900" indent="-342900">
+              <a:buFont typeface="+mj-lt"/>
+              <a:buAutoNum type="arabicPeriod"/>
+            </a:pPr>
+            <a:r>
+              <a:rPr lang="pl-PL" dirty="0" smtClean="0"/>
+              <a:t>In </a:t>
+            </a:r>
+            <a:r>
+              <a:rPr lang="pl-PL" dirty="0" err="1" smtClean="0"/>
+              <a:t>Currency</a:t>
+            </a:r>
+            <a:r>
+              <a:rPr lang="pl-PL" dirty="0" smtClean="0"/>
+              <a:t> </a:t>
+            </a:r>
+            <a:r>
+              <a:rPr lang="pl-PL" dirty="0" err="1" smtClean="0"/>
+              <a:t>converter</a:t>
+            </a:r>
+            <a:r>
+              <a:rPr lang="pl-PL" dirty="0" smtClean="0"/>
+              <a:t>, update the </a:t>
+            </a:r>
+            <a:r>
+              <a:rPr lang="pl-PL" dirty="0" err="1" smtClean="0"/>
+              <a:t>viewmodel</a:t>
+            </a:r>
+            <a:r>
+              <a:rPr lang="pl-PL" dirty="0" smtClean="0"/>
+              <a:t> </a:t>
+            </a:r>
+            <a:r>
+              <a:rPr lang="pl-PL" dirty="0" err="1" smtClean="0"/>
+              <a:t>so</a:t>
+            </a:r>
+            <a:r>
+              <a:rPr lang="pl-PL" dirty="0" smtClean="0"/>
+              <a:t> </a:t>
+            </a:r>
+            <a:r>
+              <a:rPr lang="pl-PL" dirty="0" err="1" smtClean="0"/>
+              <a:t>only</a:t>
+            </a:r>
+            <a:r>
+              <a:rPr lang="pl-PL" dirty="0" smtClean="0"/>
+              <a:t> </a:t>
+            </a:r>
+            <a:r>
+              <a:rPr lang="pl-PL" dirty="0" err="1" smtClean="0"/>
+              <a:t>valid</a:t>
+            </a:r>
+            <a:r>
+              <a:rPr lang="pl-PL" dirty="0" smtClean="0"/>
+              <a:t> </a:t>
+            </a:r>
+            <a:r>
+              <a:rPr lang="pl-PL" dirty="0" err="1" smtClean="0"/>
+              <a:t>currencie</a:t>
+            </a:r>
+            <a:r>
+              <a:rPr lang="pl-PL" dirty="0" smtClean="0"/>
+              <a:t> </a:t>
+            </a:r>
+            <a:r>
+              <a:rPr lang="pl-PL" dirty="0" err="1" smtClean="0"/>
+              <a:t>convertion</a:t>
+            </a:r>
+            <a:r>
+              <a:rPr lang="pl-PL" dirty="0" smtClean="0"/>
+              <a:t> </a:t>
+            </a:r>
+            <a:r>
+              <a:rPr lang="pl-PL" dirty="0" err="1" smtClean="0"/>
+              <a:t>are</a:t>
+            </a:r>
+            <a:r>
+              <a:rPr lang="pl-PL" dirty="0" smtClean="0"/>
+              <a:t> </a:t>
+            </a:r>
+            <a:r>
+              <a:rPr lang="pl-PL" dirty="0" err="1" smtClean="0"/>
+              <a:t>available</a:t>
+            </a:r>
+            <a:r>
+              <a:rPr lang="pl-PL" dirty="0" smtClean="0"/>
+              <a:t> to </a:t>
+            </a:r>
+            <a:r>
+              <a:rPr lang="pl-PL" dirty="0" err="1" smtClean="0"/>
+              <a:t>choose</a:t>
+            </a:r>
+            <a:r>
+              <a:rPr lang="pl-PL" dirty="0" smtClean="0"/>
+              <a:t> for </a:t>
+            </a:r>
+            <a:r>
+              <a:rPr lang="pl-PL" b="1" dirty="0" smtClean="0"/>
+              <a:t>(1.5p)</a:t>
+            </a:r>
+          </a:p>
+          <a:p>
+            <a:endParaRPr lang="pl-PL" dirty="0"/>
+          </a:p>
+        </p:txBody>
+      </p:sp>
+      <p:sp>
+        <p:nvSpPr>
+          <p:cNvPr id="8" name="TextBox 7"/>
+          <p:cNvSpPr txBox="1"/>
+          <p:nvPr/>
+        </p:nvSpPr>
+        <p:spPr>
+          <a:xfrm>
+            <a:off x="5617414" y="1035170"/>
+            <a:ext cx="5993741" cy="400110"/>
+          </a:xfrm>
+          <a:prstGeom prst="rect">
+            <a:avLst/>
+          </a:prstGeom>
+          <a:noFill/>
+        </p:spPr>
+        <p:txBody>
+          <a:bodyPr wrap="square" rtlCol="0">
+            <a:spAutoFit/>
+          </a:bodyPr>
+          <a:lstStyle/>
+          <a:p>
+            <a:endParaRPr lang="en-US" sz="2000" b="1" dirty="0"/>
+          </a:p>
+        </p:txBody>
+      </p:sp>
+    </p:spTree>
+    <p:extLst>
+      <p:ext uri="{BB962C8B-B14F-4D97-AF65-F5344CB8AC3E}">
+        <p14:creationId xmlns:p14="http://schemas.microsoft.com/office/powerpoint/2010/main" val="2859530664"/>
+      </p:ext>
+    </p:extLst>
+  </p:cSld>
+  <p:clrMapOvr>
+    <a:masterClrMapping/>
+  </p:clrMapOvr>
+  <p:timing>
+    <p:tnLst>
+      <p:par>
+        <p:cTn id="1" dur="indefinite" restart="never" nodeType="tmRoot"/>
+      </p:par>
+    </p:tnLst>
+  </p:timing>
+</p:sld>
+</file>
+
 <file path=ppt/slides/slide3.xml><?xml version="1.0" encoding="utf-8"?>
 <p:sld xmlns:a="http://schemas.openxmlformats.org/drawingml/2006/main" xmlns:r="http://schemas.openxmlformats.org/officeDocument/2006/relationships" xmlns:p="http://schemas.openxmlformats.org/presentationml/2006/main">
   <p:cSld>

</xml_diff>